<commit_message>
updating slides for Lecture 23 and updating the dates and status on Lecture 17, 18, 19, and 23.
</commit_message>
<xml_diff>
--- a/lecture/slides/ECE_383_Lec23.pptx
+++ b/lecture/slides/ECE_383_Lec23.pptx
@@ -6,33 +6,36 @@
     <p:sldMasterId id="2147483687" r:id="rId2"/>
   </p:sldMasterIdLst>
   <p:notesMasterIdLst>
-    <p:notesMasterId r:id="rId24"/>
+    <p:notesMasterId r:id="rId27"/>
   </p:notesMasterIdLst>
   <p:handoutMasterIdLst>
-    <p:handoutMasterId r:id="rId25"/>
+    <p:handoutMasterId r:id="rId28"/>
   </p:handoutMasterIdLst>
   <p:sldIdLst>
-    <p:sldId id="299" r:id="rId3"/>
+    <p:sldId id="377" r:id="rId3"/>
     <p:sldId id="300" r:id="rId4"/>
-    <p:sldId id="356" r:id="rId5"/>
-    <p:sldId id="358" r:id="rId6"/>
-    <p:sldId id="359" r:id="rId7"/>
-    <p:sldId id="360" r:id="rId8"/>
-    <p:sldId id="361" r:id="rId9"/>
-    <p:sldId id="362" r:id="rId10"/>
-    <p:sldId id="364" r:id="rId11"/>
-    <p:sldId id="376" r:id="rId12"/>
+    <p:sldId id="359" r:id="rId5"/>
+    <p:sldId id="360" r:id="rId6"/>
+    <p:sldId id="361" r:id="rId7"/>
+    <p:sldId id="362" r:id="rId8"/>
+    <p:sldId id="378" r:id="rId9"/>
+    <p:sldId id="364" r:id="rId10"/>
+    <p:sldId id="376" r:id="rId11"/>
+    <p:sldId id="379" r:id="rId12"/>
     <p:sldId id="365" r:id="rId13"/>
     <p:sldId id="366" r:id="rId14"/>
     <p:sldId id="367" r:id="rId15"/>
     <p:sldId id="368" r:id="rId16"/>
-    <p:sldId id="369" r:id="rId17"/>
-    <p:sldId id="370" r:id="rId18"/>
-    <p:sldId id="373" r:id="rId19"/>
-    <p:sldId id="374" r:id="rId20"/>
-    <p:sldId id="372" r:id="rId21"/>
-    <p:sldId id="375" r:id="rId22"/>
-    <p:sldId id="371" r:id="rId23"/>
+    <p:sldId id="356" r:id="rId17"/>
+    <p:sldId id="358" r:id="rId18"/>
+    <p:sldId id="380" r:id="rId19"/>
+    <p:sldId id="369" r:id="rId20"/>
+    <p:sldId id="370" r:id="rId21"/>
+    <p:sldId id="373" r:id="rId22"/>
+    <p:sldId id="374" r:id="rId23"/>
+    <p:sldId id="372" r:id="rId24"/>
+    <p:sldId id="375" r:id="rId25"/>
+    <p:sldId id="371" r:id="rId26"/>
   </p:sldIdLst>
   <p:sldSz cx="9144000" cy="6858000" type="screen4x3"/>
   <p:notesSz cx="6985000" cy="9283700"/>
@@ -873,144 +876,6 @@
 </p:notesMaster>
 </file>
 
-<file path=ppt/notesSlides/notesSlide1.xml><?xml version="1.0" encoding="utf-8"?>
-<p:notes xmlns:a="http://schemas.openxmlformats.org/drawingml/2006/main" xmlns:r="http://schemas.openxmlformats.org/officeDocument/2006/relationships" xmlns:p="http://schemas.openxmlformats.org/presentationml/2006/main">
-  <p:cSld>
-    <p:spTree>
-      <p:nvGrpSpPr>
-        <p:cNvPr id="1" name=""/>
-        <p:cNvGrpSpPr/>
-        <p:nvPr/>
-      </p:nvGrpSpPr>
-      <p:grpSpPr>
-        <a:xfrm>
-          <a:off x="0" y="0"/>
-          <a:ext cx="0" cy="0"/>
-          <a:chOff x="0" y="0"/>
-          <a:chExt cx="0" cy="0"/>
-        </a:xfrm>
-      </p:grpSpPr>
-      <p:sp>
-        <p:nvSpPr>
-          <p:cNvPr id="15362" name="Slide Image Placeholder 1"/>
-          <p:cNvSpPr>
-            <a:spLocks noGrp="1" noRot="1" noChangeAspect="1" noTextEdit="1"/>
-          </p:cNvSpPr>
-          <p:nvPr>
-            <p:ph type="sldImg"/>
-          </p:nvPr>
-        </p:nvSpPr>
-        <p:spPr>
-          <a:ln/>
-        </p:spPr>
-      </p:sp>
-      <p:sp>
-        <p:nvSpPr>
-          <p:cNvPr id="15363" name="Notes Placeholder 2"/>
-          <p:cNvSpPr>
-            <a:spLocks noGrp="1"/>
-          </p:cNvSpPr>
-          <p:nvPr>
-            <p:ph type="body" idx="1"/>
-          </p:nvPr>
-        </p:nvSpPr>
-        <p:spPr>
-          <a:noFill/>
-          <a:ln w="9525"/>
-        </p:spPr>
-        <p:txBody>
-          <a:bodyPr/>
-          <a:lstStyle/>
-          <a:p>
-            <a:r>
-              <a:rPr lang="en-US" dirty="0" smtClean="0"/>
-              <a:t>Write on board:</a:t>
-            </a:r>
-          </a:p>
-          <a:p>
-            <a:endParaRPr lang="en-US" dirty="0" smtClean="0"/>
-          </a:p>
-          <a:p>
-            <a:r>
-              <a:rPr lang="en-US" u="sng" dirty="0" smtClean="0"/>
-              <a:t>ECE</a:t>
-            </a:r>
-            <a:r>
-              <a:rPr lang="en-US" u="sng" baseline="0" dirty="0" smtClean="0"/>
-              <a:t> 315</a:t>
-            </a:r>
-          </a:p>
-          <a:p>
-            <a:r>
-              <a:rPr lang="en-US" baseline="0" dirty="0" smtClean="0"/>
-              <a:t>Day 1 – Admin</a:t>
-            </a:r>
-          </a:p>
-          <a:p>
-            <a:r>
-              <a:rPr lang="en-US" baseline="0" dirty="0" smtClean="0"/>
-              <a:t>Section Marcher</a:t>
-            </a:r>
-          </a:p>
-          <a:p>
-            <a:r>
-              <a:rPr lang="en-US" baseline="0" dirty="0" smtClean="0"/>
-              <a:t>Introductions</a:t>
-            </a:r>
-          </a:p>
-          <a:p>
-            <a:r>
-              <a:rPr lang="en-US" baseline="0" dirty="0" smtClean="0"/>
-              <a:t>Syllabus</a:t>
-            </a:r>
-          </a:p>
-          <a:p>
-            <a:endParaRPr lang="en-US" dirty="0" smtClean="0"/>
-          </a:p>
-        </p:txBody>
-      </p:sp>
-      <p:sp>
-        <p:nvSpPr>
-          <p:cNvPr id="15364" name="Slide Number Placeholder 3"/>
-          <p:cNvSpPr>
-            <a:spLocks noGrp="1"/>
-          </p:cNvSpPr>
-          <p:nvPr>
-            <p:ph type="sldNum" sz="quarter" idx="5"/>
-          </p:nvPr>
-        </p:nvSpPr>
-        <p:spPr>
-          <a:noFill/>
-        </p:spPr>
-        <p:txBody>
-          <a:bodyPr/>
-          <a:lstStyle/>
-          <a:p>
-            <a:fld id="{B581BCBC-E066-4910-B192-91C4189936ED}" type="slidenum">
-              <a:rPr lang="en-US">
-                <a:solidFill>
-                  <a:prstClr val="black"/>
-                </a:solidFill>
-              </a:rPr>
-              <a:pPr/>
-              <a:t>1</a:t>
-            </a:fld>
-            <a:endParaRPr lang="en-US">
-              <a:solidFill>
-                <a:prstClr val="black"/>
-              </a:solidFill>
-            </a:endParaRPr>
-          </a:p>
-        </p:txBody>
-      </p:sp>
-    </p:spTree>
-  </p:cSld>
-  <p:clrMapOvr>
-    <a:masterClrMapping/>
-  </p:clrMapOvr>
-</p:notes>
-</file>
-
 <file path=ppt/slideLayouts/slideLayout1.xml><?xml version="1.0" encoding="utf-8"?>
 <p:sldLayout xmlns:a="http://schemas.openxmlformats.org/drawingml/2006/main" xmlns:r="http://schemas.openxmlformats.org/officeDocument/2006/relationships" xmlns:p="http://schemas.openxmlformats.org/presentationml/2006/main" type="title" preserve="1">
   <p:cSld name="Title Slide">
@@ -1199,7 +1064,7 @@
                 </a:solidFill>
               </a:rPr>
               <a:pPr/>
-              <a:t>3/17/2016</a:t>
+              <a:t>3/8/2017</a:t>
             </a:fld>
             <a:endParaRPr lang="en-US">
               <a:solidFill>
@@ -1401,7 +1266,7 @@
                 </a:solidFill>
               </a:rPr>
               <a:pPr/>
-              <a:t>3/17/2016</a:t>
+              <a:t>3/8/2017</a:t>
             </a:fld>
             <a:endParaRPr lang="en-US">
               <a:solidFill>
@@ -1613,7 +1478,7 @@
                 </a:solidFill>
               </a:rPr>
               <a:pPr/>
-              <a:t>3/17/2016</a:t>
+              <a:t>3/8/2017</a:t>
             </a:fld>
             <a:endParaRPr lang="en-US">
               <a:solidFill>
@@ -2104,7 +1969,7 @@
                 </a:spcAft>
                 <a:defRPr/>
               </a:pPr>
-              <a:t>17 March 2016</a:t>
+              <a:t>8 March 2017</a:t>
             </a:fld>
             <a:endParaRPr lang="en-US" sz="1800">
               <a:solidFill>
@@ -2369,7 +2234,7 @@
                 </a:spcAft>
                 <a:defRPr/>
               </a:pPr>
-              <a:t>17 March 2016</a:t>
+              <a:t>8 March 2017</a:t>
             </a:fld>
             <a:endParaRPr lang="en-US" sz="1800">
               <a:solidFill>
@@ -2723,7 +2588,7 @@
                 </a:spcAft>
                 <a:defRPr/>
               </a:pPr>
-              <a:t>17 March 2016</a:t>
+              <a:t>8 March 2017</a:t>
             </a:fld>
             <a:endParaRPr lang="en-US" sz="1800">
               <a:solidFill>
@@ -3216,7 +3081,7 @@
                 </a:spcAft>
                 <a:defRPr/>
               </a:pPr>
-              <a:t>17 March 2016</a:t>
+              <a:t>8 March 2017</a:t>
             </a:fld>
             <a:endParaRPr lang="en-US" sz="1800">
               <a:solidFill>
@@ -3400,7 +3265,7 @@
                 </a:spcAft>
                 <a:defRPr/>
               </a:pPr>
-              <a:t>17 March 2016</a:t>
+              <a:t>8 March 2017</a:t>
             </a:fld>
             <a:endParaRPr lang="en-US" sz="1800">
               <a:solidFill>
@@ -3561,7 +3426,7 @@
                 </a:spcAft>
                 <a:defRPr/>
               </a:pPr>
-              <a:t>17 March 2016</a:t>
+              <a:t>8 March 2017</a:t>
             </a:fld>
             <a:endParaRPr lang="en-US" sz="1800">
               <a:solidFill>
@@ -3904,7 +3769,7 @@
                 </a:spcAft>
                 <a:defRPr/>
               </a:pPr>
-              <a:t>17 March 2016</a:t>
+              <a:t>8 March 2017</a:t>
             </a:fld>
             <a:endParaRPr lang="en-US" sz="1800">
               <a:solidFill>
@@ -4043,7 +3908,7 @@
                 </a:solidFill>
               </a:rPr>
               <a:pPr/>
-              <a:t>3/17/2016</a:t>
+              <a:t>3/8/2017</a:t>
             </a:fld>
             <a:endParaRPr lang="en-US">
               <a:solidFill>
@@ -4426,7 +4291,7 @@
                 </a:spcAft>
                 <a:defRPr/>
               </a:pPr>
-              <a:t>17 March 2016</a:t>
+              <a:t>8 March 2017</a:t>
             </a:fld>
             <a:endParaRPr lang="en-US" sz="1800">
               <a:solidFill>
@@ -4662,7 +4527,7 @@
                 </a:spcAft>
                 <a:defRPr/>
               </a:pPr>
-              <a:t>17 March 2016</a:t>
+              <a:t>8 March 2017</a:t>
             </a:fld>
             <a:endParaRPr lang="en-US" sz="1800">
               <a:solidFill>
@@ -4908,7 +4773,7 @@
                 </a:spcAft>
                 <a:defRPr/>
               </a:pPr>
-              <a:t>17 March 2016</a:t>
+              <a:t>8 March 2017</a:t>
             </a:fld>
             <a:endParaRPr lang="en-US" sz="1800">
               <a:solidFill>
@@ -5122,7 +4987,7 @@
                 </a:spcAft>
                 <a:defRPr/>
               </a:pPr>
-              <a:t>17 March 2016</a:t>
+              <a:t>8 March 2017</a:t>
             </a:fld>
             <a:endParaRPr lang="en-US" sz="1800">
               <a:solidFill>
@@ -5337,7 +5202,7 @@
                 </a:solidFill>
               </a:rPr>
               <a:pPr/>
-              <a:t>3/17/2016</a:t>
+              <a:t>3/8/2017</a:t>
             </a:fld>
             <a:endParaRPr lang="en-US">
               <a:solidFill>
@@ -5657,7 +5522,7 @@
                 </a:solidFill>
               </a:rPr>
               <a:pPr/>
-              <a:t>3/17/2016</a:t>
+              <a:t>3/8/2017</a:t>
             </a:fld>
             <a:endParaRPr lang="en-US">
               <a:solidFill>
@@ -6111,7 +5976,7 @@
                 </a:solidFill>
               </a:rPr>
               <a:pPr/>
-              <a:t>3/17/2016</a:t>
+              <a:t>3/8/2017</a:t>
             </a:fld>
             <a:endParaRPr lang="en-US">
               <a:solidFill>
@@ -6261,7 +6126,7 @@
                 </a:solidFill>
               </a:rPr>
               <a:pPr/>
-              <a:t>3/17/2016</a:t>
+              <a:t>3/8/2017</a:t>
             </a:fld>
             <a:endParaRPr lang="en-US">
               <a:solidFill>
@@ -6388,7 +6253,7 @@
                 </a:solidFill>
               </a:rPr>
               <a:pPr/>
-              <a:t>3/17/2016</a:t>
+              <a:t>3/8/2017</a:t>
             </a:fld>
             <a:endParaRPr lang="en-US">
               <a:solidFill>
@@ -6697,7 +6562,7 @@
                 </a:solidFill>
               </a:rPr>
               <a:pPr/>
-              <a:t>3/17/2016</a:t>
+              <a:t>3/8/2017</a:t>
             </a:fld>
             <a:endParaRPr lang="en-US">
               <a:solidFill>
@@ -6982,7 +6847,7 @@
                 </a:solidFill>
               </a:rPr>
               <a:pPr/>
-              <a:t>3/17/2016</a:t>
+              <a:t>3/8/2017</a:t>
             </a:fld>
             <a:endParaRPr lang="en-US">
               <a:solidFill>
@@ -7243,7 +7108,7 @@
                   <a:spcPts val="0"/>
                 </a:spcAft>
               </a:pPr>
-              <a:t>3/17/2016</a:t>
+              <a:t>3/8/2017</a:t>
             </a:fld>
             <a:endParaRPr lang="en-US">
               <a:solidFill>
@@ -7874,38 +7739,6 @@
           </a:p>
         </p:txBody>
       </p:sp>
-      <p:pic>
-        <p:nvPicPr>
-          <p:cNvPr id="1030" name="Picture 41" descr="usafaseal2"/>
-          <p:cNvPicPr>
-            <a:picLocks noChangeAspect="1" noChangeArrowheads="1"/>
-          </p:cNvPicPr>
-          <p:nvPr userDrawn="1"/>
-        </p:nvPicPr>
-        <p:blipFill>
-          <a:blip r:embed="rId14" cstate="print"/>
-          <a:srcRect/>
-          <a:stretch>
-            <a:fillRect/>
-          </a:stretch>
-        </p:blipFill>
-        <p:spPr bwMode="auto">
-          <a:xfrm>
-            <a:off x="385763" y="0"/>
-            <a:ext cx="1287462" cy="1352550"/>
-          </a:xfrm>
-          <a:prstGeom prst="rect">
-            <a:avLst/>
-          </a:prstGeom>
-          <a:noFill/>
-          <a:ln w="9525">
-            <a:noFill/>
-            <a:miter lim="800000"/>
-            <a:headEnd/>
-            <a:tailEnd/>
-          </a:ln>
-        </p:spPr>
-      </p:pic>
       <p:sp>
         <p:nvSpPr>
           <p:cNvPr id="1067" name="Text Box 43"/>
@@ -8064,6 +7897,47 @@
           </a:p>
         </p:txBody>
       </p:sp>
+      <p:pic>
+        <p:nvPicPr>
+          <p:cNvPr id="9" name="Picture 2" descr="C:\Users\Ashley.Murphy\Desktop\USAFA%20Logo%20v%203%20line%20CMYK.png"/>
+          <p:cNvPicPr>
+            <a:picLocks noChangeAspect="1" noChangeArrowheads="1"/>
+          </p:cNvPicPr>
+          <p:nvPr userDrawn="1"/>
+        </p:nvPicPr>
+        <p:blipFill>
+          <a:blip r:embed="rId14" cstate="print">
+            <a:extLst>
+              <a:ext uri="{28A0092B-C50C-407E-A947-70E740481C1C}">
+                <a14:useLocalDpi xmlns:a14="http://schemas.microsoft.com/office/drawing/2010/main" val="0"/>
+              </a:ext>
+            </a:extLst>
+          </a:blip>
+          <a:srcRect/>
+          <a:stretch>
+            <a:fillRect/>
+          </a:stretch>
+        </p:blipFill>
+        <p:spPr bwMode="auto">
+          <a:xfrm>
+            <a:off x="462601" y="76202"/>
+            <a:ext cx="1065031" cy="1213885"/>
+          </a:xfrm>
+          <a:prstGeom prst="rect">
+            <a:avLst/>
+          </a:prstGeom>
+          <a:noFill/>
+          <a:extLst>
+            <a:ext uri="{909E8E84-426E-40DD-AFC4-6F175D3DCCD1}">
+              <a14:hiddenFill xmlns:a14="http://schemas.microsoft.com/office/drawing/2010/main">
+                <a:solidFill>
+                  <a:srgbClr val="FFFFFF"/>
+                </a:solidFill>
+              </a14:hiddenFill>
+            </a:ext>
+          </a:extLst>
+        </p:spPr>
+      </p:pic>
     </p:spTree>
     <p:extLst>
       <p:ext uri="{BB962C8B-B14F-4D97-AF65-F5344CB8AC3E}">
@@ -8520,107 +8394,62 @@
       </p:grpSpPr>
       <p:sp>
         <p:nvSpPr>
-          <p:cNvPr id="4098" name="Rectangle 2"/>
-          <p:cNvSpPr>
-            <a:spLocks noGrp="1" noChangeArrowheads="1"/>
-          </p:cNvSpPr>
-          <p:nvPr>
-            <p:ph type="ctrTitle"/>
-          </p:nvPr>
-        </p:nvSpPr>
-        <p:spPr>
-          <a:xfrm>
-            <a:off x="0" y="1524000"/>
-            <a:ext cx="9144000" cy="1905000"/>
-          </a:xfrm>
-        </p:spPr>
-        <p:txBody>
-          <a:bodyPr>
-            <a:normAutofit/>
-          </a:bodyPr>
-          <a:lstStyle/>
-          <a:p>
-            <a:r>
-              <a:rPr lang="en-US" sz="4000" dirty="0" smtClean="0"/>
-              <a:t>ECE 383 – Embedded Computer Systems II</a:t>
-            </a:r>
-            <a:br>
-              <a:rPr lang="en-US" sz="4000" dirty="0" smtClean="0"/>
-            </a:br>
-            <a:r>
-              <a:rPr lang="en-US" sz="4000" dirty="0" smtClean="0"/>
-              <a:t>Lecture 23 </a:t>
-            </a:r>
-            <a:r>
-              <a:rPr lang="en-US" sz="4000" dirty="0"/>
-              <a:t>- Direct Digital Synthesis</a:t>
-            </a:r>
-            <a:endParaRPr lang="en-US" sz="4000" dirty="0" smtClean="0"/>
-          </a:p>
-        </p:txBody>
-      </p:sp>
-      <p:sp>
-        <p:nvSpPr>
-          <p:cNvPr id="4099" name="Rectangle 3"/>
-          <p:cNvSpPr>
-            <a:spLocks noGrp="1" noChangeArrowheads="1"/>
-          </p:cNvSpPr>
-          <p:nvPr>
-            <p:ph type="subTitle" idx="1"/>
-          </p:nvPr>
-        </p:nvSpPr>
-        <p:spPr>
-          <a:xfrm>
-            <a:off x="3333750" y="3754438"/>
-            <a:ext cx="5048250" cy="2187575"/>
-          </a:xfrm>
-        </p:spPr>
-        <p:txBody>
-          <a:bodyPr>
-            <a:normAutofit/>
-          </a:bodyPr>
-          <a:lstStyle/>
-          <a:p>
-            <a:r>
-              <a:rPr lang="en-US" dirty="0" smtClean="0"/>
-              <a:t>Capt Jeffrey Falkinburg</a:t>
-            </a:r>
-            <a:br>
-              <a:rPr lang="en-US" dirty="0" smtClean="0"/>
-            </a:br>
-            <a:r>
-              <a:rPr lang="en-US" dirty="0" smtClean="0"/>
-              <a:t>Room 2E46C</a:t>
-            </a:r>
-            <a:br>
-              <a:rPr lang="en-US" dirty="0" smtClean="0"/>
-            </a:br>
-            <a:r>
-              <a:rPr lang="en-US" dirty="0" smtClean="0"/>
-              <a:t>333-7366</a:t>
-            </a:r>
-          </a:p>
-        </p:txBody>
-      </p:sp>
-      <p:pic>
-        <p:nvPicPr>
-          <p:cNvPr id="4101" name="Picture 31" descr="usafaseal2"/>
-          <p:cNvPicPr>
-            <a:picLocks noChangeAspect="1" noChangeArrowheads="1"/>
-          </p:cNvPicPr>
+          <p:cNvPr id="4" name="Line 14"/>
+          <p:cNvSpPr>
+            <a:spLocks noChangeShapeType="1"/>
+          </p:cNvSpPr>
           <p:nvPr/>
-        </p:nvPicPr>
-        <p:blipFill>
-          <a:blip r:embed="rId3" cstate="print"/>
-          <a:srcRect/>
-          <a:stretch>
-            <a:fillRect/>
-          </a:stretch>
-        </p:blipFill>
+        </p:nvSpPr>
         <p:spPr bwMode="auto">
           <a:xfrm>
-            <a:off x="520700" y="2903538"/>
-            <a:ext cx="3035300" cy="3187700"/>
+            <a:off x="381000" y="6451600"/>
+            <a:ext cx="8382000" cy="0"/>
+          </a:xfrm>
+          <a:prstGeom prst="line">
+            <a:avLst/>
+          </a:prstGeom>
+          <a:noFill/>
+          <a:ln w="57150">
+            <a:solidFill>
+              <a:srgbClr val="0C2D83"/>
+            </a:solidFill>
+            <a:round/>
+            <a:headEnd/>
+            <a:tailEnd/>
+          </a:ln>
+          <a:effectLst/>
+        </p:spPr>
+        <p:txBody>
+          <a:bodyPr wrap="none" lIns="91440" tIns="45720" rIns="91440" bIns="45720" anchor="ctr"/>
+          <a:lstStyle/>
+          <a:p>
+            <a:pPr algn="ctr" eaLnBrk="0" hangingPunct="0">
+              <a:spcBef>
+                <a:spcPct val="0"/>
+              </a:spcBef>
+              <a:defRPr/>
+            </a:pPr>
+            <a:endParaRPr lang="en-US" sz="1400" dirty="0">
+              <a:solidFill>
+                <a:srgbClr val="000000"/>
+              </a:solidFill>
+              <a:latin typeface="Arial" charset="0"/>
+            </a:endParaRPr>
+          </a:p>
+        </p:txBody>
+      </p:sp>
+      <p:sp>
+        <p:nvSpPr>
+          <p:cNvPr id="8" name="Rectangle 13"/>
+          <p:cNvSpPr txBox="1">
+            <a:spLocks noChangeArrowheads="1"/>
+          </p:cNvSpPr>
+          <p:nvPr/>
+        </p:nvSpPr>
+        <p:spPr bwMode="auto">
+          <a:xfrm>
+            <a:off x="3070748" y="1774211"/>
+            <a:ext cx="5581888" cy="2854051"/>
           </a:xfrm>
           <a:prstGeom prst="rect">
             <a:avLst/>
@@ -8633,134 +8462,551 @@
             <a:tailEnd/>
           </a:ln>
         </p:spPr>
-      </p:pic>
-      <p:sp>
-        <p:nvSpPr>
-          <p:cNvPr id="4102" name="Text Box 6"/>
+        <p:txBody>
+          <a:bodyPr vert="horz" wrap="square" lIns="91440" tIns="45720" rIns="91440" bIns="45720" numCol="1" anchor="ctr" anchorCtr="0" compatLnSpc="1">
+            <a:prstTxWarp prst="textNoShape">
+              <a:avLst/>
+            </a:prstTxWarp>
+          </a:bodyPr>
+          <a:lstStyle>
+            <a:lvl1pPr algn="r" rtl="0" eaLnBrk="0" fontAlgn="base" hangingPunct="0">
+              <a:spcBef>
+                <a:spcPct val="0"/>
+              </a:spcBef>
+              <a:spcAft>
+                <a:spcPct val="0"/>
+              </a:spcAft>
+              <a:defRPr sz="4400" b="1">
+                <a:solidFill>
+                  <a:srgbClr val="0C2D83"/>
+                </a:solidFill>
+                <a:effectLst>
+                  <a:outerShdw blurRad="38100" dist="38100" dir="2700000" algn="tl">
+                    <a:srgbClr val="000000">
+                      <a:alpha val="43137"/>
+                    </a:srgbClr>
+                  </a:outerShdw>
+                </a:effectLst>
+                <a:latin typeface="+mj-lt"/>
+                <a:ea typeface="+mj-ea"/>
+                <a:cs typeface="+mj-cs"/>
+              </a:defRPr>
+            </a:lvl1pPr>
+            <a:lvl2pPr algn="r" rtl="0" eaLnBrk="0" fontAlgn="base" hangingPunct="0">
+              <a:spcBef>
+                <a:spcPct val="0"/>
+              </a:spcBef>
+              <a:spcAft>
+                <a:spcPct val="0"/>
+              </a:spcAft>
+              <a:defRPr sz="3600" b="1">
+                <a:solidFill>
+                  <a:srgbClr val="0C2D83"/>
+                </a:solidFill>
+                <a:latin typeface="Arial" charset="0"/>
+              </a:defRPr>
+            </a:lvl2pPr>
+            <a:lvl3pPr algn="r" rtl="0" eaLnBrk="0" fontAlgn="base" hangingPunct="0">
+              <a:spcBef>
+                <a:spcPct val="0"/>
+              </a:spcBef>
+              <a:spcAft>
+                <a:spcPct val="0"/>
+              </a:spcAft>
+              <a:defRPr sz="3600" b="1">
+                <a:solidFill>
+                  <a:srgbClr val="0C2D83"/>
+                </a:solidFill>
+                <a:latin typeface="Arial" charset="0"/>
+              </a:defRPr>
+            </a:lvl3pPr>
+            <a:lvl4pPr algn="r" rtl="0" eaLnBrk="0" fontAlgn="base" hangingPunct="0">
+              <a:spcBef>
+                <a:spcPct val="0"/>
+              </a:spcBef>
+              <a:spcAft>
+                <a:spcPct val="0"/>
+              </a:spcAft>
+              <a:defRPr sz="3600" b="1">
+                <a:solidFill>
+                  <a:srgbClr val="0C2D83"/>
+                </a:solidFill>
+                <a:latin typeface="Arial" charset="0"/>
+              </a:defRPr>
+            </a:lvl4pPr>
+            <a:lvl5pPr algn="r" rtl="0" eaLnBrk="0" fontAlgn="base" hangingPunct="0">
+              <a:spcBef>
+                <a:spcPct val="0"/>
+              </a:spcBef>
+              <a:spcAft>
+                <a:spcPct val="0"/>
+              </a:spcAft>
+              <a:defRPr sz="3600" b="1">
+                <a:solidFill>
+                  <a:srgbClr val="0C2D83"/>
+                </a:solidFill>
+                <a:latin typeface="Arial" charset="0"/>
+              </a:defRPr>
+            </a:lvl5pPr>
+            <a:lvl6pPr marL="457200" algn="r" rtl="0" fontAlgn="base">
+              <a:spcBef>
+                <a:spcPct val="0"/>
+              </a:spcBef>
+              <a:spcAft>
+                <a:spcPct val="0"/>
+              </a:spcAft>
+              <a:defRPr sz="3600" b="1">
+                <a:solidFill>
+                  <a:srgbClr val="0C2D83"/>
+                </a:solidFill>
+                <a:latin typeface="Arial" charset="0"/>
+              </a:defRPr>
+            </a:lvl6pPr>
+            <a:lvl7pPr marL="914400" algn="r" rtl="0" fontAlgn="base">
+              <a:spcBef>
+                <a:spcPct val="0"/>
+              </a:spcBef>
+              <a:spcAft>
+                <a:spcPct val="0"/>
+              </a:spcAft>
+              <a:defRPr sz="3600" b="1">
+                <a:solidFill>
+                  <a:srgbClr val="0C2D83"/>
+                </a:solidFill>
+                <a:latin typeface="Arial" charset="0"/>
+              </a:defRPr>
+            </a:lvl7pPr>
+            <a:lvl8pPr marL="1371600" algn="r" rtl="0" fontAlgn="base">
+              <a:spcBef>
+                <a:spcPct val="0"/>
+              </a:spcBef>
+              <a:spcAft>
+                <a:spcPct val="0"/>
+              </a:spcAft>
+              <a:defRPr sz="3600" b="1">
+                <a:solidFill>
+                  <a:srgbClr val="0C2D83"/>
+                </a:solidFill>
+                <a:latin typeface="Arial" charset="0"/>
+              </a:defRPr>
+            </a:lvl8pPr>
+            <a:lvl9pPr marL="1828800" algn="r" rtl="0" fontAlgn="base">
+              <a:spcBef>
+                <a:spcPct val="0"/>
+              </a:spcBef>
+              <a:spcAft>
+                <a:spcPct val="0"/>
+              </a:spcAft>
+              <a:defRPr sz="3600" b="1">
+                <a:solidFill>
+                  <a:srgbClr val="0C2D83"/>
+                </a:solidFill>
+                <a:latin typeface="Arial" charset="0"/>
+              </a:defRPr>
+            </a:lvl9pPr>
+          </a:lstStyle>
+          <a:p>
+            <a:pPr algn="ctr"/>
+            <a:r>
+              <a:rPr lang="en-US" sz="4000" kern="0" dirty="0">
+                <a:effectLst/>
+                <a:latin typeface="Trebuchet MS" panose="020B0603020202020204" pitchFamily="34" charset="0"/>
+              </a:rPr>
+              <a:t>ECE 383 – Embedded Computer Systems II</a:t>
+            </a:r>
+            <a:br>
+              <a:rPr lang="en-US" sz="4000" kern="0" dirty="0">
+                <a:effectLst/>
+                <a:latin typeface="Trebuchet MS" panose="020B0603020202020204" pitchFamily="34" charset="0"/>
+              </a:rPr>
+            </a:br>
+            <a:r>
+              <a:rPr lang="en-US" sz="3600" kern="0" dirty="0">
+                <a:effectLst/>
+                <a:latin typeface="Trebuchet MS" panose="020B0603020202020204" pitchFamily="34" charset="0"/>
+              </a:rPr>
+              <a:t>Lecture 23 - Direct Digital Synthesis</a:t>
+            </a:r>
+          </a:p>
+        </p:txBody>
+      </p:sp>
+      <p:sp>
+        <p:nvSpPr>
+          <p:cNvPr id="6" name="Slide Number Placeholder 21"/>
           <p:cNvSpPr txBox="1">
-            <a:spLocks noChangeArrowheads="1"/>
+            <a:spLocks/>
+          </p:cNvSpPr>
+          <p:nvPr/>
+        </p:nvSpPr>
+        <p:spPr>
+          <a:xfrm>
+            <a:off x="8551335" y="6521450"/>
+            <a:ext cx="592667" cy="336550"/>
+          </a:xfrm>
+          <a:prstGeom prst="rect">
+            <a:avLst/>
+          </a:prstGeom>
+        </p:spPr>
+        <p:txBody>
+          <a:bodyPr lIns="91440" tIns="45720" rIns="91440" bIns="45720"/>
+          <a:lstStyle>
+            <a:defPPr>
+              <a:defRPr lang="en-US"/>
+            </a:defPPr>
+            <a:lvl1pPr algn="l" rtl="0" fontAlgn="base">
+              <a:spcBef>
+                <a:spcPct val="0"/>
+              </a:spcBef>
+              <a:spcAft>
+                <a:spcPct val="0"/>
+              </a:spcAft>
+              <a:defRPr sz="1400" kern="1200">
+                <a:solidFill>
+                  <a:schemeClr val="tx1"/>
+                </a:solidFill>
+                <a:latin typeface="Arial" charset="0"/>
+                <a:ea typeface="+mn-ea"/>
+                <a:cs typeface="+mn-cs"/>
+              </a:defRPr>
+            </a:lvl1pPr>
+            <a:lvl2pPr marL="457200" algn="l" rtl="0" fontAlgn="base">
+              <a:spcBef>
+                <a:spcPct val="0"/>
+              </a:spcBef>
+              <a:spcAft>
+                <a:spcPct val="0"/>
+              </a:spcAft>
+              <a:defRPr sz="1400" kern="1200">
+                <a:solidFill>
+                  <a:schemeClr val="tx1"/>
+                </a:solidFill>
+                <a:latin typeface="Arial" charset="0"/>
+                <a:ea typeface="+mn-ea"/>
+                <a:cs typeface="+mn-cs"/>
+              </a:defRPr>
+            </a:lvl2pPr>
+            <a:lvl3pPr marL="914400" algn="l" rtl="0" fontAlgn="base">
+              <a:spcBef>
+                <a:spcPct val="0"/>
+              </a:spcBef>
+              <a:spcAft>
+                <a:spcPct val="0"/>
+              </a:spcAft>
+              <a:defRPr sz="1400" kern="1200">
+                <a:solidFill>
+                  <a:schemeClr val="tx1"/>
+                </a:solidFill>
+                <a:latin typeface="Arial" charset="0"/>
+                <a:ea typeface="+mn-ea"/>
+                <a:cs typeface="+mn-cs"/>
+              </a:defRPr>
+            </a:lvl3pPr>
+            <a:lvl4pPr marL="1371600" algn="l" rtl="0" fontAlgn="base">
+              <a:spcBef>
+                <a:spcPct val="0"/>
+              </a:spcBef>
+              <a:spcAft>
+                <a:spcPct val="0"/>
+              </a:spcAft>
+              <a:defRPr sz="1400" kern="1200">
+                <a:solidFill>
+                  <a:schemeClr val="tx1"/>
+                </a:solidFill>
+                <a:latin typeface="Arial" charset="0"/>
+                <a:ea typeface="+mn-ea"/>
+                <a:cs typeface="+mn-cs"/>
+              </a:defRPr>
+            </a:lvl4pPr>
+            <a:lvl5pPr marL="1828800" algn="l" rtl="0" fontAlgn="base">
+              <a:spcBef>
+                <a:spcPct val="0"/>
+              </a:spcBef>
+              <a:spcAft>
+                <a:spcPct val="0"/>
+              </a:spcAft>
+              <a:defRPr sz="1400" kern="1200">
+                <a:solidFill>
+                  <a:schemeClr val="tx1"/>
+                </a:solidFill>
+                <a:latin typeface="Arial" charset="0"/>
+                <a:ea typeface="+mn-ea"/>
+                <a:cs typeface="+mn-cs"/>
+              </a:defRPr>
+            </a:lvl5pPr>
+            <a:lvl6pPr marL="2286000" algn="l" defTabSz="914400" rtl="0" eaLnBrk="1" latinLnBrk="0" hangingPunct="1">
+              <a:defRPr sz="1400" kern="1200">
+                <a:solidFill>
+                  <a:schemeClr val="tx1"/>
+                </a:solidFill>
+                <a:latin typeface="Arial" charset="0"/>
+                <a:ea typeface="+mn-ea"/>
+                <a:cs typeface="+mn-cs"/>
+              </a:defRPr>
+            </a:lvl6pPr>
+            <a:lvl7pPr marL="2743200" algn="l" defTabSz="914400" rtl="0" eaLnBrk="1" latinLnBrk="0" hangingPunct="1">
+              <a:defRPr sz="1400" kern="1200">
+                <a:solidFill>
+                  <a:schemeClr val="tx1"/>
+                </a:solidFill>
+                <a:latin typeface="Arial" charset="0"/>
+                <a:ea typeface="+mn-ea"/>
+                <a:cs typeface="+mn-cs"/>
+              </a:defRPr>
+            </a:lvl7pPr>
+            <a:lvl8pPr marL="3200400" algn="l" defTabSz="914400" rtl="0" eaLnBrk="1" latinLnBrk="0" hangingPunct="1">
+              <a:defRPr sz="1400" kern="1200">
+                <a:solidFill>
+                  <a:schemeClr val="tx1"/>
+                </a:solidFill>
+                <a:latin typeface="Arial" charset="0"/>
+                <a:ea typeface="+mn-ea"/>
+                <a:cs typeface="+mn-cs"/>
+              </a:defRPr>
+            </a:lvl8pPr>
+            <a:lvl9pPr marL="3657600" algn="l" defTabSz="914400" rtl="0" eaLnBrk="1" latinLnBrk="0" hangingPunct="1">
+              <a:defRPr sz="1400" kern="1200">
+                <a:solidFill>
+                  <a:schemeClr val="tx1"/>
+                </a:solidFill>
+                <a:latin typeface="Arial" charset="0"/>
+                <a:ea typeface="+mn-ea"/>
+                <a:cs typeface="+mn-cs"/>
+              </a:defRPr>
+            </a:lvl9pPr>
+          </a:lstStyle>
+          <a:p>
+            <a:pPr algn="ctr">
+              <a:defRPr/>
+            </a:pPr>
+            <a:fld id="{D7580031-58D8-4E1D-BF97-18519902E6F9}" type="slidenum">
+              <a:rPr lang="en-US" smtClean="0">
+                <a:solidFill>
+                  <a:srgbClr val="000000"/>
+                </a:solidFill>
+                <a:latin typeface="Trebuchet MS" panose="020B0603020202020204" pitchFamily="34" charset="0"/>
+              </a:rPr>
+              <a:pPr algn="ctr">
+                <a:defRPr/>
+              </a:pPr>
+              <a:t>1</a:t>
+            </a:fld>
+            <a:endParaRPr lang="en-US" dirty="0">
+              <a:solidFill>
+                <a:srgbClr val="000000"/>
+              </a:solidFill>
+              <a:latin typeface="Trebuchet MS" panose="020B0603020202020204" pitchFamily="34" charset="0"/>
+            </a:endParaRPr>
+          </a:p>
+        </p:txBody>
+      </p:sp>
+      <p:sp>
+        <p:nvSpPr>
+          <p:cNvPr id="5" name="Line 14"/>
+          <p:cNvSpPr>
+            <a:spLocks noChangeShapeType="1"/>
           </p:cNvSpPr>
           <p:nvPr/>
         </p:nvSpPr>
         <p:spPr bwMode="auto">
           <a:xfrm>
-            <a:off x="1610251" y="500063"/>
-            <a:ext cx="5872698" cy="707886"/>
+            <a:off x="382200" y="6316000"/>
+            <a:ext cx="8382000" cy="0"/>
+          </a:xfrm>
+          <a:prstGeom prst="line">
+            <a:avLst/>
+          </a:prstGeom>
+          <a:noFill/>
+          <a:ln w="57150">
+            <a:solidFill>
+              <a:schemeClr val="bg1">
+                <a:lumMod val="65000"/>
+              </a:schemeClr>
+            </a:solidFill>
+            <a:round/>
+            <a:headEnd/>
+            <a:tailEnd/>
+          </a:ln>
+          <a:effectLst/>
+        </p:spPr>
+        <p:txBody>
+          <a:bodyPr wrap="none" lIns="91440" tIns="45720" rIns="91440" bIns="45720" anchor="ctr"/>
+          <a:lstStyle/>
+          <a:p>
+            <a:pPr algn="ctr" eaLnBrk="0" hangingPunct="0">
+              <a:spcBef>
+                <a:spcPct val="0"/>
+              </a:spcBef>
+              <a:defRPr/>
+            </a:pPr>
+            <a:endParaRPr lang="en-US" sz="1400" dirty="0">
+              <a:solidFill>
+                <a:srgbClr val="000000"/>
+              </a:solidFill>
+              <a:latin typeface="Arial" charset="0"/>
+            </a:endParaRPr>
+          </a:p>
+        </p:txBody>
+      </p:sp>
+      <p:sp>
+        <p:nvSpPr>
+          <p:cNvPr id="7" name="Line 14"/>
+          <p:cNvSpPr>
+            <a:spLocks noChangeShapeType="1"/>
+          </p:cNvSpPr>
+          <p:nvPr/>
+        </p:nvSpPr>
+        <p:spPr bwMode="auto">
+          <a:xfrm>
+            <a:off x="382200" y="1567588"/>
+            <a:ext cx="8382000" cy="0"/>
+          </a:xfrm>
+          <a:prstGeom prst="line">
+            <a:avLst/>
+          </a:prstGeom>
+          <a:noFill/>
+          <a:ln w="57150">
+            <a:solidFill>
+              <a:schemeClr val="bg1">
+                <a:lumMod val="65000"/>
+              </a:schemeClr>
+            </a:solidFill>
+            <a:round/>
+            <a:headEnd/>
+            <a:tailEnd/>
+          </a:ln>
+          <a:effectLst/>
+        </p:spPr>
+        <p:txBody>
+          <a:bodyPr wrap="none" lIns="91440" tIns="45720" rIns="91440" bIns="45720" anchor="ctr"/>
+          <a:lstStyle/>
+          <a:p>
+            <a:pPr algn="ctr" eaLnBrk="0" hangingPunct="0">
+              <a:spcBef>
+                <a:spcPct val="0"/>
+              </a:spcBef>
+              <a:defRPr/>
+            </a:pPr>
+            <a:endParaRPr lang="en-US" sz="1400" dirty="0">
+              <a:solidFill>
+                <a:srgbClr val="000000"/>
+              </a:solidFill>
+              <a:latin typeface="Arial" charset="0"/>
+            </a:endParaRPr>
+          </a:p>
+        </p:txBody>
+      </p:sp>
+      <p:sp>
+        <p:nvSpPr>
+          <p:cNvPr id="9" name="Rectangle 10"/>
+          <p:cNvSpPr>
+            <a:spLocks noGrp="1" noChangeArrowheads="1"/>
+          </p:cNvSpPr>
+          <p:nvPr>
+            <p:ph type="subTitle" idx="1"/>
+          </p:nvPr>
+        </p:nvSpPr>
+        <p:spPr>
+          <a:xfrm>
+            <a:off x="4159624" y="4743733"/>
+            <a:ext cx="4508500" cy="1489075"/>
+          </a:xfrm>
+        </p:spPr>
+        <p:txBody>
+          <a:bodyPr anchor="ctr">
+            <a:normAutofit lnSpcReduction="10000"/>
+          </a:bodyPr>
+          <a:lstStyle>
+            <a:lvl1pPr marL="0" indent="0" algn="r">
+              <a:buFont typeface="Wingdings" pitchFamily="2" charset="2"/>
+              <a:buNone/>
+              <a:defRPr/>
+            </a:lvl1pPr>
+          </a:lstStyle>
+          <a:p>
+            <a:r>
+              <a:rPr lang="en-US" dirty="0" smtClean="0"/>
+              <a:t>Maj Jeffrey </a:t>
+            </a:r>
+            <a:r>
+              <a:rPr lang="en-US" dirty="0"/>
+              <a:t>Falkinburg</a:t>
+            </a:r>
+            <a:br>
+              <a:rPr lang="en-US" dirty="0"/>
+            </a:br>
+            <a:r>
+              <a:rPr lang="en-US" dirty="0"/>
+              <a:t>Room 2E46E</a:t>
+            </a:r>
+            <a:br>
+              <a:rPr lang="en-US" dirty="0"/>
+            </a:br>
+            <a:r>
+              <a:rPr lang="en-US" dirty="0" smtClean="0"/>
+              <a:t>333-9193</a:t>
+            </a:r>
+          </a:p>
+        </p:txBody>
+      </p:sp>
+      <p:pic>
+        <p:nvPicPr>
+          <p:cNvPr id="1026" name="Picture 2" descr="https://sharepoint.usafa.edu/hq/CM/Shared%20Documents/Logo/USAFA%20Logo%20v%203%20line%20CMYK.png"/>
+          <p:cNvPicPr>
+            <a:picLocks noChangeAspect="1" noChangeArrowheads="1"/>
+          </p:cNvPicPr>
+          <p:nvPr/>
+        </p:nvPicPr>
+        <p:blipFill>
+          <a:blip r:embed="rId2" cstate="print">
+            <a:extLst>
+              <a:ext uri="{28A0092B-C50C-407E-A947-70E740481C1C}">
+                <a14:useLocalDpi xmlns:a14="http://schemas.microsoft.com/office/drawing/2010/main" val="0"/>
+              </a:ext>
+            </a:extLst>
+          </a:blip>
+          <a:srcRect/>
+          <a:stretch>
+            <a:fillRect/>
+          </a:stretch>
+        </p:blipFill>
+        <p:spPr bwMode="auto">
+          <a:xfrm>
+            <a:off x="480812" y="2281517"/>
+            <a:ext cx="2973096" cy="3389753"/>
           </a:xfrm>
           <a:prstGeom prst="rect">
             <a:avLst/>
           </a:prstGeom>
           <a:noFill/>
-          <a:ln w="9525">
-            <a:noFill/>
-            <a:miter lim="800000"/>
-            <a:headEnd/>
-            <a:tailEnd/>
-          </a:ln>
-          <a:effectLst/>
+          <a:extLst>
+            <a:ext uri="{909E8E84-426E-40DD-AFC4-6F175D3DCCD1}">
+              <a14:hiddenFill xmlns:a14="http://schemas.microsoft.com/office/drawing/2010/main">
+                <a:solidFill>
+                  <a:srgbClr val="FFFFFF"/>
+                </a:solidFill>
+              </a14:hiddenFill>
+            </a:ext>
+          </a:extLst>
         </p:spPr>
-        <p:txBody>
-          <a:bodyPr wrap="none">
-            <a:spAutoFit/>
-          </a:bodyPr>
-          <a:lstStyle/>
-          <a:p>
-            <a:pPr algn="ctr" fontAlgn="auto">
-              <a:spcBef>
-                <a:spcPts val="0"/>
-              </a:spcBef>
-              <a:spcAft>
-                <a:spcPts val="0"/>
-              </a:spcAft>
-            </a:pPr>
-            <a:r>
-              <a:rPr lang="en-US" sz="4000" b="1" i="1" dirty="0">
-                <a:solidFill>
-                  <a:prstClr val="black"/>
-                </a:solidFill>
-                <a:latin typeface="Calibri"/>
-              </a:rPr>
-              <a:t>HQ U.S. Air Force Academy</a:t>
-            </a:r>
-          </a:p>
-        </p:txBody>
-      </p:sp>
-      <p:sp>
-        <p:nvSpPr>
-          <p:cNvPr id="4103" name="Text Box 7"/>
-          <p:cNvSpPr txBox="1">
-            <a:spLocks noChangeArrowheads="1"/>
-          </p:cNvSpPr>
-          <p:nvPr/>
-        </p:nvSpPr>
-        <p:spPr bwMode="auto">
-          <a:xfrm>
-            <a:off x="1270000" y="6444160"/>
-            <a:ext cx="6553200" cy="396875"/>
-          </a:xfrm>
-          <a:prstGeom prst="rect">
-            <a:avLst/>
-          </a:prstGeom>
-          <a:noFill/>
-          <a:ln w="9525">
-            <a:noFill/>
-            <a:miter lim="800000"/>
-            <a:headEnd/>
-            <a:tailEnd/>
-          </a:ln>
-          <a:effectLst/>
-        </p:spPr>
-        <p:txBody>
-          <a:bodyPr>
-            <a:spAutoFit/>
-          </a:bodyPr>
-          <a:lstStyle/>
-          <a:p>
-            <a:pPr algn="ctr" fontAlgn="auto">
-              <a:spcAft>
-                <a:spcPts val="0"/>
-              </a:spcAft>
-            </a:pPr>
-            <a:r>
-              <a:rPr lang="en-US" sz="2000" b="1" i="1" dirty="0">
-                <a:solidFill>
-                  <a:prstClr val="black"/>
-                </a:solidFill>
-                <a:latin typeface="Century Schoolbook" pitchFamily="18" charset="0"/>
-              </a:rPr>
-              <a:t>I n t e g r i t y  -  S e r v i c e  -  E x c e l </a:t>
-            </a:r>
-            <a:r>
-              <a:rPr lang="en-US" sz="2000" b="1" i="1" dirty="0" err="1">
-                <a:solidFill>
-                  <a:prstClr val="black"/>
-                </a:solidFill>
-                <a:latin typeface="Century Schoolbook" pitchFamily="18" charset="0"/>
-              </a:rPr>
-              <a:t>l</a:t>
-            </a:r>
-            <a:r>
-              <a:rPr lang="en-US" sz="2000" b="1" i="1" dirty="0">
-                <a:solidFill>
-                  <a:prstClr val="black"/>
-                </a:solidFill>
-                <a:latin typeface="Century Schoolbook" pitchFamily="18" charset="0"/>
-              </a:rPr>
-              <a:t> e n c e</a:t>
-            </a:r>
-          </a:p>
-        </p:txBody>
-      </p:sp>
+      </p:pic>
     </p:spTree>
     <p:extLst>
       <p:ext uri="{BB962C8B-B14F-4D97-AF65-F5344CB8AC3E}">
-        <p14:creationId xmlns:p14="http://schemas.microsoft.com/office/powerpoint/2010/main" val="2545300548"/>
+        <p14:creationId xmlns:p14="http://schemas.microsoft.com/office/powerpoint/2010/main" val="3244333081"/>
       </p:ext>
     </p:extLst>
   </p:cSld>
   <p:clrMapOvr>
     <a:masterClrMapping/>
   </p:clrMapOvr>
+  <mc:AlternateContent xmlns:mc="http://schemas.openxmlformats.org/markup-compatibility/2006" xmlns:p14="http://schemas.microsoft.com/office/powerpoint/2010/main">
+    <mc:Choice Requires="p14">
+      <p:transition spd="slow" p14:dur="2000"/>
+    </mc:Choice>
+    <mc:Fallback xmlns="">
+      <p:transition spd="slow"/>
+    </mc:Fallback>
+  </mc:AlternateContent>
   <p:timing>
     <p:tnLst>
       <p:par>
@@ -8906,12 +9152,19 @@
           <a:p>
             <a:r>
               <a:rPr lang="en-US" b="0" dirty="0"/>
-              <a:t>The resulting 16-bit number can be manipulated as a whole with some minor book keeping to keep track of the decimal point</a:t>
+              <a:t>The resulting 16-bit number can be manipulated as a whole with some minor book keeping to keep track of the </a:t>
             </a:r>
             <a:r>
               <a:rPr lang="en-US" b="0" dirty="0" smtClean="0"/>
-              <a:t> </a:t>
-            </a:r>
+              <a:t>binary point </a:t>
+            </a:r>
+          </a:p>
+          <a:p>
+            <a:r>
+              <a:rPr lang="en-US" b="0" dirty="0" smtClean="0"/>
+              <a:t>This is Q8.8 format</a:t>
+            </a:r>
+            <a:endParaRPr lang="en-US" b="0" dirty="0" smtClean="0"/>
           </a:p>
           <a:p>
             <a:endParaRPr lang="en-US" b="0" dirty="0" smtClean="0"/>
@@ -8963,7 +9216,7 @@
     </p:spTree>
     <p:extLst>
       <p:ext uri="{BB962C8B-B14F-4D97-AF65-F5344CB8AC3E}">
-        <p14:creationId xmlns:p14="http://schemas.microsoft.com/office/powerpoint/2010/main" val="2317855813"/>
+        <p14:creationId xmlns:p14="http://schemas.microsoft.com/office/powerpoint/2010/main" val="3025690569"/>
       </p:ext>
     </p:extLst>
   </p:cSld>
@@ -9125,6 +9378,55 @@
                       </p:childTnLst>
                     </p:cTn>
                   </p:par>
+                  <p:par>
+                    <p:cTn id="15" fill="hold">
+                      <p:stCondLst>
+                        <p:cond delay="indefinite"/>
+                      </p:stCondLst>
+                      <p:childTnLst>
+                        <p:par>
+                          <p:cTn id="16" fill="hold">
+                            <p:stCondLst>
+                              <p:cond delay="0"/>
+                            </p:stCondLst>
+                            <p:childTnLst>
+                              <p:par>
+                                <p:cTn id="17" presetID="1" presetClass="entr" presetSubtype="0" fill="hold" nodeType="clickEffect">
+                                  <p:stCondLst>
+                                    <p:cond delay="0"/>
+                                  </p:stCondLst>
+                                  <p:childTnLst>
+                                    <p:set>
+                                      <p:cBhvr>
+                                        <p:cTn id="18" dur="1" fill="hold">
+                                          <p:stCondLst>
+                                            <p:cond delay="0"/>
+                                          </p:stCondLst>
+                                        </p:cTn>
+                                        <p:tgtEl>
+                                          <p:spTgt spid="4">
+                                            <p:txEl>
+                                              <p:pRg st="6" end="6"/>
+                                            </p:txEl>
+                                          </p:spTgt>
+                                        </p:tgtEl>
+                                        <p:attrNameLst>
+                                          <p:attrName>style.visibility</p:attrName>
+                                        </p:attrNameLst>
+                                      </p:cBhvr>
+                                      <p:to>
+                                        <p:strVal val="visible"/>
+                                      </p:to>
+                                    </p:set>
+                                  </p:childTnLst>
+                                </p:cTn>
+                              </p:par>
+                            </p:childTnLst>
+                          </p:cTn>
+                        </p:par>
+                      </p:childTnLst>
+                    </p:cTn>
+                  </p:par>
                 </p:childTnLst>
               </p:cTn>
               <p:prevCondLst>
@@ -9230,10 +9532,9 @@
               <a:t>and </a:t>
             </a:r>
             <a:r>
-              <a:rPr lang="en-US" b="0" smtClean="0"/>
+              <a:rPr lang="en-US" b="0" dirty="0" smtClean="0"/>
               <a:t>45.25 in Q8.8 format and then add them.</a:t>
             </a:r>
-            <a:endParaRPr lang="en-US" b="0" dirty="0" smtClean="0"/>
           </a:p>
           <a:p>
             <a:pPr marL="0" indent="0">
@@ -9307,7 +9608,13 @@
             <a:endParaRPr lang="en-US" b="0" dirty="0" smtClean="0"/>
           </a:p>
           <a:p>
-            <a:endParaRPr lang="en-US" b="0" dirty="0" smtClean="0"/>
+            <a:endParaRPr lang="en-US" b="0" dirty="0"/>
+          </a:p>
+          <a:p>
+            <a:r>
+              <a:rPr lang="en-US" b="0" dirty="0" smtClean="0"/>
+              <a:t>What about the Binary Point?</a:t>
+            </a:r>
           </a:p>
         </p:txBody>
       </p:sp>
@@ -9567,6 +9874,55 @@
                       </p:childTnLst>
                     </p:cTn>
                   </p:par>
+                  <p:par>
+                    <p:cTn id="19" fill="hold">
+                      <p:stCondLst>
+                        <p:cond delay="indefinite"/>
+                      </p:stCondLst>
+                      <p:childTnLst>
+                        <p:par>
+                          <p:cTn id="20" fill="hold">
+                            <p:stCondLst>
+                              <p:cond delay="0"/>
+                            </p:stCondLst>
+                            <p:childTnLst>
+                              <p:par>
+                                <p:cTn id="21" presetID="1" presetClass="entr" presetSubtype="0" fill="hold" nodeType="clickEffect">
+                                  <p:stCondLst>
+                                    <p:cond delay="0"/>
+                                  </p:stCondLst>
+                                  <p:childTnLst>
+                                    <p:set>
+                                      <p:cBhvr>
+                                        <p:cTn id="22" dur="1" fill="hold">
+                                          <p:stCondLst>
+                                            <p:cond delay="0"/>
+                                          </p:stCondLst>
+                                        </p:cTn>
+                                        <p:tgtEl>
+                                          <p:spTgt spid="4">
+                                            <p:txEl>
+                                              <p:pRg st="7" end="7"/>
+                                            </p:txEl>
+                                          </p:spTgt>
+                                        </p:tgtEl>
+                                        <p:attrNameLst>
+                                          <p:attrName>style.visibility</p:attrName>
+                                        </p:attrNameLst>
+                                      </p:cBhvr>
+                                      <p:to>
+                                        <p:strVal val="visible"/>
+                                      </p:to>
+                                    </p:set>
+                                  </p:childTnLst>
+                                </p:cTn>
+                              </p:par>
+                            </p:childTnLst>
+                          </p:cTn>
+                        </p:par>
+                      </p:childTnLst>
+                    </p:cTn>
+                  </p:par>
                 </p:childTnLst>
               </p:cTn>
               <p:prevCondLst>
@@ -9774,7 +10130,15 @@
             </a:r>
             <a:r>
               <a:rPr lang="en-US" b="0" dirty="0"/>
-              <a:t>that 23 have a 4-bit representation where the decimal point resides in the middle of the number. </a:t>
+              <a:t>that 23 have a 4-bit representation where the </a:t>
+            </a:r>
+            <a:r>
+              <a:rPr lang="en-US" b="0" dirty="0" smtClean="0"/>
+              <a:t>binary point </a:t>
+            </a:r>
+            <a:r>
+              <a:rPr lang="en-US" b="0" dirty="0"/>
+              <a:t>resides in the middle of the number. </a:t>
             </a:r>
             <a:endParaRPr lang="en-US" b="0" dirty="0" smtClean="0"/>
           </a:p>
@@ -10779,10 +11143,9 @@
           <a:lstStyle/>
           <a:p>
             <a:r>
-              <a:rPr lang="en-US" cap="none" dirty="0" smtClean="0"/>
-              <a:t>Phase Increment</a:t>
-            </a:r>
-            <a:endParaRPr lang="en-US" cap="none" dirty="0"/>
+              <a:rPr lang="en-US" cap="none" dirty="0"/>
+              <a:t>Direct Digital Synthesis</a:t>
+            </a:r>
           </a:p>
         </p:txBody>
       </p:sp>
@@ -10845,7 +11208,7 @@
     </p:spTree>
     <p:extLst>
       <p:ext uri="{BB962C8B-B14F-4D97-AF65-F5344CB8AC3E}">
-        <p14:creationId xmlns:p14="http://schemas.microsoft.com/office/powerpoint/2010/main" val="2315610422"/>
+        <p14:creationId xmlns:p14="http://schemas.microsoft.com/office/powerpoint/2010/main" val="2890013489"/>
       </p:ext>
     </p:extLst>
   </p:cSld>
@@ -10895,10 +11258,9 @@
           <a:lstStyle/>
           <a:p>
             <a:r>
-              <a:rPr lang="en-US" dirty="0" smtClean="0"/>
-              <a:t>Phase Increment</a:t>
-            </a:r>
-            <a:endParaRPr lang="en-US" dirty="0"/>
+              <a:rPr lang="en-US" dirty="0"/>
+              <a:t>Direct Digital Synthesis</a:t>
+            </a:r>
           </a:p>
         </p:txBody>
       </p:sp>
@@ -10924,86 +11286,47 @@
           <a:p>
             <a:r>
               <a:rPr lang="en-US" b="0" dirty="0"/>
-              <a:t>Lets say that you could provide a new sample from the sin table at 48kHZ (through an interrupt) to the codec. </a:t>
-            </a:r>
+              <a:t>Direct Digital Synthesis (DDS) is a technique to create periodic waveforms with very precise frequency control using a system with a fixed clock frequency</a:t>
+            </a:r>
+            <a:r>
+              <a:rPr lang="en-US" b="0" dirty="0" smtClean="0"/>
+              <a:t>. </a:t>
+            </a:r>
+          </a:p>
+          <a:p>
+            <a:r>
+              <a:rPr lang="en-US" b="0" dirty="0" smtClean="0"/>
+              <a:t>The periodic function is stored in a look-up table like the following for a sin wave.</a:t>
+            </a:r>
+          </a:p>
+          <a:p>
             <a:endParaRPr lang="en-US" b="0" dirty="0" smtClean="0"/>
           </a:p>
           <a:p>
-            <a:r>
-              <a:rPr lang="en-US" b="0" dirty="0" smtClean="0"/>
-              <a:t>If </a:t>
-            </a:r>
-            <a:r>
-              <a:rPr lang="en-US" b="0" dirty="0"/>
-              <a:t>you incremented the pointer in the sin table by 1 on every </a:t>
-            </a:r>
-            <a:r>
-              <a:rPr lang="en-US" b="0" dirty="0" smtClean="0"/>
-              <a:t>interrupt. How long to get through the table? </a:t>
-            </a:r>
-          </a:p>
-          <a:p>
-            <a:pPr marL="406400" lvl="1" indent="0">
+            <a:pPr marL="0" indent="0">
               <a:buNone/>
             </a:pPr>
             <a:r>
-              <a:rPr lang="en-US" dirty="0" smtClean="0"/>
-              <a:t>64*21uS = 1.3mS </a:t>
-            </a:r>
-          </a:p>
-          <a:p>
-            <a:pPr marL="406400" lvl="1" indent="0">
-              <a:buNone/>
-            </a:pPr>
-            <a:r>
-              <a:rPr lang="en-US" dirty="0" smtClean="0"/>
-              <a:t>Generating a sine wave with a frequency of about 750Hz </a:t>
-            </a:r>
-          </a:p>
-          <a:p>
-            <a:r>
-              <a:rPr lang="en-US" b="0" dirty="0" smtClean="0"/>
-              <a:t>If you incremented the pointer in the sin table by 2 every interrupt. How long to get through the table?</a:t>
-            </a:r>
-          </a:p>
-          <a:p>
-            <a:pPr marL="403225" lvl="1" indent="0">
-              <a:buNone/>
-            </a:pPr>
-            <a:r>
-              <a:rPr lang="en-US" dirty="0" smtClean="0"/>
-              <a:t>32*21uS </a:t>
-            </a:r>
-            <a:r>
-              <a:rPr lang="en-US" dirty="0"/>
-              <a:t>= </a:t>
-            </a:r>
-            <a:r>
-              <a:rPr lang="en-US" dirty="0" smtClean="0"/>
-              <a:t>0.65mS</a:t>
-            </a:r>
-          </a:p>
-          <a:p>
-            <a:pPr marL="403225" lvl="1" indent="0">
-              <a:buNone/>
-            </a:pPr>
-            <a:r>
-              <a:rPr lang="en-US" dirty="0" smtClean="0"/>
-              <a:t>Generating </a:t>
-            </a:r>
-            <a:r>
-              <a:rPr lang="en-US" dirty="0"/>
-              <a:t>one period of the sine wave </a:t>
-            </a:r>
-            <a:r>
-              <a:rPr lang="en-US" dirty="0" smtClean="0"/>
-              <a:t>for </a:t>
-            </a:r>
-            <a:r>
-              <a:rPr lang="en-US" dirty="0"/>
-              <a:t>a frequency of about 1.5kHz.</a:t>
-            </a:r>
-            <a:endParaRPr lang="en-US" dirty="0" smtClean="0"/>
+              <a:rPr lang="sv-SE" sz="1600" dirty="0"/>
+              <a:t>int8 sin[64] </a:t>
+            </a:r>
+            <a:r>
+              <a:rPr lang="sv-SE" sz="1600" dirty="0" smtClean="0"/>
+              <a:t>= {</a:t>
+            </a:r>
+            <a:r>
+              <a:rPr lang="sv-SE" sz="1600" dirty="0"/>
+              <a:t>128,141,153,165,177,189,200,210,219,227,235,241,246,250,253,255, </a:t>
+            </a:r>
+            <a:r>
+              <a:rPr lang="sv-SE" sz="1600" dirty="0" smtClean="0"/>
+              <a:t>255,254,252,248,244,238,231,223,214,205,194,183,171,159,147,134, 122,109</a:t>
+            </a:r>
+            <a:r>
+              <a:rPr lang="sv-SE" sz="1600" dirty="0"/>
+              <a:t>, 97, 85, 73, 62, 51, 42, 33, 25, 18, 12, 8, 4, 2, 1, 1, 3, 6, 10, 15, 21, 29, 37, 46, 56, 67, 79, 91,103,115,128};</a:t>
+            </a:r>
+            <a:endParaRPr lang="en-US" sz="1600" b="0" dirty="0"/>
           </a:p>
         </p:txBody>
       </p:sp>
@@ -11040,6 +11363,667 @@
                 <a:defRPr/>
               </a:pPr>
               <a:t>16</a:t>
+            </a:fld>
+            <a:endParaRPr lang="en-US" dirty="0">
+              <a:solidFill>
+                <a:srgbClr val="000000"/>
+              </a:solidFill>
+            </a:endParaRPr>
+          </a:p>
+        </p:txBody>
+      </p:sp>
+    </p:spTree>
+    <p:extLst>
+      <p:ext uri="{BB962C8B-B14F-4D97-AF65-F5344CB8AC3E}">
+        <p14:creationId xmlns:p14="http://schemas.microsoft.com/office/powerpoint/2010/main" val="2217696780"/>
+      </p:ext>
+    </p:extLst>
+  </p:cSld>
+  <p:clrMapOvr>
+    <a:masterClrMapping/>
+  </p:clrMapOvr>
+  <p:timing>
+    <p:tnLst>
+      <p:par>
+        <p:cTn id="1" dur="indefinite" restart="never" nodeType="tmRoot"/>
+      </p:par>
+    </p:tnLst>
+  </p:timing>
+</p:sld>
+</file>
+
+<file path=ppt/slides/slide17.xml><?xml version="1.0" encoding="utf-8"?>
+<p:sld xmlns:a="http://schemas.openxmlformats.org/drawingml/2006/main" xmlns:r="http://schemas.openxmlformats.org/officeDocument/2006/relationships" xmlns:p="http://schemas.openxmlformats.org/presentationml/2006/main">
+  <p:cSld>
+    <p:spTree>
+      <p:nvGrpSpPr>
+        <p:cNvPr id="1" name=""/>
+        <p:cNvGrpSpPr/>
+        <p:nvPr/>
+      </p:nvGrpSpPr>
+      <p:grpSpPr>
+        <a:xfrm>
+          <a:off x="0" y="0"/>
+          <a:ext cx="0" cy="0"/>
+          <a:chOff x="0" y="0"/>
+          <a:chExt cx="0" cy="0"/>
+        </a:xfrm>
+      </p:grpSpPr>
+      <p:sp>
+        <p:nvSpPr>
+          <p:cNvPr id="2" name="Title 1"/>
+          <p:cNvSpPr>
+            <a:spLocks noGrp="1"/>
+          </p:cNvSpPr>
+          <p:nvPr>
+            <p:ph type="title"/>
+          </p:nvPr>
+        </p:nvSpPr>
+        <p:spPr/>
+        <p:txBody>
+          <a:bodyPr/>
+          <a:lstStyle/>
+          <a:p>
+            <a:r>
+              <a:rPr lang="en-US" dirty="0"/>
+              <a:t>Direct Digital Synthesis</a:t>
+            </a:r>
+          </a:p>
+        </p:txBody>
+      </p:sp>
+      <p:sp>
+        <p:nvSpPr>
+          <p:cNvPr id="4" name="Content Placeholder 3"/>
+          <p:cNvSpPr>
+            <a:spLocks noGrp="1"/>
+          </p:cNvSpPr>
+          <p:nvPr>
+            <p:ph idx="1"/>
+          </p:nvPr>
+        </p:nvSpPr>
+        <p:spPr>
+          <a:xfrm>
+            <a:off x="581736" y="1523052"/>
+            <a:ext cx="8131175" cy="4324350"/>
+          </a:xfrm>
+        </p:spPr>
+        <p:txBody>
+          <a:bodyPr/>
+          <a:lstStyle/>
+          <a:p>
+            <a:pPr marL="0" indent="0">
+              <a:buNone/>
+            </a:pPr>
+            <a:r>
+              <a:rPr lang="sv-SE" sz="1600" dirty="0" smtClean="0"/>
+              <a:t>int8 sin[64] = {128,141,153,165,177,189,200,210,219,227,235,241,246,250,253,255, 255,254,252,248,244,238,231,223,214,205,194,183,171,159,147,134, 122,109, 97, 85, 73, 62, 51, 42, 33, 25, 18, 12, 8, 4, 2, 1, 1, 3, 6, 10, 15, 21, 29, 37, 46, 56, 67, 79, 91,103,115,128};</a:t>
+            </a:r>
+          </a:p>
+          <a:p>
+            <a:pPr lvl="0"/>
+            <a:endParaRPr lang="en-US" b="0" dirty="0">
+              <a:solidFill>
+                <a:srgbClr val="000000"/>
+              </a:solidFill>
+            </a:endParaRPr>
+          </a:p>
+          <a:p>
+            <a:pPr lvl="0"/>
+            <a:endParaRPr lang="en-US" b="0" dirty="0" smtClean="0">
+              <a:solidFill>
+                <a:srgbClr val="000000"/>
+              </a:solidFill>
+            </a:endParaRPr>
+          </a:p>
+          <a:p>
+            <a:pPr lvl="0"/>
+            <a:endParaRPr lang="en-US" b="0" dirty="0">
+              <a:solidFill>
+                <a:srgbClr val="000000"/>
+              </a:solidFill>
+            </a:endParaRPr>
+          </a:p>
+          <a:p>
+            <a:pPr lvl="0"/>
+            <a:endParaRPr lang="en-US" b="0" dirty="0" smtClean="0">
+              <a:solidFill>
+                <a:srgbClr val="000000"/>
+              </a:solidFill>
+            </a:endParaRPr>
+          </a:p>
+          <a:p>
+            <a:pPr lvl="0"/>
+            <a:endParaRPr lang="en-US" b="0" dirty="0">
+              <a:solidFill>
+                <a:srgbClr val="000000"/>
+              </a:solidFill>
+            </a:endParaRPr>
+          </a:p>
+          <a:p>
+            <a:pPr lvl="0"/>
+            <a:endParaRPr lang="en-US" b="0" dirty="0" smtClean="0">
+              <a:solidFill>
+                <a:srgbClr val="000000"/>
+              </a:solidFill>
+            </a:endParaRPr>
+          </a:p>
+          <a:p>
+            <a:pPr lvl="1"/>
+            <a:endParaRPr lang="en-US" b="0" dirty="0">
+              <a:solidFill>
+                <a:srgbClr val="000000"/>
+              </a:solidFill>
+            </a:endParaRPr>
+          </a:p>
+          <a:p>
+            <a:pPr lvl="1"/>
+            <a:endParaRPr lang="en-US" b="0" dirty="0" smtClean="0">
+              <a:solidFill>
+                <a:srgbClr val="000000"/>
+              </a:solidFill>
+            </a:endParaRPr>
+          </a:p>
+          <a:p>
+            <a:pPr lvl="0"/>
+            <a:r>
+              <a:rPr lang="en-US" b="0" dirty="0" smtClean="0">
+                <a:solidFill>
+                  <a:srgbClr val="000000"/>
+                </a:solidFill>
+              </a:rPr>
+              <a:t>Table Length is a factor of 2^n (i.e. 2^6 = 64 samples). </a:t>
+            </a:r>
+            <a:endParaRPr lang="en-US" b="0" dirty="0">
+              <a:solidFill>
+                <a:srgbClr val="000000"/>
+              </a:solidFill>
+            </a:endParaRPr>
+          </a:p>
+          <a:p>
+            <a:pPr lvl="0"/>
+            <a:endParaRPr lang="en-US" b="0" dirty="0" smtClean="0">
+              <a:solidFill>
+                <a:srgbClr val="000000"/>
+              </a:solidFill>
+            </a:endParaRPr>
+          </a:p>
+          <a:p>
+            <a:pPr marL="0" indent="0">
+              <a:buNone/>
+            </a:pPr>
+            <a:endParaRPr lang="en-US" sz="1600" b="0" dirty="0"/>
+          </a:p>
+        </p:txBody>
+      </p:sp>
+      <p:sp>
+        <p:nvSpPr>
+          <p:cNvPr id="5" name="Slide Number Placeholder 3"/>
+          <p:cNvSpPr>
+            <a:spLocks noGrp="1"/>
+          </p:cNvSpPr>
+          <p:nvPr>
+            <p:ph type="sldNum" sz="quarter" idx="10"/>
+          </p:nvPr>
+        </p:nvSpPr>
+        <p:spPr>
+          <a:xfrm>
+            <a:off x="6910388" y="6253163"/>
+            <a:ext cx="2133600" cy="476250"/>
+          </a:xfrm>
+        </p:spPr>
+        <p:txBody>
+          <a:bodyPr/>
+          <a:lstStyle/>
+          <a:p>
+            <a:pPr>
+              <a:defRPr/>
+            </a:pPr>
+            <a:fld id="{62D6D4B2-7611-498F-8780-1EDC26277454}" type="slidenum">
+              <a:rPr lang="en-US" smtClean="0">
+                <a:solidFill>
+                  <a:srgbClr val="000000"/>
+                </a:solidFill>
+              </a:rPr>
+              <a:pPr>
+                <a:defRPr/>
+              </a:pPr>
+              <a:t>17</a:t>
+            </a:fld>
+            <a:endParaRPr lang="en-US" dirty="0">
+              <a:solidFill>
+                <a:srgbClr val="000000"/>
+              </a:solidFill>
+            </a:endParaRPr>
+          </a:p>
+        </p:txBody>
+      </p:sp>
+      <p:pic>
+        <p:nvPicPr>
+          <p:cNvPr id="1026" name="Picture 2" descr="http://ece.ninja/383/lecture/img/lecture23-2.png"/>
+          <p:cNvPicPr>
+            <a:picLocks noChangeAspect="1" noChangeArrowheads="1"/>
+          </p:cNvPicPr>
+          <p:nvPr/>
+        </p:nvPicPr>
+        <p:blipFill>
+          <a:blip r:embed="rId2">
+            <a:extLst>
+              <a:ext uri="{28A0092B-C50C-407E-A947-70E740481C1C}">
+                <a14:useLocalDpi xmlns:a14="http://schemas.microsoft.com/office/drawing/2010/main" val="0"/>
+              </a:ext>
+            </a:extLst>
+          </a:blip>
+          <a:srcRect/>
+          <a:stretch>
+            <a:fillRect/>
+          </a:stretch>
+        </p:blipFill>
+        <p:spPr bwMode="auto">
+          <a:xfrm>
+            <a:off x="2168261" y="2586876"/>
+            <a:ext cx="4807479" cy="3488812"/>
+          </a:xfrm>
+          <a:prstGeom prst="rect">
+            <a:avLst/>
+          </a:prstGeom>
+          <a:noFill/>
+          <a:extLst>
+            <a:ext uri="{909E8E84-426E-40DD-AFC4-6F175D3DCCD1}">
+              <a14:hiddenFill xmlns:a14="http://schemas.microsoft.com/office/drawing/2010/main">
+                <a:solidFill>
+                  <a:srgbClr val="FFFFFF"/>
+                </a:solidFill>
+              </a14:hiddenFill>
+            </a:ext>
+          </a:extLst>
+        </p:spPr>
+      </p:pic>
+    </p:spTree>
+    <p:extLst>
+      <p:ext uri="{BB962C8B-B14F-4D97-AF65-F5344CB8AC3E}">
+        <p14:creationId xmlns:p14="http://schemas.microsoft.com/office/powerpoint/2010/main" val="1881852914"/>
+      </p:ext>
+    </p:extLst>
+  </p:cSld>
+  <p:clrMapOvr>
+    <a:masterClrMapping/>
+  </p:clrMapOvr>
+  <p:timing>
+    <p:tnLst>
+      <p:par>
+        <p:cTn id="1" dur="indefinite" restart="never" nodeType="tmRoot">
+          <p:childTnLst>
+            <p:seq concurrent="1" nextAc="seek">
+              <p:cTn id="2" dur="indefinite" nodeType="mainSeq">
+                <p:childTnLst>
+                  <p:par>
+                    <p:cTn id="3" fill="hold">
+                      <p:stCondLst>
+                        <p:cond delay="indefinite"/>
+                      </p:stCondLst>
+                      <p:childTnLst>
+                        <p:par>
+                          <p:cTn id="4" fill="hold">
+                            <p:stCondLst>
+                              <p:cond delay="0"/>
+                            </p:stCondLst>
+                            <p:childTnLst>
+                              <p:par>
+                                <p:cTn id="5" presetID="1" presetClass="entr" presetSubtype="0" fill="hold" nodeType="clickEffect">
+                                  <p:stCondLst>
+                                    <p:cond delay="0"/>
+                                  </p:stCondLst>
+                                  <p:childTnLst>
+                                    <p:set>
+                                      <p:cBhvr>
+                                        <p:cTn id="6" dur="1" fill="hold">
+                                          <p:stCondLst>
+                                            <p:cond delay="0"/>
+                                          </p:stCondLst>
+                                        </p:cTn>
+                                        <p:tgtEl>
+                                          <p:spTgt spid="4">
+                                            <p:txEl>
+                                              <p:pRg st="9" end="9"/>
+                                            </p:txEl>
+                                          </p:spTgt>
+                                        </p:tgtEl>
+                                        <p:attrNameLst>
+                                          <p:attrName>style.visibility</p:attrName>
+                                        </p:attrNameLst>
+                                      </p:cBhvr>
+                                      <p:to>
+                                        <p:strVal val="visible"/>
+                                      </p:to>
+                                    </p:set>
+                                  </p:childTnLst>
+                                </p:cTn>
+                              </p:par>
+                            </p:childTnLst>
+                          </p:cTn>
+                        </p:par>
+                      </p:childTnLst>
+                    </p:cTn>
+                  </p:par>
+                </p:childTnLst>
+              </p:cTn>
+              <p:prevCondLst>
+                <p:cond evt="onPrev" delay="0">
+                  <p:tgtEl>
+                    <p:sldTgt/>
+                  </p:tgtEl>
+                </p:cond>
+              </p:prevCondLst>
+              <p:nextCondLst>
+                <p:cond evt="onNext" delay="0">
+                  <p:tgtEl>
+                    <p:sldTgt/>
+                  </p:tgtEl>
+                </p:cond>
+              </p:nextCondLst>
+            </p:seq>
+          </p:childTnLst>
+        </p:cTn>
+      </p:par>
+    </p:tnLst>
+  </p:timing>
+</p:sld>
+</file>
+
+<file path=ppt/slides/slide18.xml><?xml version="1.0" encoding="utf-8"?>
+<p:sld xmlns:a="http://schemas.openxmlformats.org/drawingml/2006/main" xmlns:r="http://schemas.openxmlformats.org/officeDocument/2006/relationships" xmlns:p="http://schemas.openxmlformats.org/presentationml/2006/main">
+  <p:cSld>
+    <p:spTree>
+      <p:nvGrpSpPr>
+        <p:cNvPr id="1" name=""/>
+        <p:cNvGrpSpPr/>
+        <p:nvPr/>
+      </p:nvGrpSpPr>
+      <p:grpSpPr>
+        <a:xfrm>
+          <a:off x="0" y="0"/>
+          <a:ext cx="0" cy="0"/>
+          <a:chOff x="0" y="0"/>
+          <a:chExt cx="0" cy="0"/>
+        </a:xfrm>
+      </p:grpSpPr>
+      <p:sp>
+        <p:nvSpPr>
+          <p:cNvPr id="6" name="Title 5"/>
+          <p:cNvSpPr>
+            <a:spLocks noGrp="1"/>
+          </p:cNvSpPr>
+          <p:nvPr>
+            <p:ph type="title"/>
+          </p:nvPr>
+        </p:nvSpPr>
+        <p:spPr/>
+        <p:txBody>
+          <a:bodyPr anchor="ctr" anchorCtr="0"/>
+          <a:lstStyle/>
+          <a:p>
+            <a:r>
+              <a:rPr lang="en-US" cap="none" dirty="0" smtClean="0"/>
+              <a:t>Phase Increment</a:t>
+            </a:r>
+            <a:endParaRPr lang="en-US" cap="none" dirty="0"/>
+          </a:p>
+        </p:txBody>
+      </p:sp>
+      <p:sp>
+        <p:nvSpPr>
+          <p:cNvPr id="7" name="Text Placeholder 6"/>
+          <p:cNvSpPr>
+            <a:spLocks noGrp="1"/>
+          </p:cNvSpPr>
+          <p:nvPr>
+            <p:ph type="body" idx="1"/>
+          </p:nvPr>
+        </p:nvSpPr>
+        <p:spPr/>
+        <p:txBody>
+          <a:bodyPr/>
+          <a:lstStyle/>
+          <a:p>
+            <a:endParaRPr lang="en-US" dirty="0"/>
+          </a:p>
+        </p:txBody>
+      </p:sp>
+      <p:sp>
+        <p:nvSpPr>
+          <p:cNvPr id="4" name="Slide Number Placeholder 3"/>
+          <p:cNvSpPr>
+            <a:spLocks noGrp="1"/>
+          </p:cNvSpPr>
+          <p:nvPr>
+            <p:ph type="sldNum" sz="quarter" idx="10"/>
+          </p:nvPr>
+        </p:nvSpPr>
+        <p:spPr/>
+        <p:txBody>
+          <a:bodyPr/>
+          <a:lstStyle/>
+          <a:p>
+            <a:pPr>
+              <a:defRPr/>
+            </a:pPr>
+            <a:fld id="{62D6D4B2-7611-498F-8780-1EDC26277454}" type="slidenum">
+              <a:rPr lang="en-US" smtClean="0">
+                <a:solidFill>
+                  <a:srgbClr val="000000"/>
+                </a:solidFill>
+              </a:rPr>
+              <a:pPr>
+                <a:defRPr/>
+              </a:pPr>
+              <a:t>18</a:t>
+            </a:fld>
+            <a:endParaRPr lang="en-US" dirty="0">
+              <a:solidFill>
+                <a:srgbClr val="000000"/>
+              </a:solidFill>
+            </a:endParaRPr>
+          </a:p>
+        </p:txBody>
+      </p:sp>
+    </p:spTree>
+    <p:extLst>
+      <p:ext uri="{BB962C8B-B14F-4D97-AF65-F5344CB8AC3E}">
+        <p14:creationId xmlns:p14="http://schemas.microsoft.com/office/powerpoint/2010/main" val="2315610422"/>
+      </p:ext>
+    </p:extLst>
+  </p:cSld>
+  <p:clrMapOvr>
+    <a:masterClrMapping/>
+  </p:clrMapOvr>
+  <p:timing>
+    <p:tnLst>
+      <p:par>
+        <p:cTn id="1" dur="indefinite" restart="never" nodeType="tmRoot"/>
+      </p:par>
+    </p:tnLst>
+  </p:timing>
+</p:sld>
+</file>
+
+<file path=ppt/slides/slide19.xml><?xml version="1.0" encoding="utf-8"?>
+<p:sld xmlns:a="http://schemas.openxmlformats.org/drawingml/2006/main" xmlns:r="http://schemas.openxmlformats.org/officeDocument/2006/relationships" xmlns:p="http://schemas.openxmlformats.org/presentationml/2006/main">
+  <p:cSld>
+    <p:spTree>
+      <p:nvGrpSpPr>
+        <p:cNvPr id="1" name=""/>
+        <p:cNvGrpSpPr/>
+        <p:nvPr/>
+      </p:nvGrpSpPr>
+      <p:grpSpPr>
+        <a:xfrm>
+          <a:off x="0" y="0"/>
+          <a:ext cx="0" cy="0"/>
+          <a:chOff x="0" y="0"/>
+          <a:chExt cx="0" cy="0"/>
+        </a:xfrm>
+      </p:grpSpPr>
+      <p:sp>
+        <p:nvSpPr>
+          <p:cNvPr id="2" name="Title 1"/>
+          <p:cNvSpPr>
+            <a:spLocks noGrp="1"/>
+          </p:cNvSpPr>
+          <p:nvPr>
+            <p:ph type="title"/>
+          </p:nvPr>
+        </p:nvSpPr>
+        <p:spPr/>
+        <p:txBody>
+          <a:bodyPr/>
+          <a:lstStyle/>
+          <a:p>
+            <a:r>
+              <a:rPr lang="en-US" dirty="0" smtClean="0"/>
+              <a:t>Phase Increment</a:t>
+            </a:r>
+            <a:endParaRPr lang="en-US" dirty="0"/>
+          </a:p>
+        </p:txBody>
+      </p:sp>
+      <p:sp>
+        <p:nvSpPr>
+          <p:cNvPr id="4" name="Content Placeholder 3"/>
+          <p:cNvSpPr>
+            <a:spLocks noGrp="1"/>
+          </p:cNvSpPr>
+          <p:nvPr>
+            <p:ph idx="1"/>
+          </p:nvPr>
+        </p:nvSpPr>
+        <p:spPr>
+          <a:xfrm>
+            <a:off x="581736" y="1523052"/>
+            <a:ext cx="8131175" cy="4324350"/>
+          </a:xfrm>
+        </p:spPr>
+        <p:txBody>
+          <a:bodyPr/>
+          <a:lstStyle/>
+          <a:p>
+            <a:r>
+              <a:rPr lang="en-US" b="0" dirty="0"/>
+              <a:t>Lets say that you could provide a new sample from the sin table at 48kHZ (through an interrupt) to the codec. </a:t>
+            </a:r>
+            <a:endParaRPr lang="en-US" b="0" dirty="0" smtClean="0"/>
+          </a:p>
+          <a:p>
+            <a:r>
+              <a:rPr lang="en-US" b="0" dirty="0" smtClean="0"/>
+              <a:t>If </a:t>
+            </a:r>
+            <a:r>
+              <a:rPr lang="en-US" b="0" dirty="0"/>
+              <a:t>you incremented the pointer in the sin table by 1 on every </a:t>
+            </a:r>
+            <a:r>
+              <a:rPr lang="en-US" b="0" dirty="0" smtClean="0"/>
+              <a:t>interrupt. How long to get through the table? </a:t>
+            </a:r>
+          </a:p>
+          <a:p>
+            <a:pPr marL="406400" lvl="1" indent="0">
+              <a:buNone/>
+            </a:pPr>
+            <a:r>
+              <a:rPr lang="en-US" dirty="0" smtClean="0"/>
+              <a:t>64*21uS = 1.3mS </a:t>
+            </a:r>
+          </a:p>
+          <a:p>
+            <a:pPr marL="406400" lvl="1" indent="0">
+              <a:buNone/>
+            </a:pPr>
+            <a:r>
+              <a:rPr lang="en-US" dirty="0" smtClean="0"/>
+              <a:t>Generating a sine wave with a frequency of about 750Hz </a:t>
+            </a:r>
+          </a:p>
+          <a:p>
+            <a:r>
+              <a:rPr lang="en-US" b="0" dirty="0" smtClean="0"/>
+              <a:t>If you incremented the pointer in the sin table by 2 every interrupt. How long to get through the table?</a:t>
+            </a:r>
+          </a:p>
+          <a:p>
+            <a:pPr marL="403225" lvl="1" indent="0">
+              <a:buNone/>
+            </a:pPr>
+            <a:r>
+              <a:rPr lang="en-US" dirty="0" smtClean="0"/>
+              <a:t>32*21uS </a:t>
+            </a:r>
+            <a:r>
+              <a:rPr lang="en-US" dirty="0"/>
+              <a:t>= </a:t>
+            </a:r>
+            <a:r>
+              <a:rPr lang="en-US" dirty="0" smtClean="0"/>
+              <a:t>0.65mS</a:t>
+            </a:r>
+          </a:p>
+          <a:p>
+            <a:pPr marL="403225" lvl="1" indent="0">
+              <a:buNone/>
+            </a:pPr>
+            <a:r>
+              <a:rPr lang="en-US" dirty="0" smtClean="0"/>
+              <a:t>Generating </a:t>
+            </a:r>
+            <a:r>
+              <a:rPr lang="en-US" dirty="0"/>
+              <a:t>one period of the sine wave </a:t>
+            </a:r>
+            <a:r>
+              <a:rPr lang="en-US" dirty="0" smtClean="0"/>
+              <a:t>for </a:t>
+            </a:r>
+            <a:r>
+              <a:rPr lang="en-US" dirty="0"/>
+              <a:t>a frequency of about 1.5kHz.</a:t>
+            </a:r>
+            <a:endParaRPr lang="en-US" dirty="0" smtClean="0"/>
+          </a:p>
+        </p:txBody>
+      </p:sp>
+      <p:sp>
+        <p:nvSpPr>
+          <p:cNvPr id="5" name="Slide Number Placeholder 3"/>
+          <p:cNvSpPr>
+            <a:spLocks noGrp="1"/>
+          </p:cNvSpPr>
+          <p:nvPr>
+            <p:ph type="sldNum" sz="quarter" idx="10"/>
+          </p:nvPr>
+        </p:nvSpPr>
+        <p:spPr>
+          <a:xfrm>
+            <a:off x="6910388" y="6253163"/>
+            <a:ext cx="2133600" cy="476250"/>
+          </a:xfrm>
+        </p:spPr>
+        <p:txBody>
+          <a:bodyPr/>
+          <a:lstStyle/>
+          <a:p>
+            <a:pPr>
+              <a:defRPr/>
+            </a:pPr>
+            <a:fld id="{62D6D4B2-7611-498F-8780-1EDC26277454}" type="slidenum">
+              <a:rPr lang="en-US" smtClean="0">
+                <a:solidFill>
+                  <a:srgbClr val="000000"/>
+                </a:solidFill>
+              </a:rPr>
+              <a:pPr>
+                <a:defRPr/>
+              </a:pPr>
+              <a:t>19</a:t>
             </a:fld>
             <a:endParaRPr lang="en-US" dirty="0">
               <a:solidFill>
@@ -11386,7 +12370,7 @@
 </p:sld>
 </file>
 
-<file path=ppt/slides/slide17.xml><?xml version="1.0" encoding="utf-8"?>
+<file path=ppt/slides/slide2.xml><?xml version="1.0" encoding="utf-8"?>
 <p:sld xmlns:a="http://schemas.openxmlformats.org/drawingml/2006/main" xmlns:r="http://schemas.openxmlformats.org/officeDocument/2006/relationships" xmlns:p="http://schemas.openxmlformats.org/presentationml/2006/main">
   <p:cSld>
     <p:spTree>
@@ -11420,7 +12404,7 @@
           <a:p>
             <a:r>
               <a:rPr lang="en-US" dirty="0" smtClean="0"/>
-              <a:t>Phase Increment</a:t>
+              <a:t>Lesson Outline</a:t>
             </a:r>
             <a:endParaRPr lang="en-US" dirty="0"/>
           </a:p>
@@ -11436,67 +12420,148 @@
             <p:ph idx="1"/>
           </p:nvPr>
         </p:nvSpPr>
-        <p:spPr>
-          <a:xfrm>
-            <a:off x="581736" y="1523052"/>
-            <a:ext cx="8131175" cy="4324350"/>
-          </a:xfrm>
-        </p:spPr>
+        <p:spPr/>
         <p:txBody>
           <a:bodyPr/>
           <a:lstStyle/>
           <a:p>
-            <a:r>
-              <a:rPr lang="en-US" b="0" dirty="0"/>
-              <a:t>Using integer values for the increment we are limited to very coarse adjustments in the frequency</a:t>
-            </a:r>
-            <a:r>
-              <a:rPr lang="en-US" b="0" dirty="0" smtClean="0"/>
-              <a:t>.</a:t>
-            </a:r>
-          </a:p>
-          <a:p>
-            <a:r>
-              <a:rPr lang="en-US" b="0" dirty="0"/>
-              <a:t>For example how could you use this schema to generate a sin wave with frequency of </a:t>
-            </a:r>
-            <a:r>
-              <a:rPr lang="en-US" b="0" dirty="0" smtClean="0"/>
-              <a:t>1.0kHz?</a:t>
-            </a:r>
-            <a:endParaRPr lang="en-US" b="0" dirty="0"/>
-          </a:p>
-          <a:p>
-            <a:r>
-              <a:rPr lang="en-US" b="0" dirty="0" smtClean="0"/>
-              <a:t>Well </a:t>
-            </a:r>
-            <a:r>
-              <a:rPr lang="en-US" b="0" dirty="0"/>
-              <a:t>you would need to increment the pointer in the sin table by 1.5 every 21uS. </a:t>
-            </a:r>
-            <a:endParaRPr lang="en-US" b="0" dirty="0" smtClean="0"/>
-          </a:p>
-          <a:p>
-            <a:r>
-              <a:rPr lang="en-US" b="0" dirty="0"/>
-              <a:t> And surprisingly, you can easily accomplish this using a fixed point representation</a:t>
-            </a:r>
-            <a:r>
-              <a:rPr lang="en-US" b="0" dirty="0" smtClean="0"/>
-              <a:t>.</a:t>
-            </a:r>
-          </a:p>
-          <a:p>
-            <a:r>
-              <a:rPr lang="en-US" b="0" dirty="0" smtClean="0"/>
-              <a:t>This </a:t>
-            </a:r>
-            <a:r>
-              <a:rPr lang="en-US" b="0" dirty="0"/>
-              <a:t>fractional value is called the phase increment.</a:t>
-            </a:r>
-            <a:endParaRPr lang="en-US" b="0" dirty="0" smtClean="0"/>
+            <a:pPr eaLnBrk="1" hangingPunct="1">
+              <a:lnSpc>
+                <a:spcPct val="80000"/>
+              </a:lnSpc>
+            </a:pPr>
+            <a:r>
+              <a:rPr lang="en-US" dirty="0" smtClean="0"/>
+              <a:t>Time Logs!</a:t>
+            </a:r>
+          </a:p>
+          <a:p>
+            <a:pPr eaLnBrk="1" hangingPunct="1">
+              <a:lnSpc>
+                <a:spcPct val="80000"/>
+              </a:lnSpc>
+            </a:pPr>
+            <a:endParaRPr lang="en-US" dirty="0" smtClean="0"/>
+          </a:p>
+          <a:p>
+            <a:pPr eaLnBrk="1" hangingPunct="1">
+              <a:lnSpc>
+                <a:spcPct val="80000"/>
+              </a:lnSpc>
+            </a:pPr>
+            <a:r>
+              <a:rPr lang="en-US" dirty="0" smtClean="0"/>
+              <a:t>Lab 3 </a:t>
+            </a:r>
+            <a:r>
+              <a:rPr lang="en-US" dirty="0"/>
+              <a:t>– </a:t>
+            </a:r>
+            <a:r>
+              <a:rPr lang="en-US" dirty="0" err="1"/>
+              <a:t>O’Scope</a:t>
+            </a:r>
+            <a:r>
+              <a:rPr lang="en-US" dirty="0"/>
+              <a:t> Control </a:t>
+            </a:r>
+            <a:r>
+              <a:rPr lang="en-US" dirty="0" smtClean="0"/>
+              <a:t>	 </a:t>
+            </a:r>
+            <a:endParaRPr lang="en-US" dirty="0" smtClean="0"/>
+          </a:p>
+          <a:p>
+            <a:pPr lvl="1" eaLnBrk="1" hangingPunct="1">
+              <a:lnSpc>
+                <a:spcPct val="80000"/>
+              </a:lnSpc>
+            </a:pPr>
+            <a:r>
+              <a:rPr lang="en-US" dirty="0" smtClean="0"/>
+              <a:t>Functionality </a:t>
+            </a:r>
+            <a:r>
+              <a:rPr lang="en-US" dirty="0" smtClean="0"/>
+              <a:t>Due COB </a:t>
+            </a:r>
+            <a:r>
+              <a:rPr lang="en-US" dirty="0" smtClean="0"/>
+              <a:t>Today, but I will give you until 2359 on Sunday</a:t>
+            </a:r>
+            <a:endParaRPr lang="en-US" dirty="0"/>
+          </a:p>
+          <a:p>
+            <a:pPr lvl="1" eaLnBrk="1" hangingPunct="1">
+              <a:lnSpc>
+                <a:spcPct val="80000"/>
+              </a:lnSpc>
+            </a:pPr>
+            <a:r>
+              <a:rPr lang="en-US" dirty="0" smtClean="0"/>
+              <a:t>Write-up Due COB LSN 24 (after Spring Break)</a:t>
+            </a:r>
+          </a:p>
+          <a:p>
+            <a:pPr eaLnBrk="1" hangingPunct="1">
+              <a:lnSpc>
+                <a:spcPct val="80000"/>
+              </a:lnSpc>
+            </a:pPr>
+            <a:r>
+              <a:rPr lang="en-US" dirty="0" smtClean="0"/>
+              <a:t>Project Proposals Due BOC LSN 25</a:t>
+            </a:r>
+          </a:p>
+          <a:p>
+            <a:pPr eaLnBrk="1" hangingPunct="1">
+              <a:lnSpc>
+                <a:spcPct val="80000"/>
+              </a:lnSpc>
+            </a:pPr>
+            <a:endParaRPr lang="en-US" dirty="0" smtClean="0"/>
+          </a:p>
+          <a:p>
+            <a:pPr eaLnBrk="1" hangingPunct="1">
+              <a:lnSpc>
+                <a:spcPct val="80000"/>
+              </a:lnSpc>
+            </a:pPr>
+            <a:r>
+              <a:rPr lang="en-US" dirty="0" smtClean="0"/>
+              <a:t>Fixed Point Arithmetic and Multiplication</a:t>
+            </a:r>
+          </a:p>
+          <a:p>
+            <a:pPr eaLnBrk="1" hangingPunct="1">
+              <a:lnSpc>
+                <a:spcPct val="80000"/>
+              </a:lnSpc>
+            </a:pPr>
+            <a:r>
+              <a:rPr lang="en-US" dirty="0"/>
+              <a:t>Direct Digital Synthesis</a:t>
+            </a:r>
+          </a:p>
+          <a:p>
+            <a:pPr eaLnBrk="1" hangingPunct="1">
+              <a:lnSpc>
+                <a:spcPct val="80000"/>
+              </a:lnSpc>
+            </a:pPr>
+            <a:r>
+              <a:rPr lang="en-US" dirty="0" smtClean="0"/>
+              <a:t>Phase Increment</a:t>
+            </a:r>
+            <a:endParaRPr lang="en-US" dirty="0" smtClean="0"/>
+          </a:p>
+          <a:p>
+            <a:pPr eaLnBrk="1" hangingPunct="1">
+              <a:lnSpc>
+                <a:spcPct val="80000"/>
+              </a:lnSpc>
+            </a:pPr>
+            <a:endParaRPr lang="en-US" dirty="0" smtClean="0"/>
           </a:p>
         </p:txBody>
       </p:sp>
@@ -11532,7 +12597,183 @@
               <a:pPr>
                 <a:defRPr/>
               </a:pPr>
-              <a:t>17</a:t>
+              <a:t>2</a:t>
+            </a:fld>
+            <a:endParaRPr lang="en-US" dirty="0">
+              <a:solidFill>
+                <a:srgbClr val="000000"/>
+              </a:solidFill>
+            </a:endParaRPr>
+          </a:p>
+        </p:txBody>
+      </p:sp>
+    </p:spTree>
+    <p:extLst>
+      <p:ext uri="{BB962C8B-B14F-4D97-AF65-F5344CB8AC3E}">
+        <p14:creationId xmlns:p14="http://schemas.microsoft.com/office/powerpoint/2010/main" val="3991601210"/>
+      </p:ext>
+    </p:extLst>
+  </p:cSld>
+  <p:clrMapOvr>
+    <a:masterClrMapping/>
+  </p:clrMapOvr>
+  <p:timing>
+    <p:tnLst>
+      <p:par>
+        <p:cTn id="1" dur="indefinite" restart="never" nodeType="tmRoot"/>
+      </p:par>
+    </p:tnLst>
+  </p:timing>
+</p:sld>
+</file>
+
+<file path=ppt/slides/slide20.xml><?xml version="1.0" encoding="utf-8"?>
+<p:sld xmlns:a="http://schemas.openxmlformats.org/drawingml/2006/main" xmlns:r="http://schemas.openxmlformats.org/officeDocument/2006/relationships" xmlns:p="http://schemas.openxmlformats.org/presentationml/2006/main">
+  <p:cSld>
+    <p:spTree>
+      <p:nvGrpSpPr>
+        <p:cNvPr id="1" name=""/>
+        <p:cNvGrpSpPr/>
+        <p:nvPr/>
+      </p:nvGrpSpPr>
+      <p:grpSpPr>
+        <a:xfrm>
+          <a:off x="0" y="0"/>
+          <a:ext cx="0" cy="0"/>
+          <a:chOff x="0" y="0"/>
+          <a:chExt cx="0" cy="0"/>
+        </a:xfrm>
+      </p:grpSpPr>
+      <p:sp>
+        <p:nvSpPr>
+          <p:cNvPr id="2" name="Title 1"/>
+          <p:cNvSpPr>
+            <a:spLocks noGrp="1"/>
+          </p:cNvSpPr>
+          <p:nvPr>
+            <p:ph type="title"/>
+          </p:nvPr>
+        </p:nvSpPr>
+        <p:spPr/>
+        <p:txBody>
+          <a:bodyPr/>
+          <a:lstStyle/>
+          <a:p>
+            <a:r>
+              <a:rPr lang="en-US" dirty="0" smtClean="0"/>
+              <a:t>Phase Increment</a:t>
+            </a:r>
+            <a:endParaRPr lang="en-US" dirty="0"/>
+          </a:p>
+        </p:txBody>
+      </p:sp>
+      <p:sp>
+        <p:nvSpPr>
+          <p:cNvPr id="4" name="Content Placeholder 3"/>
+          <p:cNvSpPr>
+            <a:spLocks noGrp="1"/>
+          </p:cNvSpPr>
+          <p:nvPr>
+            <p:ph idx="1"/>
+          </p:nvPr>
+        </p:nvSpPr>
+        <p:spPr>
+          <a:xfrm>
+            <a:off x="581736" y="1523052"/>
+            <a:ext cx="8131175" cy="4324350"/>
+          </a:xfrm>
+        </p:spPr>
+        <p:txBody>
+          <a:bodyPr/>
+          <a:lstStyle/>
+          <a:p>
+            <a:r>
+              <a:rPr lang="en-US" b="0" dirty="0"/>
+              <a:t>Using integer values for the increment we are limited to very coarse adjustments in the frequency</a:t>
+            </a:r>
+            <a:r>
+              <a:rPr lang="en-US" b="0" dirty="0" smtClean="0"/>
+              <a:t>.</a:t>
+            </a:r>
+          </a:p>
+          <a:p>
+            <a:r>
+              <a:rPr lang="en-US" b="0" dirty="0"/>
+              <a:t>For example how could you use this schema to generate a sin wave with frequency of </a:t>
+            </a:r>
+            <a:r>
+              <a:rPr lang="en-US" b="0" dirty="0" smtClean="0"/>
+              <a:t>1.0kHz?</a:t>
+            </a:r>
+            <a:endParaRPr lang="en-US" b="0" dirty="0"/>
+          </a:p>
+          <a:p>
+            <a:r>
+              <a:rPr lang="en-US" b="0" dirty="0" smtClean="0"/>
+              <a:t>Well </a:t>
+            </a:r>
+            <a:r>
+              <a:rPr lang="en-US" b="0" dirty="0"/>
+              <a:t>you would need to increment the pointer in the sin table by 1.5 every 21uS. </a:t>
+            </a:r>
+            <a:endParaRPr lang="en-US" b="0" dirty="0" smtClean="0"/>
+          </a:p>
+          <a:p>
+            <a:r>
+              <a:rPr lang="en-US" b="0" dirty="0"/>
+              <a:t> And surprisingly, you can easily accomplish this using a fixed point representation</a:t>
+            </a:r>
+            <a:r>
+              <a:rPr lang="en-US" b="0" dirty="0" smtClean="0"/>
+              <a:t>.</a:t>
+            </a:r>
+          </a:p>
+          <a:p>
+            <a:r>
+              <a:rPr lang="en-US" b="0" dirty="0" smtClean="0"/>
+              <a:t>This </a:t>
+            </a:r>
+            <a:r>
+              <a:rPr lang="en-US" b="0" dirty="0"/>
+              <a:t>fractional value is called the phase increment.</a:t>
+            </a:r>
+            <a:endParaRPr lang="en-US" b="0" dirty="0" smtClean="0"/>
+          </a:p>
+        </p:txBody>
+      </p:sp>
+      <p:sp>
+        <p:nvSpPr>
+          <p:cNvPr id="5" name="Slide Number Placeholder 3"/>
+          <p:cNvSpPr>
+            <a:spLocks noGrp="1"/>
+          </p:cNvSpPr>
+          <p:nvPr>
+            <p:ph type="sldNum" sz="quarter" idx="10"/>
+          </p:nvPr>
+        </p:nvSpPr>
+        <p:spPr>
+          <a:xfrm>
+            <a:off x="6910388" y="6253163"/>
+            <a:ext cx="2133600" cy="476250"/>
+          </a:xfrm>
+        </p:spPr>
+        <p:txBody>
+          <a:bodyPr/>
+          <a:lstStyle/>
+          <a:p>
+            <a:pPr>
+              <a:defRPr/>
+            </a:pPr>
+            <a:fld id="{62D6D4B2-7611-498F-8780-1EDC26277454}" type="slidenum">
+              <a:rPr lang="en-US" smtClean="0">
+                <a:solidFill>
+                  <a:srgbClr val="000000"/>
+                </a:solidFill>
+              </a:rPr>
+              <a:pPr>
+                <a:defRPr/>
+              </a:pPr>
+              <a:t>20</a:t>
             </a:fld>
             <a:endParaRPr lang="en-US" dirty="0">
               <a:solidFill>
@@ -11781,7 +13022,7 @@
 </p:sld>
 </file>
 
-<file path=ppt/slides/slide18.xml><?xml version="1.0" encoding="utf-8"?>
+<file path=ppt/slides/slide21.xml><?xml version="1.0" encoding="utf-8"?>
 <p:sld xmlns:a="http://schemas.openxmlformats.org/drawingml/2006/main" xmlns:r="http://schemas.openxmlformats.org/officeDocument/2006/relationships" xmlns:p="http://schemas.openxmlformats.org/presentationml/2006/main">
   <p:cSld>
     <p:spTree>
@@ -12000,7 +13241,7 @@
               <a:pPr>
                 <a:defRPr/>
               </a:pPr>
-              <a:t>18</a:t>
+              <a:t>21</a:t>
             </a:fld>
             <a:endParaRPr lang="en-US" dirty="0">
               <a:solidFill>
@@ -12311,7 +13552,7 @@
 </p:sld>
 </file>
 
-<file path=ppt/slides/slide19.xml><?xml version="1.0" encoding="utf-8"?>
+<file path=ppt/slides/slide22.xml><?xml version="1.0" encoding="utf-8"?>
 <p:sld xmlns:a="http://schemas.openxmlformats.org/drawingml/2006/main" xmlns:r="http://schemas.openxmlformats.org/officeDocument/2006/relationships" xmlns:p="http://schemas.openxmlformats.org/presentationml/2006/main">
   <p:cSld>
     <p:spTree>
@@ -12397,7 +13638,7 @@
               <a:pPr>
                 <a:defRPr/>
               </a:pPr>
-              <a:t>19</a:t>
+              <a:t>22</a:t>
             </a:fld>
             <a:endParaRPr lang="en-US" dirty="0">
               <a:solidFill>
@@ -12427,7 +13668,7 @@
 </p:sld>
 </file>
 
-<file path=ppt/slides/slide2.xml><?xml version="1.0" encoding="utf-8"?>
+<file path=ppt/slides/slide23.xml><?xml version="1.0" encoding="utf-8"?>
 <p:sld xmlns:a="http://schemas.openxmlformats.org/drawingml/2006/main" xmlns:r="http://schemas.openxmlformats.org/officeDocument/2006/relationships" xmlns:p="http://schemas.openxmlformats.org/presentationml/2006/main">
   <p:cSld>
     <p:spTree>
@@ -12461,7 +13702,7 @@
           <a:p>
             <a:r>
               <a:rPr lang="en-US" dirty="0" smtClean="0"/>
-              <a:t>Lesson Outline</a:t>
+              <a:t>Phase Increment</a:t>
             </a:r>
             <a:endParaRPr lang="en-US" dirty="0"/>
           </a:p>
@@ -12477,118 +13718,138 @@
             <p:ph idx="1"/>
           </p:nvPr>
         </p:nvSpPr>
-        <p:spPr/>
+        <p:spPr>
+          <a:xfrm>
+            <a:off x="581736" y="1523052"/>
+            <a:ext cx="8131175" cy="4324350"/>
+          </a:xfrm>
+        </p:spPr>
         <p:txBody>
           <a:bodyPr/>
           <a:lstStyle/>
           <a:p>
-            <a:pPr eaLnBrk="1" hangingPunct="1">
-              <a:lnSpc>
-                <a:spcPct val="80000"/>
-              </a:lnSpc>
+            <a:pPr>
+              <a:tabLst>
+                <a:tab pos="1377950" algn="l"/>
+              </a:tabLst>
             </a:pPr>
             <a:r>
               <a:rPr lang="en-US" dirty="0" smtClean="0"/>
-              <a:t>Time Logs!</a:t>
-            </a:r>
-          </a:p>
-          <a:p>
-            <a:pPr eaLnBrk="1" hangingPunct="1">
-              <a:lnSpc>
-                <a:spcPct val="80000"/>
-              </a:lnSpc>
+              <a:t>Given:	F</a:t>
+            </a:r>
+            <a:r>
+              <a:rPr lang="en-US" baseline="-25000" dirty="0" smtClean="0"/>
+              <a:t>s</a:t>
+            </a:r>
+            <a:r>
+              <a:rPr lang="en-US" dirty="0" smtClean="0"/>
+              <a:t> = 48 KHz</a:t>
+            </a:r>
+          </a:p>
+          <a:p>
+            <a:pPr marL="0" indent="0">
+              <a:buNone/>
+              <a:tabLst>
+                <a:tab pos="1377950" algn="l"/>
+              </a:tabLst>
             </a:pPr>
             <a:r>
-              <a:rPr lang="en-US" dirty="0"/>
-              <a:t>Lab 3 – </a:t>
-            </a:r>
-            <a:r>
-              <a:rPr lang="en-US" dirty="0" err="1"/>
-              <a:t>O’Scope</a:t>
-            </a:r>
-            <a:r>
-              <a:rPr lang="en-US" dirty="0"/>
+              <a:rPr lang="en-US" dirty="0" smtClean="0"/>
+              <a:t> 	2</a:t>
+            </a:r>
+            <a:r>
+              <a:rPr lang="en-US" baseline="30000" dirty="0" smtClean="0"/>
+              <a:t>N</a:t>
+            </a:r>
+            <a:r>
+              <a:rPr lang="en-US" dirty="0" smtClean="0"/>
+              <a:t> = 1024</a:t>
+            </a:r>
+          </a:p>
+          <a:p>
+            <a:pPr marL="1377950" indent="-1377950">
+              <a:buNone/>
+              <a:tabLst>
+                <a:tab pos="1377950" algn="l"/>
+              </a:tabLst>
+            </a:pPr>
+            <a:r>
+              <a:rPr lang="en-US" dirty="0" smtClean="0"/>
+              <a:t>	Find x to generate 440 Hz as a 10.6 fixed </a:t>
+            </a:r>
+            <a:r>
+              <a:rPr lang="en-US" smtClean="0"/>
+              <a:t>point number?</a:t>
+            </a:r>
+            <a:endParaRPr lang="en-US" dirty="0" smtClean="0"/>
+          </a:p>
+          <a:p>
+            <a:pPr marL="0" indent="0">
+              <a:buNone/>
+              <a:tabLst>
+                <a:tab pos="1377950" algn="l"/>
+              </a:tabLst>
+            </a:pPr>
+            <a:r>
+              <a:rPr lang="en-US" dirty="0" smtClean="0"/>
+              <a:t> 	</a:t>
+            </a:r>
+          </a:p>
+          <a:p>
+            <a:pPr marL="0" indent="0">
+              <a:buNone/>
+              <a:tabLst>
+                <a:tab pos="1377950" algn="l"/>
+              </a:tabLst>
+            </a:pPr>
+            <a:r>
+              <a:rPr lang="en-US" dirty="0" smtClean="0"/>
+              <a:t>	</a:t>
+            </a:r>
+          </a:p>
+          <a:p>
+            <a:pPr marL="0" indent="0">
+              <a:buNone/>
+            </a:pPr>
+            <a:r>
+              <a:rPr lang="en-US" dirty="0" smtClean="0"/>
+              <a:t>	f</a:t>
+            </a:r>
+            <a:r>
+              <a:rPr lang="en-US" baseline="-25000" dirty="0" smtClean="0"/>
+              <a:t>s</a:t>
+            </a:r>
+            <a:r>
+              <a:rPr lang="en-US" dirty="0" smtClean="0"/>
+              <a:t> updates 	x values 	1 cycle 	   f*x </a:t>
+            </a:r>
+          </a:p>
+          <a:p>
+            <a:pPr marL="0" indent="0">
+              <a:buNone/>
+            </a:pPr>
+            <a:r>
+              <a:rPr lang="en-US" dirty="0" smtClean="0"/>
+              <a:t>	-------------- *  --------------  * -------------    	= ---- </a:t>
+            </a:r>
+            <a:r>
+              <a:rPr lang="en-US" dirty="0" err="1" smtClean="0"/>
+              <a:t>hz</a:t>
+            </a:r>
+            <a:r>
+              <a:rPr lang="en-US" dirty="0" smtClean="0"/>
               <a:t> </a:t>
             </a:r>
+          </a:p>
+          <a:p>
+            <a:pPr marL="0" indent="0">
+              <a:buNone/>
+            </a:pPr>
             <a:r>
               <a:rPr lang="en-US" dirty="0" smtClean="0"/>
-              <a:t>Control Functionality Due COB Today</a:t>
-            </a:r>
-            <a:endParaRPr lang="en-US" dirty="0"/>
-          </a:p>
-          <a:p>
-            <a:pPr eaLnBrk="1" hangingPunct="1">
-              <a:lnSpc>
-                <a:spcPct val="80000"/>
-              </a:lnSpc>
-            </a:pPr>
-            <a:r>
-              <a:rPr lang="en-US" dirty="0" smtClean="0"/>
-              <a:t>Write-up Due COB LSN 24 (after Spring Break)</a:t>
-            </a:r>
-          </a:p>
-          <a:p>
-            <a:pPr lvl="1" eaLnBrk="1" hangingPunct="1">
-              <a:lnSpc>
-                <a:spcPct val="80000"/>
-              </a:lnSpc>
-            </a:pPr>
-            <a:r>
-              <a:rPr lang="en-US" dirty="0" smtClean="0"/>
-              <a:t>5 point bonus if completed by midnight 20 Mar</a:t>
-            </a:r>
-          </a:p>
-          <a:p>
-            <a:pPr lvl="2" eaLnBrk="1" hangingPunct="1">
-              <a:lnSpc>
-                <a:spcPct val="80000"/>
-              </a:lnSpc>
-            </a:pPr>
-            <a:r>
-              <a:rPr lang="en-US" dirty="0" smtClean="0"/>
-              <a:t>Must send me </a:t>
-            </a:r>
-            <a:r>
-              <a:rPr lang="en-US" dirty="0">
-                <a:ea typeface="+mn-ea"/>
-                <a:cs typeface="+mn-cs"/>
-              </a:rPr>
-              <a:t>an</a:t>
-            </a:r>
-            <a:r>
-              <a:rPr lang="en-US" dirty="0" smtClean="0"/>
-              <a:t> Issue Request to grade early for bonus</a:t>
-            </a:r>
-          </a:p>
-          <a:p>
-            <a:pPr eaLnBrk="1" hangingPunct="1">
-              <a:lnSpc>
-                <a:spcPct val="80000"/>
-              </a:lnSpc>
-            </a:pPr>
-            <a:r>
-              <a:rPr lang="en-US" dirty="0" smtClean="0"/>
-              <a:t>Project Proposals Due BOC LSN 25</a:t>
-            </a:r>
-          </a:p>
-          <a:p>
-            <a:pPr eaLnBrk="1" hangingPunct="1">
-              <a:lnSpc>
-                <a:spcPct val="80000"/>
-              </a:lnSpc>
-            </a:pPr>
-            <a:endParaRPr lang="en-US" dirty="0" smtClean="0"/>
-          </a:p>
-          <a:p>
-            <a:pPr eaLnBrk="1" hangingPunct="1">
-              <a:lnSpc>
-                <a:spcPct val="80000"/>
-              </a:lnSpc>
-            </a:pPr>
-            <a:r>
-              <a:rPr lang="en-US" dirty="0" smtClean="0"/>
-              <a:t>Direct Digital Synthesis</a:t>
-            </a:r>
+              <a:t>	1 second 	update 	2^N values 	  2^N</a:t>
+            </a:r>
+            <a:endParaRPr lang="en-US" b="0" dirty="0" smtClean="0"/>
           </a:p>
         </p:txBody>
       </p:sp>
@@ -12624,254 +13885,7 @@
               <a:pPr>
                 <a:defRPr/>
               </a:pPr>
-              <a:t>2</a:t>
-            </a:fld>
-            <a:endParaRPr lang="en-US" dirty="0">
-              <a:solidFill>
-                <a:srgbClr val="000000"/>
-              </a:solidFill>
-            </a:endParaRPr>
-          </a:p>
-        </p:txBody>
-      </p:sp>
-    </p:spTree>
-    <p:extLst>
-      <p:ext uri="{BB962C8B-B14F-4D97-AF65-F5344CB8AC3E}">
-        <p14:creationId xmlns:p14="http://schemas.microsoft.com/office/powerpoint/2010/main" val="3991601210"/>
-      </p:ext>
-    </p:extLst>
-  </p:cSld>
-  <p:clrMapOvr>
-    <a:masterClrMapping/>
-  </p:clrMapOvr>
-  <p:timing>
-    <p:tnLst>
-      <p:par>
-        <p:cTn id="1" dur="indefinite" restart="never" nodeType="tmRoot"/>
-      </p:par>
-    </p:tnLst>
-  </p:timing>
-</p:sld>
-</file>
-
-<file path=ppt/slides/slide20.xml><?xml version="1.0" encoding="utf-8"?>
-<p:sld xmlns:a="http://schemas.openxmlformats.org/drawingml/2006/main" xmlns:r="http://schemas.openxmlformats.org/officeDocument/2006/relationships" xmlns:p="http://schemas.openxmlformats.org/presentationml/2006/main">
-  <p:cSld>
-    <p:spTree>
-      <p:nvGrpSpPr>
-        <p:cNvPr id="1" name=""/>
-        <p:cNvGrpSpPr/>
-        <p:nvPr/>
-      </p:nvGrpSpPr>
-      <p:grpSpPr>
-        <a:xfrm>
-          <a:off x="0" y="0"/>
-          <a:ext cx="0" cy="0"/>
-          <a:chOff x="0" y="0"/>
-          <a:chExt cx="0" cy="0"/>
-        </a:xfrm>
-      </p:grpSpPr>
-      <p:sp>
-        <p:nvSpPr>
-          <p:cNvPr id="2" name="Title 1"/>
-          <p:cNvSpPr>
-            <a:spLocks noGrp="1"/>
-          </p:cNvSpPr>
-          <p:nvPr>
-            <p:ph type="title"/>
-          </p:nvPr>
-        </p:nvSpPr>
-        <p:spPr/>
-        <p:txBody>
-          <a:bodyPr/>
-          <a:lstStyle/>
-          <a:p>
-            <a:r>
-              <a:rPr lang="en-US" dirty="0" smtClean="0"/>
-              <a:t>Phase Increment</a:t>
-            </a:r>
-            <a:endParaRPr lang="en-US" dirty="0"/>
-          </a:p>
-        </p:txBody>
-      </p:sp>
-      <p:sp>
-        <p:nvSpPr>
-          <p:cNvPr id="4" name="Content Placeholder 3"/>
-          <p:cNvSpPr>
-            <a:spLocks noGrp="1"/>
-          </p:cNvSpPr>
-          <p:nvPr>
-            <p:ph idx="1"/>
-          </p:nvPr>
-        </p:nvSpPr>
-        <p:spPr>
-          <a:xfrm>
-            <a:off x="581736" y="1523052"/>
-            <a:ext cx="8131175" cy="4324350"/>
-          </a:xfrm>
-        </p:spPr>
-        <p:txBody>
-          <a:bodyPr/>
-          <a:lstStyle/>
-          <a:p>
-            <a:pPr>
-              <a:tabLst>
-                <a:tab pos="1377950" algn="l"/>
-              </a:tabLst>
-            </a:pPr>
-            <a:r>
-              <a:rPr lang="en-US" dirty="0" smtClean="0"/>
-              <a:t>Given:	F</a:t>
-            </a:r>
-            <a:r>
-              <a:rPr lang="en-US" baseline="-25000" dirty="0" smtClean="0"/>
-              <a:t>s</a:t>
-            </a:r>
-            <a:r>
-              <a:rPr lang="en-US" dirty="0" smtClean="0"/>
-              <a:t> = 48 KHz</a:t>
-            </a:r>
-          </a:p>
-          <a:p>
-            <a:pPr marL="0" indent="0">
-              <a:buNone/>
-              <a:tabLst>
-                <a:tab pos="1377950" algn="l"/>
-              </a:tabLst>
-            </a:pPr>
-            <a:r>
-              <a:rPr lang="en-US" dirty="0" smtClean="0"/>
-              <a:t> 	2</a:t>
-            </a:r>
-            <a:r>
-              <a:rPr lang="en-US" baseline="30000" dirty="0" smtClean="0"/>
-              <a:t>N</a:t>
-            </a:r>
-            <a:r>
-              <a:rPr lang="en-US" dirty="0" smtClean="0"/>
-              <a:t> = 1024</a:t>
-            </a:r>
-          </a:p>
-          <a:p>
-            <a:pPr marL="1377950" indent="-1377950">
-              <a:buNone/>
-              <a:tabLst>
-                <a:tab pos="1377950" algn="l"/>
-              </a:tabLst>
-            </a:pPr>
-            <a:r>
-              <a:rPr lang="en-US" dirty="0" smtClean="0"/>
-              <a:t>	Find x to generate 440 Hz as a 10.6 fixed </a:t>
-            </a:r>
-            <a:r>
-              <a:rPr lang="en-US" smtClean="0"/>
-              <a:t>point number?</a:t>
-            </a:r>
-            <a:endParaRPr lang="en-US" dirty="0" smtClean="0"/>
-          </a:p>
-          <a:p>
-            <a:pPr marL="0" indent="0">
-              <a:buNone/>
-              <a:tabLst>
-                <a:tab pos="1377950" algn="l"/>
-              </a:tabLst>
-            </a:pPr>
-            <a:r>
-              <a:rPr lang="en-US" dirty="0" smtClean="0"/>
-              <a:t> 	</a:t>
-            </a:r>
-          </a:p>
-          <a:p>
-            <a:pPr marL="0" indent="0">
-              <a:buNone/>
-              <a:tabLst>
-                <a:tab pos="1377950" algn="l"/>
-              </a:tabLst>
-            </a:pPr>
-            <a:r>
-              <a:rPr lang="en-US" dirty="0" smtClean="0"/>
-              <a:t>	</a:t>
-            </a:r>
-          </a:p>
-          <a:p>
-            <a:pPr marL="0" indent="0">
-              <a:buNone/>
-            </a:pPr>
-            <a:r>
-              <a:rPr lang="en-US" dirty="0" smtClean="0"/>
-              <a:t>	f</a:t>
-            </a:r>
-            <a:r>
-              <a:rPr lang="en-US" baseline="-25000" dirty="0" smtClean="0"/>
-              <a:t>s</a:t>
-            </a:r>
-            <a:r>
-              <a:rPr lang="en-US" dirty="0" smtClean="0"/>
-              <a:t> updates 	x values 	1 cycle 	   f*x </a:t>
-            </a:r>
-          </a:p>
-          <a:p>
-            <a:pPr marL="0" indent="0">
-              <a:buNone/>
-            </a:pPr>
-            <a:r>
-              <a:rPr lang="en-US" dirty="0" smtClean="0"/>
-              <a:t>	-------------- *  --------------  * -------------    	= ---- </a:t>
-            </a:r>
-            <a:r>
-              <a:rPr lang="en-US" dirty="0" err="1" smtClean="0"/>
-              <a:t>hz</a:t>
-            </a:r>
-            <a:r>
-              <a:rPr lang="en-US" dirty="0" smtClean="0"/>
-              <a:t> </a:t>
-            </a:r>
-          </a:p>
-          <a:p>
-            <a:pPr marL="0" indent="0">
-              <a:buNone/>
-            </a:pPr>
-            <a:r>
-              <a:rPr lang="en-US" dirty="0" smtClean="0"/>
-              <a:t>	1 second 	update 	2^N values 	  2^N</a:t>
-            </a:r>
-            <a:endParaRPr lang="en-US" b="0" dirty="0" smtClean="0"/>
-          </a:p>
-        </p:txBody>
-      </p:sp>
-      <p:sp>
-        <p:nvSpPr>
-          <p:cNvPr id="5" name="Slide Number Placeholder 3"/>
-          <p:cNvSpPr>
-            <a:spLocks noGrp="1"/>
-          </p:cNvSpPr>
-          <p:nvPr>
-            <p:ph type="sldNum" sz="quarter" idx="10"/>
-          </p:nvPr>
-        </p:nvSpPr>
-        <p:spPr>
-          <a:xfrm>
-            <a:off x="6910388" y="6253163"/>
-            <a:ext cx="2133600" cy="476250"/>
-          </a:xfrm>
-        </p:spPr>
-        <p:txBody>
-          <a:bodyPr/>
-          <a:lstStyle/>
-          <a:p>
-            <a:pPr>
-              <a:defRPr/>
-            </a:pPr>
-            <a:fld id="{62D6D4B2-7611-498F-8780-1EDC26277454}" type="slidenum">
-              <a:rPr lang="en-US" smtClean="0">
-                <a:solidFill>
-                  <a:srgbClr val="000000"/>
-                </a:solidFill>
-              </a:rPr>
-              <a:pPr>
-                <a:defRPr/>
-              </a:pPr>
-              <a:t>20</a:t>
+              <a:t>23</a:t>
             </a:fld>
             <a:endParaRPr lang="en-US" dirty="0">
               <a:solidFill>
@@ -12909,7 +13923,7 @@
 </p:sld>
 </file>
 
-<file path=ppt/slides/slide21.xml><?xml version="1.0" encoding="utf-8"?>
+<file path=ppt/slides/slide24.xml><?xml version="1.0" encoding="utf-8"?>
 <p:sld xmlns:a="http://schemas.openxmlformats.org/drawingml/2006/main" xmlns:r="http://schemas.openxmlformats.org/officeDocument/2006/relationships" xmlns:p="http://schemas.openxmlformats.org/presentationml/2006/main">
   <p:cSld>
     <p:spTree>
@@ -13095,7 +14109,7 @@
               <a:pPr>
                 <a:defRPr/>
               </a:pPr>
-              <a:t>21</a:t>
+              <a:t>24</a:t>
             </a:fld>
             <a:endParaRPr lang="en-US" dirty="0">
               <a:solidFill>
@@ -13426,9 +14440,10 @@
           <a:lstStyle/>
           <a:p>
             <a:r>
-              <a:rPr lang="en-US" cap="none" dirty="0"/>
-              <a:t>Direct Digital Synthesis</a:t>
-            </a:r>
+              <a:rPr lang="en-US" cap="none" dirty="0" smtClean="0"/>
+              <a:t>Fixed Point</a:t>
+            </a:r>
+            <a:endParaRPr lang="en-US" cap="none" dirty="0"/>
           </a:p>
         </p:txBody>
       </p:sp>
@@ -13491,7 +14506,7 @@
     </p:spTree>
     <p:extLst>
       <p:ext uri="{BB962C8B-B14F-4D97-AF65-F5344CB8AC3E}">
-        <p14:creationId xmlns:p14="http://schemas.microsoft.com/office/powerpoint/2010/main" val="2890013489"/>
+        <p14:creationId xmlns:p14="http://schemas.microsoft.com/office/powerpoint/2010/main" val="4015016811"/>
       </p:ext>
     </p:extLst>
   </p:cSld>
@@ -13541,9 +14556,10 @@
           <a:lstStyle/>
           <a:p>
             <a:r>
-              <a:rPr lang="en-US" dirty="0"/>
-              <a:t>Direct Digital Synthesis</a:t>
-            </a:r>
+              <a:rPr lang="en-US" dirty="0" smtClean="0"/>
+              <a:t>Fixed Point</a:t>
+            </a:r>
+            <a:endParaRPr lang="en-US" dirty="0"/>
           </a:p>
         </p:txBody>
       </p:sp>
@@ -13568,48 +14584,134 @@
           <a:lstStyle/>
           <a:p>
             <a:r>
+              <a:rPr lang="en-US" b="0" dirty="0" smtClean="0"/>
+              <a:t>Binary Coded Number: 10010</a:t>
+            </a:r>
+          </a:p>
+          <a:p>
+            <a:r>
+              <a:rPr lang="en-US" b="0" dirty="0" smtClean="0"/>
+              <a:t>How </a:t>
+            </a:r>
+            <a:r>
               <a:rPr lang="en-US" b="0" dirty="0"/>
-              <a:t>Direct Digital Synthesis (DDS) is a technique to create periodic waveforms with very precise frequency control using a system with a fixed clock frequency</a:t>
+              <a:t>do you (formally) determine what decimal value it represents</a:t>
             </a:r>
             <a:r>
               <a:rPr lang="en-US" b="0" dirty="0" smtClean="0"/>
-              <a:t>. </a:t>
+              <a:t>?</a:t>
             </a:r>
           </a:p>
           <a:p>
             <a:r>
               <a:rPr lang="en-US" b="0" dirty="0" smtClean="0"/>
-              <a:t>The periodic function is stored in a look-up table like the following for a sin wave.</a:t>
-            </a:r>
-          </a:p>
-          <a:p>
-            <a:endParaRPr lang="en-US" b="0" dirty="0" smtClean="0"/>
+              <a:t>You need the Equation:</a:t>
+            </a:r>
+          </a:p>
+          <a:p>
+            <a:pPr lvl="1"/>
+            <a:r>
+              <a:rPr lang="en-US" sz="2400" b="0" dirty="0" smtClean="0"/>
+              <a:t>Decimal value </a:t>
+            </a:r>
+            <a:r>
+              <a:rPr lang="en-US" sz="2400" b="0" dirty="0"/>
+              <a:t>= sum(b</a:t>
+            </a:r>
+            <a:r>
+              <a:rPr lang="en-US" sz="2400" b="0" baseline="-25000" dirty="0"/>
+              <a:t>i</a:t>
+            </a:r>
+            <a:r>
+              <a:rPr lang="en-US" sz="2400" b="0" dirty="0"/>
+              <a:t>*2</a:t>
+            </a:r>
+            <a:r>
+              <a:rPr lang="en-US" sz="2400" b="0" baseline="30000" dirty="0"/>
+              <a:t>i</a:t>
+            </a:r>
+            <a:r>
+              <a:rPr lang="en-US" sz="2400" b="0" dirty="0" smtClean="0"/>
+              <a:t>)</a:t>
+            </a:r>
+          </a:p>
+          <a:p>
+            <a:r>
+              <a:rPr lang="en-US" b="0" dirty="0"/>
+              <a:t>Where the sum ranges over all the bit positions i</a:t>
+            </a:r>
+            <a:r>
+              <a:rPr lang="en-US" b="0" dirty="0" smtClean="0"/>
+              <a:t>.</a:t>
+            </a:r>
+          </a:p>
+          <a:p>
+            <a:r>
+              <a:rPr lang="en-US" b="0" dirty="0"/>
+              <a:t>Remember that the LSB (the one closest to the </a:t>
+            </a:r>
+            <a:r>
+              <a:rPr lang="en-US" b="0" dirty="0" smtClean="0"/>
+              <a:t>binary point) </a:t>
+            </a:r>
+            <a:r>
+              <a:rPr lang="en-US" b="0" dirty="0"/>
+              <a:t>is ALWAYS index 0</a:t>
+            </a:r>
+            <a:r>
+              <a:rPr lang="en-US" b="0" dirty="0" smtClean="0"/>
+              <a:t>.</a:t>
+            </a:r>
           </a:p>
           <a:p>
             <a:pPr marL="0" indent="0">
               <a:buNone/>
             </a:pPr>
             <a:r>
-              <a:rPr lang="sv-SE" sz="1600" dirty="0"/>
-              <a:t>int8 sin[64] </a:t>
-            </a:r>
-            <a:r>
-              <a:rPr lang="sv-SE" sz="1600" dirty="0" smtClean="0"/>
-              <a:t>= {</a:t>
-            </a:r>
-            <a:r>
-              <a:rPr lang="sv-SE" sz="1600" dirty="0"/>
-              <a:t>128,141,153,165,177,189,200,210,219,227,235,241,246,250,253,255, </a:t>
-            </a:r>
-            <a:r>
-              <a:rPr lang="sv-SE" sz="1600" dirty="0" smtClean="0"/>
-              <a:t>255,254,252,248,244,238,231,223,214,205,194,183,171,159,147,134, 122,109</a:t>
-            </a:r>
-            <a:r>
-              <a:rPr lang="sv-SE" sz="1600" dirty="0"/>
-              <a:t>, 97, 85, 73, 62, 51, 42, 33, 25, 18, 12, 8, 4, 2, 1, 1, 3, 6, 10, 15, 21, 29, 37, 46, 56, 67, 79, 91,103,115,128};</a:t>
-            </a:r>
-            <a:endParaRPr lang="en-US" sz="1600" b="0" dirty="0"/>
+              <a:rPr lang="en-US" b="0" dirty="0" smtClean="0"/>
+              <a:t>	1*2</a:t>
+            </a:r>
+            <a:r>
+              <a:rPr lang="en-US" b="0" baseline="30000" dirty="0" smtClean="0"/>
+              <a:t>4</a:t>
+            </a:r>
+            <a:r>
+              <a:rPr lang="en-US" b="0" dirty="0"/>
+              <a:t> + 0*2</a:t>
+            </a:r>
+            <a:r>
+              <a:rPr lang="en-US" b="0" baseline="30000" dirty="0"/>
+              <a:t>3</a:t>
+            </a:r>
+            <a:r>
+              <a:rPr lang="en-US" b="0" dirty="0"/>
+              <a:t> + 0*2</a:t>
+            </a:r>
+            <a:r>
+              <a:rPr lang="en-US" b="0" baseline="30000" dirty="0"/>
+              <a:t>2</a:t>
+            </a:r>
+            <a:r>
+              <a:rPr lang="en-US" b="0" dirty="0"/>
+              <a:t> + 1*2</a:t>
+            </a:r>
+            <a:r>
+              <a:rPr lang="en-US" b="0" baseline="30000" dirty="0"/>
+              <a:t>1</a:t>
+            </a:r>
+            <a:r>
+              <a:rPr lang="en-US" b="0" dirty="0"/>
+              <a:t> + 0*2</a:t>
+            </a:r>
+            <a:r>
+              <a:rPr lang="en-US" b="0" baseline="30000" dirty="0"/>
+              <a:t>0</a:t>
+            </a:r>
+            <a:r>
+              <a:rPr lang="en-US" b="0" dirty="0"/>
+              <a:t> = 16 + 2 = 18</a:t>
+            </a:r>
+            <a:endParaRPr lang="en-US" b="0" dirty="0" smtClean="0"/>
           </a:p>
         </p:txBody>
       </p:sp>
@@ -13646,368 +14748,6 @@
                 <a:defRPr/>
               </a:pPr>
               <a:t>4</a:t>
-            </a:fld>
-            <a:endParaRPr lang="en-US" dirty="0">
-              <a:solidFill>
-                <a:srgbClr val="000000"/>
-              </a:solidFill>
-            </a:endParaRPr>
-          </a:p>
-        </p:txBody>
-      </p:sp>
-    </p:spTree>
-    <p:extLst>
-      <p:ext uri="{BB962C8B-B14F-4D97-AF65-F5344CB8AC3E}">
-        <p14:creationId xmlns:p14="http://schemas.microsoft.com/office/powerpoint/2010/main" val="2217696780"/>
-      </p:ext>
-    </p:extLst>
-  </p:cSld>
-  <p:clrMapOvr>
-    <a:masterClrMapping/>
-  </p:clrMapOvr>
-  <p:timing>
-    <p:tnLst>
-      <p:par>
-        <p:cTn id="1" dur="indefinite" restart="never" nodeType="tmRoot"/>
-      </p:par>
-    </p:tnLst>
-  </p:timing>
-</p:sld>
-</file>
-
-<file path=ppt/slides/slide5.xml><?xml version="1.0" encoding="utf-8"?>
-<p:sld xmlns:a="http://schemas.openxmlformats.org/drawingml/2006/main" xmlns:r="http://schemas.openxmlformats.org/officeDocument/2006/relationships" xmlns:p="http://schemas.openxmlformats.org/presentationml/2006/main">
-  <p:cSld>
-    <p:spTree>
-      <p:nvGrpSpPr>
-        <p:cNvPr id="1" name=""/>
-        <p:cNvGrpSpPr/>
-        <p:nvPr/>
-      </p:nvGrpSpPr>
-      <p:grpSpPr>
-        <a:xfrm>
-          <a:off x="0" y="0"/>
-          <a:ext cx="0" cy="0"/>
-          <a:chOff x="0" y="0"/>
-          <a:chExt cx="0" cy="0"/>
-        </a:xfrm>
-      </p:grpSpPr>
-      <p:sp>
-        <p:nvSpPr>
-          <p:cNvPr id="6" name="Title 5"/>
-          <p:cNvSpPr>
-            <a:spLocks noGrp="1"/>
-          </p:cNvSpPr>
-          <p:nvPr>
-            <p:ph type="title"/>
-          </p:nvPr>
-        </p:nvSpPr>
-        <p:spPr/>
-        <p:txBody>
-          <a:bodyPr anchor="ctr" anchorCtr="0"/>
-          <a:lstStyle/>
-          <a:p>
-            <a:r>
-              <a:rPr lang="en-US" cap="none" dirty="0" smtClean="0"/>
-              <a:t>Fixed Point</a:t>
-            </a:r>
-            <a:endParaRPr lang="en-US" cap="none" dirty="0"/>
-          </a:p>
-        </p:txBody>
-      </p:sp>
-      <p:sp>
-        <p:nvSpPr>
-          <p:cNvPr id="7" name="Text Placeholder 6"/>
-          <p:cNvSpPr>
-            <a:spLocks noGrp="1"/>
-          </p:cNvSpPr>
-          <p:nvPr>
-            <p:ph type="body" idx="1"/>
-          </p:nvPr>
-        </p:nvSpPr>
-        <p:spPr/>
-        <p:txBody>
-          <a:bodyPr/>
-          <a:lstStyle/>
-          <a:p>
-            <a:endParaRPr lang="en-US" dirty="0"/>
-          </a:p>
-        </p:txBody>
-      </p:sp>
-      <p:sp>
-        <p:nvSpPr>
-          <p:cNvPr id="4" name="Slide Number Placeholder 3"/>
-          <p:cNvSpPr>
-            <a:spLocks noGrp="1"/>
-          </p:cNvSpPr>
-          <p:nvPr>
-            <p:ph type="sldNum" sz="quarter" idx="10"/>
-          </p:nvPr>
-        </p:nvSpPr>
-        <p:spPr/>
-        <p:txBody>
-          <a:bodyPr/>
-          <a:lstStyle/>
-          <a:p>
-            <a:pPr>
-              <a:defRPr/>
-            </a:pPr>
-            <a:fld id="{62D6D4B2-7611-498F-8780-1EDC26277454}" type="slidenum">
-              <a:rPr lang="en-US" smtClean="0">
-                <a:solidFill>
-                  <a:srgbClr val="000000"/>
-                </a:solidFill>
-              </a:rPr>
-              <a:pPr>
-                <a:defRPr/>
-              </a:pPr>
-              <a:t>5</a:t>
-            </a:fld>
-            <a:endParaRPr lang="en-US" dirty="0">
-              <a:solidFill>
-                <a:srgbClr val="000000"/>
-              </a:solidFill>
-            </a:endParaRPr>
-          </a:p>
-        </p:txBody>
-      </p:sp>
-    </p:spTree>
-    <p:extLst>
-      <p:ext uri="{BB962C8B-B14F-4D97-AF65-F5344CB8AC3E}">
-        <p14:creationId xmlns:p14="http://schemas.microsoft.com/office/powerpoint/2010/main" val="4015016811"/>
-      </p:ext>
-    </p:extLst>
-  </p:cSld>
-  <p:clrMapOvr>
-    <a:masterClrMapping/>
-  </p:clrMapOvr>
-  <p:timing>
-    <p:tnLst>
-      <p:par>
-        <p:cTn id="1" dur="indefinite" restart="never" nodeType="tmRoot"/>
-      </p:par>
-    </p:tnLst>
-  </p:timing>
-</p:sld>
-</file>
-
-<file path=ppt/slides/slide6.xml><?xml version="1.0" encoding="utf-8"?>
-<p:sld xmlns:a="http://schemas.openxmlformats.org/drawingml/2006/main" xmlns:r="http://schemas.openxmlformats.org/officeDocument/2006/relationships" xmlns:p="http://schemas.openxmlformats.org/presentationml/2006/main">
-  <p:cSld>
-    <p:spTree>
-      <p:nvGrpSpPr>
-        <p:cNvPr id="1" name=""/>
-        <p:cNvGrpSpPr/>
-        <p:nvPr/>
-      </p:nvGrpSpPr>
-      <p:grpSpPr>
-        <a:xfrm>
-          <a:off x="0" y="0"/>
-          <a:ext cx="0" cy="0"/>
-          <a:chOff x="0" y="0"/>
-          <a:chExt cx="0" cy="0"/>
-        </a:xfrm>
-      </p:grpSpPr>
-      <p:sp>
-        <p:nvSpPr>
-          <p:cNvPr id="2" name="Title 1"/>
-          <p:cNvSpPr>
-            <a:spLocks noGrp="1"/>
-          </p:cNvSpPr>
-          <p:nvPr>
-            <p:ph type="title"/>
-          </p:nvPr>
-        </p:nvSpPr>
-        <p:spPr/>
-        <p:txBody>
-          <a:bodyPr/>
-          <a:lstStyle/>
-          <a:p>
-            <a:r>
-              <a:rPr lang="en-US" dirty="0" smtClean="0"/>
-              <a:t>Fixed Point</a:t>
-            </a:r>
-            <a:endParaRPr lang="en-US" dirty="0"/>
-          </a:p>
-        </p:txBody>
-      </p:sp>
-      <p:sp>
-        <p:nvSpPr>
-          <p:cNvPr id="4" name="Content Placeholder 3"/>
-          <p:cNvSpPr>
-            <a:spLocks noGrp="1"/>
-          </p:cNvSpPr>
-          <p:nvPr>
-            <p:ph idx="1"/>
-          </p:nvPr>
-        </p:nvSpPr>
-        <p:spPr>
-          <a:xfrm>
-            <a:off x="581736" y="1523052"/>
-            <a:ext cx="8131175" cy="4324350"/>
-          </a:xfrm>
-        </p:spPr>
-        <p:txBody>
-          <a:bodyPr/>
-          <a:lstStyle/>
-          <a:p>
-            <a:r>
-              <a:rPr lang="en-US" b="0" dirty="0" smtClean="0"/>
-              <a:t>Binary Coded Number: 10010</a:t>
-            </a:r>
-          </a:p>
-          <a:p>
-            <a:r>
-              <a:rPr lang="en-US" b="0" dirty="0" smtClean="0"/>
-              <a:t>How </a:t>
-            </a:r>
-            <a:r>
-              <a:rPr lang="en-US" b="0" dirty="0"/>
-              <a:t>do you (formally) determine what decimal value it represents</a:t>
-            </a:r>
-            <a:r>
-              <a:rPr lang="en-US" b="0" dirty="0" smtClean="0"/>
-              <a:t>?</a:t>
-            </a:r>
-          </a:p>
-          <a:p>
-            <a:r>
-              <a:rPr lang="en-US" b="0" dirty="0" smtClean="0"/>
-              <a:t>You need the Equation:</a:t>
-            </a:r>
-          </a:p>
-          <a:p>
-            <a:pPr lvl="1"/>
-            <a:r>
-              <a:rPr lang="en-US" sz="2400" b="0" dirty="0" smtClean="0"/>
-              <a:t>Decimal value </a:t>
-            </a:r>
-            <a:r>
-              <a:rPr lang="en-US" sz="2400" b="0" dirty="0"/>
-              <a:t>= sum(b</a:t>
-            </a:r>
-            <a:r>
-              <a:rPr lang="en-US" sz="2400" b="0" baseline="-25000" dirty="0"/>
-              <a:t>i</a:t>
-            </a:r>
-            <a:r>
-              <a:rPr lang="en-US" sz="2400" b="0" dirty="0"/>
-              <a:t>*2</a:t>
-            </a:r>
-            <a:r>
-              <a:rPr lang="en-US" sz="2400" b="0" baseline="30000" dirty="0"/>
-              <a:t>i</a:t>
-            </a:r>
-            <a:r>
-              <a:rPr lang="en-US" sz="2400" b="0" dirty="0" smtClean="0"/>
-              <a:t>)</a:t>
-            </a:r>
-          </a:p>
-          <a:p>
-            <a:r>
-              <a:rPr lang="en-US" b="0" dirty="0"/>
-              <a:t>Where the sum ranges over all the bit positions i</a:t>
-            </a:r>
-            <a:r>
-              <a:rPr lang="en-US" b="0" dirty="0" smtClean="0"/>
-              <a:t>.</a:t>
-            </a:r>
-          </a:p>
-          <a:p>
-            <a:r>
-              <a:rPr lang="en-US" b="0" dirty="0"/>
-              <a:t>Remember that the LSB (the one closest to the decimal point) is ALWAYS index 0</a:t>
-            </a:r>
-            <a:r>
-              <a:rPr lang="en-US" b="0" dirty="0" smtClean="0"/>
-              <a:t>.</a:t>
-            </a:r>
-          </a:p>
-          <a:p>
-            <a:pPr marL="0" indent="0">
-              <a:buNone/>
-            </a:pPr>
-            <a:r>
-              <a:rPr lang="en-US" b="0" dirty="0" smtClean="0"/>
-              <a:t>	1*2</a:t>
-            </a:r>
-            <a:r>
-              <a:rPr lang="en-US" b="0" baseline="30000" dirty="0" smtClean="0"/>
-              <a:t>4</a:t>
-            </a:r>
-            <a:r>
-              <a:rPr lang="en-US" b="0" dirty="0"/>
-              <a:t> + 0*2</a:t>
-            </a:r>
-            <a:r>
-              <a:rPr lang="en-US" b="0" baseline="30000" dirty="0"/>
-              <a:t>3</a:t>
-            </a:r>
-            <a:r>
-              <a:rPr lang="en-US" b="0" dirty="0"/>
-              <a:t> + 0*2</a:t>
-            </a:r>
-            <a:r>
-              <a:rPr lang="en-US" b="0" baseline="30000" dirty="0"/>
-              <a:t>2</a:t>
-            </a:r>
-            <a:r>
-              <a:rPr lang="en-US" b="0" dirty="0"/>
-              <a:t> + 1*2</a:t>
-            </a:r>
-            <a:r>
-              <a:rPr lang="en-US" b="0" baseline="30000" dirty="0"/>
-              <a:t>1</a:t>
-            </a:r>
-            <a:r>
-              <a:rPr lang="en-US" b="0" dirty="0"/>
-              <a:t> + 0*2</a:t>
-            </a:r>
-            <a:r>
-              <a:rPr lang="en-US" b="0" baseline="30000" dirty="0"/>
-              <a:t>0</a:t>
-            </a:r>
-            <a:r>
-              <a:rPr lang="en-US" b="0" dirty="0"/>
-              <a:t> = 16 + 2 = 18</a:t>
-            </a:r>
-            <a:endParaRPr lang="en-US" b="0" dirty="0" smtClean="0"/>
-          </a:p>
-        </p:txBody>
-      </p:sp>
-      <p:sp>
-        <p:nvSpPr>
-          <p:cNvPr id="5" name="Slide Number Placeholder 3"/>
-          <p:cNvSpPr>
-            <a:spLocks noGrp="1"/>
-          </p:cNvSpPr>
-          <p:nvPr>
-            <p:ph type="sldNum" sz="quarter" idx="10"/>
-          </p:nvPr>
-        </p:nvSpPr>
-        <p:spPr>
-          <a:xfrm>
-            <a:off x="6910388" y="6253163"/>
-            <a:ext cx="2133600" cy="476250"/>
-          </a:xfrm>
-        </p:spPr>
-        <p:txBody>
-          <a:bodyPr/>
-          <a:lstStyle/>
-          <a:p>
-            <a:pPr>
-              <a:defRPr/>
-            </a:pPr>
-            <a:fld id="{62D6D4B2-7611-498F-8780-1EDC26277454}" type="slidenum">
-              <a:rPr lang="en-US" smtClean="0">
-                <a:solidFill>
-                  <a:srgbClr val="000000"/>
-                </a:solidFill>
-              </a:rPr>
-              <a:pPr>
-                <a:defRPr/>
-              </a:pPr>
-              <a:t>6</a:t>
             </a:fld>
             <a:endParaRPr lang="en-US" dirty="0">
               <a:solidFill>
@@ -14336,7 +15076,7 @@
 </p:sld>
 </file>
 
-<file path=ppt/slides/slide7.xml><?xml version="1.0" encoding="utf-8"?>
+<file path=ppt/slides/slide5.xml><?xml version="1.0" encoding="utf-8"?>
 <p:sld xmlns:a="http://schemas.openxmlformats.org/drawingml/2006/main" xmlns:r="http://schemas.openxmlformats.org/officeDocument/2006/relationships" xmlns:p="http://schemas.openxmlformats.org/presentationml/2006/main">
   <p:cSld>
     <p:spTree>
@@ -14397,21 +15137,15 @@
           <a:lstStyle/>
           <a:p>
             <a:r>
-              <a:rPr lang="en-US" b="0" dirty="0"/>
-              <a:t>Well now generalize this idea to the right of the decimal point and take a stab at what 1.11 means? </a:t>
-            </a:r>
-            <a:endParaRPr lang="en-US" b="0" dirty="0" smtClean="0"/>
-          </a:p>
-          <a:p>
-            <a:r>
               <a:rPr lang="en-US" b="0" dirty="0" smtClean="0"/>
-              <a:t>Well </a:t>
-            </a:r>
-            <a:r>
-              <a:rPr lang="en-US" b="0" dirty="0"/>
-              <a:t>for this number you would have indices that are negative (to the right of the decimal point). </a:t>
-            </a:r>
-            <a:endParaRPr lang="en-US" b="0" dirty="0" smtClean="0"/>
+              <a:t>Well now generalize this idea to the right of the binary point and take a stab at what 1.11 means? </a:t>
+            </a:r>
+          </a:p>
+          <a:p>
+            <a:r>
+              <a:rPr lang="en-US" b="0" dirty="0" smtClean="0"/>
+              <a:t>Important to note is that to represent values less than 1 (to the right of the decimal point), negative indices need to be used </a:t>
+            </a:r>
           </a:p>
           <a:p>
             <a:pPr marL="0" indent="0">
@@ -14481,7 +15215,7 @@
               <a:pPr>
                 <a:defRPr/>
               </a:pPr>
-              <a:t>7</a:t>
+              <a:t>5</a:t>
             </a:fld>
             <a:endParaRPr lang="en-US" dirty="0">
               <a:solidFill>
@@ -14632,7 +15366,7 @@
 </p:sld>
 </file>
 
-<file path=ppt/slides/slide8.xml><?xml version="1.0" encoding="utf-8"?>
+<file path=ppt/slides/slide6.xml><?xml version="1.0" encoding="utf-8"?>
 <p:sld xmlns:a="http://schemas.openxmlformats.org/drawingml/2006/main" xmlns:r="http://schemas.openxmlformats.org/officeDocument/2006/relationships" xmlns:p="http://schemas.openxmlformats.org/presentationml/2006/main">
   <p:cSld>
     <p:spTree>
@@ -14704,28 +15438,15 @@
           <a:p>
             <a:r>
               <a:rPr lang="en-US" b="0" dirty="0"/>
-              <a:t>This is done by using </a:t>
-            </a:r>
+              <a:t>This is done by using the tried and true technique of finding the largest power of 2 that will fit into the number, subtracting it, and then continuing the conversion with the difference.</a:t>
+            </a:r>
+            <a:endParaRPr lang="en-US" b="0" dirty="0" smtClean="0"/>
+          </a:p>
+          <a:p>
             <a:r>
               <a:rPr lang="en-US" b="0" dirty="0" smtClean="0"/>
-              <a:t>by finding </a:t>
-            </a:r>
-            <a:r>
-              <a:rPr lang="en-US" b="0" dirty="0"/>
-              <a:t>the largest power of 2 that will fit into the number, subtracting it and then continuing the conversion with the difference. </a:t>
-            </a:r>
-            <a:endParaRPr lang="en-US" b="0" dirty="0" smtClean="0"/>
-          </a:p>
-          <a:p>
-            <a:r>
-              <a:rPr lang="en-US" b="0" dirty="0" smtClean="0"/>
-              <a:t>This </a:t>
-            </a:r>
-            <a:r>
-              <a:rPr lang="en-US" b="0" dirty="0"/>
-              <a:t>process stops when you get down to zero. </a:t>
-            </a:r>
-            <a:endParaRPr lang="en-US" b="0" dirty="0" smtClean="0"/>
+              <a:t>This process stops when you get down to zero. </a:t>
+            </a:r>
           </a:p>
           <a:p>
             <a:r>
@@ -14742,6 +15463,7 @@
             </a:r>
           </a:p>
           <a:p>
+            <a:pPr lvl="1"/>
             <a:r>
               <a:rPr lang="en-US" b="0" dirty="0"/>
               <a:t>The largest power of two that fits into 1.53125 is 2</a:t>
@@ -14756,6 +15478,7 @@
             </a:r>
           </a:p>
           <a:p>
+            <a:pPr lvl="1"/>
             <a:r>
               <a:rPr lang="en-US" b="0" dirty="0"/>
               <a:t>The largest power of two that fits into 0.53125 is 2</a:t>
@@ -14770,6 +15493,7 @@
             </a:r>
           </a:p>
           <a:p>
+            <a:pPr lvl="1"/>
             <a:r>
               <a:rPr lang="en-US" b="0" dirty="0"/>
               <a:t>The largest power of two that fits into 0.03125 is 2</a:t>
@@ -14788,6 +15512,7 @@
             </a:r>
           </a:p>
           <a:p>
+            <a:pPr lvl="1"/>
             <a:r>
               <a:rPr lang="en-US" b="0" dirty="0"/>
               <a:t>Thus the binary representation of 1.53125 is 1.10001 </a:t>
@@ -14830,7 +15555,7 @@
               <a:pPr>
                 <a:defRPr/>
               </a:pPr>
-              <a:t>8</a:t>
+              <a:t>6</a:t>
             </a:fld>
             <a:endParaRPr lang="en-US" dirty="0">
               <a:solidFill>
@@ -15208,6 +15933,281 @@
 </p:sld>
 </file>
 
+<file path=ppt/slides/slide7.xml><?xml version="1.0" encoding="utf-8"?>
+<p:sld xmlns:a="http://schemas.openxmlformats.org/drawingml/2006/main" xmlns:r="http://schemas.openxmlformats.org/officeDocument/2006/relationships" xmlns:p="http://schemas.openxmlformats.org/presentationml/2006/main">
+  <p:cSld>
+    <p:spTree>
+      <p:nvGrpSpPr>
+        <p:cNvPr id="1" name=""/>
+        <p:cNvGrpSpPr/>
+        <p:nvPr/>
+      </p:nvGrpSpPr>
+      <p:grpSpPr>
+        <a:xfrm>
+          <a:off x="0" y="0"/>
+          <a:ext cx="0" cy="0"/>
+          <a:chOff x="0" y="0"/>
+          <a:chExt cx="0" cy="0"/>
+        </a:xfrm>
+      </p:grpSpPr>
+      <p:sp>
+        <p:nvSpPr>
+          <p:cNvPr id="2" name="Title 1"/>
+          <p:cNvSpPr>
+            <a:spLocks noGrp="1"/>
+          </p:cNvSpPr>
+          <p:nvPr>
+            <p:ph type="title"/>
+          </p:nvPr>
+        </p:nvSpPr>
+        <p:spPr/>
+        <p:txBody>
+          <a:bodyPr/>
+          <a:lstStyle/>
+          <a:p>
+            <a:r>
+              <a:rPr lang="en-US" dirty="0" smtClean="0"/>
+              <a:t>Fixed Point</a:t>
+            </a:r>
+            <a:endParaRPr lang="en-US" dirty="0"/>
+          </a:p>
+        </p:txBody>
+      </p:sp>
+      <p:sp>
+        <p:nvSpPr>
+          <p:cNvPr id="4" name="Content Placeholder 3"/>
+          <p:cNvSpPr>
+            <a:spLocks noGrp="1"/>
+          </p:cNvSpPr>
+          <p:nvPr>
+            <p:ph idx="1"/>
+          </p:nvPr>
+        </p:nvSpPr>
+        <p:spPr>
+          <a:xfrm>
+            <a:off x="581736" y="1523052"/>
+            <a:ext cx="8131175" cy="4324350"/>
+          </a:xfrm>
+        </p:spPr>
+        <p:txBody>
+          <a:bodyPr/>
+          <a:lstStyle/>
+          <a:p>
+            <a:r>
+              <a:rPr lang="en-US" b="0" dirty="0"/>
+              <a:t>As you can imagine, some rational real numbers do not have a rational binary representation. </a:t>
+            </a:r>
+            <a:endParaRPr lang="en-US" b="0" dirty="0" smtClean="0"/>
+          </a:p>
+          <a:p>
+            <a:r>
+              <a:rPr lang="en-US" b="0" dirty="0" smtClean="0"/>
+              <a:t>For </a:t>
+            </a:r>
+            <a:r>
+              <a:rPr lang="en-US" b="0" dirty="0"/>
+              <a:t>example, the decimal number 0.1 cannot be represented as a finite binary string of 0's and 1's - it would repeat endlessly. </a:t>
+            </a:r>
+            <a:endParaRPr lang="en-US" b="0" dirty="0" smtClean="0"/>
+          </a:p>
+          <a:p>
+            <a:r>
+              <a:rPr lang="en-US" b="0" dirty="0" smtClean="0"/>
+              <a:t>You </a:t>
+            </a:r>
+            <a:r>
+              <a:rPr lang="en-US" b="0" dirty="0"/>
+              <a:t>can give the conversion a try if you want to prove this yourself.</a:t>
+            </a:r>
+            <a:r>
+              <a:rPr lang="en-US" dirty="0"/>
+              <a:t/>
+            </a:r>
+            <a:br>
+              <a:rPr lang="en-US" dirty="0"/>
+            </a:br>
+            <a:endParaRPr lang="en-US" b="0" dirty="0" smtClean="0"/>
+          </a:p>
+        </p:txBody>
+      </p:sp>
+      <p:sp>
+        <p:nvSpPr>
+          <p:cNvPr id="5" name="Slide Number Placeholder 3"/>
+          <p:cNvSpPr>
+            <a:spLocks noGrp="1"/>
+          </p:cNvSpPr>
+          <p:nvPr>
+            <p:ph type="sldNum" sz="quarter" idx="10"/>
+          </p:nvPr>
+        </p:nvSpPr>
+        <p:spPr>
+          <a:xfrm>
+            <a:off x="6910388" y="6253163"/>
+            <a:ext cx="2133600" cy="476250"/>
+          </a:xfrm>
+        </p:spPr>
+        <p:txBody>
+          <a:bodyPr/>
+          <a:lstStyle/>
+          <a:p>
+            <a:pPr>
+              <a:defRPr/>
+            </a:pPr>
+            <a:fld id="{62D6D4B2-7611-498F-8780-1EDC26277454}" type="slidenum">
+              <a:rPr lang="en-US" smtClean="0">
+                <a:solidFill>
+                  <a:srgbClr val="000000"/>
+                </a:solidFill>
+              </a:rPr>
+              <a:pPr>
+                <a:defRPr/>
+              </a:pPr>
+              <a:t>7</a:t>
+            </a:fld>
+            <a:endParaRPr lang="en-US" dirty="0">
+              <a:solidFill>
+                <a:srgbClr val="000000"/>
+              </a:solidFill>
+            </a:endParaRPr>
+          </a:p>
+        </p:txBody>
+      </p:sp>
+    </p:spTree>
+    <p:extLst>
+      <p:ext uri="{BB962C8B-B14F-4D97-AF65-F5344CB8AC3E}">
+        <p14:creationId xmlns:p14="http://schemas.microsoft.com/office/powerpoint/2010/main" val="196949630"/>
+      </p:ext>
+    </p:extLst>
+  </p:cSld>
+  <p:clrMapOvr>
+    <a:masterClrMapping/>
+  </p:clrMapOvr>
+  <p:timing>
+    <p:tnLst>
+      <p:par>
+        <p:cTn id="1" dur="indefinite" restart="never" nodeType="tmRoot"/>
+      </p:par>
+    </p:tnLst>
+  </p:timing>
+</p:sld>
+</file>
+
+<file path=ppt/slides/slide8.xml><?xml version="1.0" encoding="utf-8"?>
+<p:sld xmlns:a="http://schemas.openxmlformats.org/drawingml/2006/main" xmlns:r="http://schemas.openxmlformats.org/officeDocument/2006/relationships" xmlns:p="http://schemas.openxmlformats.org/presentationml/2006/main">
+  <p:cSld>
+    <p:spTree>
+      <p:nvGrpSpPr>
+        <p:cNvPr id="1" name=""/>
+        <p:cNvGrpSpPr/>
+        <p:nvPr/>
+      </p:nvGrpSpPr>
+      <p:grpSpPr>
+        <a:xfrm>
+          <a:off x="0" y="0"/>
+          <a:ext cx="0" cy="0"/>
+          <a:chOff x="0" y="0"/>
+          <a:chExt cx="0" cy="0"/>
+        </a:xfrm>
+      </p:grpSpPr>
+      <p:sp>
+        <p:nvSpPr>
+          <p:cNvPr id="6" name="Title 5"/>
+          <p:cNvSpPr>
+            <a:spLocks noGrp="1"/>
+          </p:cNvSpPr>
+          <p:nvPr>
+            <p:ph type="title"/>
+          </p:nvPr>
+        </p:nvSpPr>
+        <p:spPr/>
+        <p:txBody>
+          <a:bodyPr anchor="ctr" anchorCtr="0"/>
+          <a:lstStyle/>
+          <a:p>
+            <a:r>
+              <a:rPr lang="en-US" cap="none" dirty="0" smtClean="0"/>
+              <a:t>Fixed Point Arithmetic</a:t>
+            </a:r>
+            <a:endParaRPr lang="en-US" cap="none" dirty="0"/>
+          </a:p>
+        </p:txBody>
+      </p:sp>
+      <p:sp>
+        <p:nvSpPr>
+          <p:cNvPr id="7" name="Text Placeholder 6"/>
+          <p:cNvSpPr>
+            <a:spLocks noGrp="1"/>
+          </p:cNvSpPr>
+          <p:nvPr>
+            <p:ph type="body" idx="1"/>
+          </p:nvPr>
+        </p:nvSpPr>
+        <p:spPr/>
+        <p:txBody>
+          <a:bodyPr/>
+          <a:lstStyle/>
+          <a:p>
+            <a:endParaRPr lang="en-US" dirty="0"/>
+          </a:p>
+        </p:txBody>
+      </p:sp>
+      <p:sp>
+        <p:nvSpPr>
+          <p:cNvPr id="4" name="Slide Number Placeholder 3"/>
+          <p:cNvSpPr>
+            <a:spLocks noGrp="1"/>
+          </p:cNvSpPr>
+          <p:nvPr>
+            <p:ph type="sldNum" sz="quarter" idx="10"/>
+          </p:nvPr>
+        </p:nvSpPr>
+        <p:spPr/>
+        <p:txBody>
+          <a:bodyPr/>
+          <a:lstStyle/>
+          <a:p>
+            <a:pPr>
+              <a:defRPr/>
+            </a:pPr>
+            <a:fld id="{62D6D4B2-7611-498F-8780-1EDC26277454}" type="slidenum">
+              <a:rPr lang="en-US" smtClean="0">
+                <a:solidFill>
+                  <a:srgbClr val="000000"/>
+                </a:solidFill>
+              </a:rPr>
+              <a:pPr>
+                <a:defRPr/>
+              </a:pPr>
+              <a:t>8</a:t>
+            </a:fld>
+            <a:endParaRPr lang="en-US" dirty="0">
+              <a:solidFill>
+                <a:srgbClr val="000000"/>
+              </a:solidFill>
+            </a:endParaRPr>
+          </a:p>
+        </p:txBody>
+      </p:sp>
+    </p:spTree>
+    <p:extLst>
+      <p:ext uri="{BB962C8B-B14F-4D97-AF65-F5344CB8AC3E}">
+        <p14:creationId xmlns:p14="http://schemas.microsoft.com/office/powerpoint/2010/main" val="2722273138"/>
+      </p:ext>
+    </p:extLst>
+  </p:cSld>
+  <p:clrMapOvr>
+    <a:masterClrMapping/>
+  </p:clrMapOvr>
+  <p:timing>
+    <p:tnLst>
+      <p:par>
+        <p:cTn id="1" dur="indefinite" restart="never" nodeType="tmRoot"/>
+      </p:par>
+    </p:tnLst>
+  </p:timing>
+</p:sld>
+</file>
+
 <file path=ppt/slides/slide9.xml><?xml version="1.0" encoding="utf-8"?>
 <p:sld xmlns:a="http://schemas.openxmlformats.org/drawingml/2006/main" xmlns:r="http://schemas.openxmlformats.org/officeDocument/2006/relationships" xmlns:p="http://schemas.openxmlformats.org/presentationml/2006/main">
   <p:cSld>
@@ -15227,35 +16227,12 @@
       </p:grpSpPr>
       <p:sp>
         <p:nvSpPr>
-          <p:cNvPr id="6" name="Title 5"/>
+          <p:cNvPr id="2" name="Title 1"/>
           <p:cNvSpPr>
             <a:spLocks noGrp="1"/>
           </p:cNvSpPr>
           <p:nvPr>
             <p:ph type="title"/>
-          </p:nvPr>
-        </p:nvSpPr>
-        <p:spPr/>
-        <p:txBody>
-          <a:bodyPr anchor="ctr" anchorCtr="0"/>
-          <a:lstStyle/>
-          <a:p>
-            <a:r>
-              <a:rPr lang="en-US" cap="none" dirty="0" smtClean="0"/>
-              <a:t>Fixed Point Arithmetic</a:t>
-            </a:r>
-            <a:endParaRPr lang="en-US" cap="none" dirty="0"/>
-          </a:p>
-        </p:txBody>
-      </p:sp>
-      <p:sp>
-        <p:nvSpPr>
-          <p:cNvPr id="7" name="Text Placeholder 6"/>
-          <p:cNvSpPr>
-            <a:spLocks noGrp="1"/>
-          </p:cNvSpPr>
-          <p:nvPr>
-            <p:ph type="body" idx="1"/>
           </p:nvPr>
         </p:nvSpPr>
         <p:spPr/>
@@ -15263,21 +16240,80 @@
           <a:bodyPr/>
           <a:lstStyle/>
           <a:p>
+            <a:r>
+              <a:rPr lang="en-US" dirty="0" smtClean="0"/>
+              <a:t>Fixed Point Arithmetic</a:t>
+            </a:r>
             <a:endParaRPr lang="en-US" dirty="0"/>
           </a:p>
         </p:txBody>
       </p:sp>
       <p:sp>
         <p:nvSpPr>
-          <p:cNvPr id="4" name="Slide Number Placeholder 3"/>
+          <p:cNvPr id="4" name="Content Placeholder 3"/>
           <p:cNvSpPr>
             <a:spLocks noGrp="1"/>
           </p:cNvSpPr>
           <p:nvPr>
+            <p:ph idx="1"/>
+          </p:nvPr>
+        </p:nvSpPr>
+        <p:spPr>
+          <a:xfrm>
+            <a:off x="581736" y="1523052"/>
+            <a:ext cx="8393452" cy="4324350"/>
+          </a:xfrm>
+        </p:spPr>
+        <p:txBody>
+          <a:bodyPr/>
+          <a:lstStyle/>
+          <a:p>
+            <a:r>
+              <a:rPr lang="en-US" b="0" dirty="0"/>
+              <a:t>Fixed point </a:t>
+            </a:r>
+            <a:r>
+              <a:rPr lang="en-US" b="0" dirty="0" smtClean="0"/>
+              <a:t>numbers vs floating point?</a:t>
+            </a:r>
+          </a:p>
+          <a:p>
+            <a:r>
+              <a:rPr lang="en-US" b="0" dirty="0" smtClean="0"/>
+              <a:t>Can represent </a:t>
+            </a:r>
+            <a:r>
+              <a:rPr lang="en-US" b="0" dirty="0"/>
+              <a:t>numbers with </a:t>
+            </a:r>
+            <a:r>
+              <a:rPr lang="en-US" b="0" dirty="0" smtClean="0"/>
+              <a:t>fractions even when hardware </a:t>
+            </a:r>
+            <a:r>
+              <a:rPr lang="en-US" b="0" dirty="0"/>
+              <a:t>resources are limited or you would like to keep complexity to a minimum. </a:t>
+            </a:r>
+            <a:endParaRPr lang="en-US" b="0" dirty="0" smtClean="0"/>
+          </a:p>
+        </p:txBody>
+      </p:sp>
+      <p:sp>
+        <p:nvSpPr>
+          <p:cNvPr id="5" name="Slide Number Placeholder 3"/>
+          <p:cNvSpPr>
+            <a:spLocks noGrp="1"/>
+          </p:cNvSpPr>
+          <p:nvPr>
             <p:ph type="sldNum" sz="quarter" idx="10"/>
           </p:nvPr>
         </p:nvSpPr>
-        <p:spPr/>
+        <p:spPr>
+          <a:xfrm>
+            <a:off x="6910388" y="6253163"/>
+            <a:ext cx="2133600" cy="476250"/>
+          </a:xfrm>
+        </p:spPr>
         <p:txBody>
           <a:bodyPr/>
           <a:lstStyle/>
@@ -15307,7 +16343,7 @@
     </p:spTree>
     <p:extLst>
       <p:ext uri="{BB962C8B-B14F-4D97-AF65-F5344CB8AC3E}">
-        <p14:creationId xmlns:p14="http://schemas.microsoft.com/office/powerpoint/2010/main" val="2722273138"/>
+        <p14:creationId xmlns:p14="http://schemas.microsoft.com/office/powerpoint/2010/main" val="2317855813"/>
       </p:ext>
     </p:extLst>
   </p:cSld>
@@ -15317,7 +16353,79 @@
   <p:timing>
     <p:tnLst>
       <p:par>
-        <p:cTn id="1" dur="indefinite" restart="never" nodeType="tmRoot"/>
+        <p:cTn id="1" dur="indefinite" restart="never" nodeType="tmRoot">
+          <p:childTnLst>
+            <p:seq concurrent="1" nextAc="seek">
+              <p:cTn id="2" dur="indefinite" nodeType="mainSeq">
+                <p:childTnLst>
+                  <p:par>
+                    <p:cTn id="3" fill="hold">
+                      <p:stCondLst>
+                        <p:cond delay="indefinite"/>
+                      </p:stCondLst>
+                      <p:childTnLst>
+                        <p:par>
+                          <p:cTn id="4" fill="hold">
+                            <p:stCondLst>
+                              <p:cond delay="0"/>
+                            </p:stCondLst>
+                            <p:childTnLst>
+                              <p:par>
+                                <p:cTn id="5" presetID="1" presetClass="entr" presetSubtype="0" fill="hold" nodeType="clickEffect">
+                                  <p:stCondLst>
+                                    <p:cond delay="0"/>
+                                  </p:stCondLst>
+                                  <p:childTnLst>
+                                    <p:set>
+                                      <p:cBhvr>
+                                        <p:cTn id="6" dur="1" fill="hold">
+                                          <p:stCondLst>
+                                            <p:cond delay="0"/>
+                                          </p:stCondLst>
+                                        </p:cTn>
+                                        <p:tgtEl>
+                                          <p:spTgt spid="4">
+                                            <p:txEl>
+                                              <p:pRg st="1" end="1"/>
+                                            </p:txEl>
+                                          </p:spTgt>
+                                        </p:tgtEl>
+                                        <p:attrNameLst>
+                                          <p:attrName>style.visibility</p:attrName>
+                                        </p:attrNameLst>
+                                      </p:cBhvr>
+                                      <p:to>
+                                        <p:strVal val="visible"/>
+                                      </p:to>
+                                    </p:set>
+                                  </p:childTnLst>
+                                </p:cTn>
+                              </p:par>
+                            </p:childTnLst>
+                          </p:cTn>
+                        </p:par>
+                      </p:childTnLst>
+                    </p:cTn>
+                  </p:par>
+                </p:childTnLst>
+              </p:cTn>
+              <p:prevCondLst>
+                <p:cond evt="onPrev" delay="0">
+                  <p:tgtEl>
+                    <p:sldTgt/>
+                  </p:tgtEl>
+                </p:cond>
+              </p:prevCondLst>
+              <p:nextCondLst>
+                <p:cond evt="onNext" delay="0">
+                  <p:tgtEl>
+                    <p:sldTgt/>
+                  </p:tgtEl>
+                </p:cond>
+              </p:nextCondLst>
+            </p:seq>
+          </p:childTnLst>
+        </p:cTn>
       </p:par>
     </p:tnLst>
   </p:timing>

</xml_diff>

<commit_message>
Updating schedule for Lecture 24 and updating slides, handout and minor edits to notes for Lecture 24
</commit_message>
<xml_diff>
--- a/lecture/slides/ECE_383_Lec23.pptx
+++ b/lecture/slides/ECE_383_Lec23.pptx
@@ -6,10 +6,10 @@
     <p:sldMasterId id="2147483687" r:id="rId2"/>
   </p:sldMasterIdLst>
   <p:notesMasterIdLst>
-    <p:notesMasterId r:id="rId27"/>
+    <p:notesMasterId r:id="rId29"/>
   </p:notesMasterIdLst>
   <p:handoutMasterIdLst>
-    <p:handoutMasterId r:id="rId28"/>
+    <p:handoutMasterId r:id="rId30"/>
   </p:handoutMasterIdLst>
   <p:sldIdLst>
     <p:sldId id="377" r:id="rId3"/>
@@ -18,24 +18,26 @@
     <p:sldId id="360" r:id="rId6"/>
     <p:sldId id="361" r:id="rId7"/>
     <p:sldId id="362" r:id="rId8"/>
-    <p:sldId id="378" r:id="rId9"/>
-    <p:sldId id="364" r:id="rId10"/>
-    <p:sldId id="376" r:id="rId11"/>
-    <p:sldId id="379" r:id="rId12"/>
-    <p:sldId id="365" r:id="rId13"/>
-    <p:sldId id="366" r:id="rId14"/>
-    <p:sldId id="367" r:id="rId15"/>
-    <p:sldId id="368" r:id="rId16"/>
-    <p:sldId id="356" r:id="rId17"/>
-    <p:sldId id="358" r:id="rId18"/>
-    <p:sldId id="380" r:id="rId19"/>
-    <p:sldId id="369" r:id="rId20"/>
-    <p:sldId id="370" r:id="rId21"/>
-    <p:sldId id="373" r:id="rId22"/>
-    <p:sldId id="374" r:id="rId23"/>
-    <p:sldId id="372" r:id="rId24"/>
-    <p:sldId id="375" r:id="rId25"/>
-    <p:sldId id="371" r:id="rId26"/>
+    <p:sldId id="381" r:id="rId9"/>
+    <p:sldId id="382" r:id="rId10"/>
+    <p:sldId id="378" r:id="rId11"/>
+    <p:sldId id="364" r:id="rId12"/>
+    <p:sldId id="376" r:id="rId13"/>
+    <p:sldId id="379" r:id="rId14"/>
+    <p:sldId id="365" r:id="rId15"/>
+    <p:sldId id="366" r:id="rId16"/>
+    <p:sldId id="367" r:id="rId17"/>
+    <p:sldId id="368" r:id="rId18"/>
+    <p:sldId id="356" r:id="rId19"/>
+    <p:sldId id="358" r:id="rId20"/>
+    <p:sldId id="380" r:id="rId21"/>
+    <p:sldId id="369" r:id="rId22"/>
+    <p:sldId id="370" r:id="rId23"/>
+    <p:sldId id="373" r:id="rId24"/>
+    <p:sldId id="374" r:id="rId25"/>
+    <p:sldId id="372" r:id="rId26"/>
+    <p:sldId id="375" r:id="rId27"/>
+    <p:sldId id="371" r:id="rId28"/>
   </p:sldIdLst>
   <p:sldSz cx="9144000" cy="6858000" type="screen4x3"/>
   <p:notesSz cx="6985000" cy="9283700"/>
@@ -9036,12 +9038,35 @@
       </p:grpSpPr>
       <p:sp>
         <p:nvSpPr>
-          <p:cNvPr id="2" name="Title 1"/>
+          <p:cNvPr id="6" name="Title 5"/>
           <p:cNvSpPr>
             <a:spLocks noGrp="1"/>
           </p:cNvSpPr>
           <p:nvPr>
             <p:ph type="title"/>
+          </p:nvPr>
+        </p:nvSpPr>
+        <p:spPr/>
+        <p:txBody>
+          <a:bodyPr anchor="ctr" anchorCtr="0"/>
+          <a:lstStyle/>
+          <a:p>
+            <a:r>
+              <a:rPr lang="en-US" cap="none" dirty="0" smtClean="0"/>
+              <a:t>Fixed Point Arithmetic</a:t>
+            </a:r>
+            <a:endParaRPr lang="en-US" cap="none" dirty="0"/>
+          </a:p>
+        </p:txBody>
+      </p:sp>
+      <p:sp>
+        <p:nvSpPr>
+          <p:cNvPr id="7" name="Text Placeholder 6"/>
+          <p:cNvSpPr>
+            <a:spLocks noGrp="1"/>
+          </p:cNvSpPr>
+          <p:nvPr>
+            <p:ph type="body" idx="1"/>
           </p:nvPr>
         </p:nvSpPr>
         <p:spPr/>
@@ -9049,144 +9074,21 @@
           <a:bodyPr/>
           <a:lstStyle/>
           <a:p>
-            <a:r>
-              <a:rPr lang="en-US" dirty="0" smtClean="0"/>
-              <a:t>Fixed Point Arithmetic</a:t>
-            </a:r>
             <a:endParaRPr lang="en-US" dirty="0"/>
           </a:p>
         </p:txBody>
       </p:sp>
       <p:sp>
         <p:nvSpPr>
-          <p:cNvPr id="4" name="Content Placeholder 3"/>
+          <p:cNvPr id="4" name="Slide Number Placeholder 3"/>
           <p:cNvSpPr>
             <a:spLocks noGrp="1"/>
           </p:cNvSpPr>
           <p:nvPr>
-            <p:ph idx="1"/>
-          </p:nvPr>
-        </p:nvSpPr>
-        <p:spPr>
-          <a:xfrm>
-            <a:off x="581736" y="1523052"/>
-            <a:ext cx="8393452" cy="4324350"/>
-          </a:xfrm>
-        </p:spPr>
-        <p:txBody>
-          <a:bodyPr/>
-          <a:lstStyle/>
-          <a:p>
-            <a:pPr marL="0" indent="0">
-              <a:buNone/>
-            </a:pPr>
-            <a:endParaRPr lang="en-US" b="0" dirty="0" smtClean="0"/>
-          </a:p>
-          <a:p>
-            <a:pPr marL="0" indent="0">
-              <a:buNone/>
-            </a:pPr>
-            <a:r>
-              <a:rPr lang="pl-PL" b="0" dirty="0" smtClean="0"/>
-              <a:t>W7 </a:t>
-            </a:r>
-            <a:r>
-              <a:rPr lang="pl-PL" b="0" dirty="0"/>
-              <a:t>W6 W5 W4 W3 W2 W1 W0 . F7 F6 F5 F4 F3 F2 F1 </a:t>
-            </a:r>
-            <a:r>
-              <a:rPr lang="en-US" b="0" dirty="0" smtClean="0"/>
-              <a:t>F0</a:t>
-            </a:r>
-          </a:p>
-          <a:p>
-            <a:pPr marL="0" indent="0">
-              <a:buNone/>
-            </a:pPr>
-            <a:endParaRPr lang="en-US" b="0" dirty="0" smtClean="0"/>
-          </a:p>
-          <a:p>
-            <a:r>
-              <a:rPr lang="en-US" b="0" dirty="0" smtClean="0"/>
-              <a:t>The 8 </a:t>
-            </a:r>
-            <a:r>
-              <a:rPr lang="en-US" b="0" dirty="0"/>
-              <a:t>W-bits represent the </a:t>
-            </a:r>
-            <a:r>
-              <a:rPr lang="en-US" b="0" u="sng" dirty="0"/>
-              <a:t>whole</a:t>
-            </a:r>
-            <a:r>
-              <a:rPr lang="en-US" b="0" dirty="0"/>
-              <a:t> </a:t>
-            </a:r>
-            <a:r>
-              <a:rPr lang="en-US" b="0" dirty="0" smtClean="0"/>
-              <a:t>portion</a:t>
-            </a:r>
-          </a:p>
-          <a:p>
-            <a:r>
-              <a:rPr lang="en-US" b="0" dirty="0" smtClean="0"/>
-              <a:t>The </a:t>
-            </a:r>
-            <a:r>
-              <a:rPr lang="en-US" b="0" dirty="0"/>
-              <a:t>8 F-bits represent the </a:t>
-            </a:r>
-            <a:r>
-              <a:rPr lang="en-US" b="0" u="sng" dirty="0"/>
-              <a:t>fractional</a:t>
-            </a:r>
-            <a:r>
-              <a:rPr lang="en-US" b="0" dirty="0"/>
-              <a:t> </a:t>
-            </a:r>
-            <a:r>
-              <a:rPr lang="en-US" b="0" dirty="0" smtClean="0"/>
-              <a:t>portion</a:t>
-            </a:r>
-          </a:p>
-          <a:p>
-            <a:r>
-              <a:rPr lang="en-US" b="0" dirty="0"/>
-              <a:t>The resulting 16-bit number can be manipulated as a whole with some minor book keeping to keep track of the </a:t>
-            </a:r>
-            <a:r>
-              <a:rPr lang="en-US" b="0" dirty="0" smtClean="0"/>
-              <a:t>binary point </a:t>
-            </a:r>
-          </a:p>
-          <a:p>
-            <a:r>
-              <a:rPr lang="en-US" b="0" dirty="0" smtClean="0"/>
-              <a:t>This is Q8.8 format</a:t>
-            </a:r>
-            <a:endParaRPr lang="en-US" b="0" dirty="0" smtClean="0"/>
-          </a:p>
-          <a:p>
-            <a:endParaRPr lang="en-US" b="0" dirty="0" smtClean="0"/>
-          </a:p>
-        </p:txBody>
-      </p:sp>
-      <p:sp>
-        <p:nvSpPr>
-          <p:cNvPr id="5" name="Slide Number Placeholder 3"/>
-          <p:cNvSpPr>
-            <a:spLocks noGrp="1"/>
-          </p:cNvSpPr>
-          <p:nvPr>
             <p:ph type="sldNum" sz="quarter" idx="10"/>
           </p:nvPr>
         </p:nvSpPr>
-        <p:spPr>
-          <a:xfrm>
-            <a:off x="6910388" y="6253163"/>
-            <a:ext cx="2133600" cy="476250"/>
-          </a:xfrm>
-        </p:spPr>
+        <p:spPr/>
         <p:txBody>
           <a:bodyPr/>
           <a:lstStyle/>
@@ -9204,6 +9106,475 @@
                 <a:defRPr/>
               </a:pPr>
               <a:t>10</a:t>
+            </a:fld>
+            <a:endParaRPr lang="en-US" dirty="0">
+              <a:solidFill>
+                <a:srgbClr val="000000"/>
+              </a:solidFill>
+            </a:endParaRPr>
+          </a:p>
+        </p:txBody>
+      </p:sp>
+    </p:spTree>
+    <p:extLst>
+      <p:ext uri="{BB962C8B-B14F-4D97-AF65-F5344CB8AC3E}">
+        <p14:creationId xmlns:p14="http://schemas.microsoft.com/office/powerpoint/2010/main" val="2722273138"/>
+      </p:ext>
+    </p:extLst>
+  </p:cSld>
+  <p:clrMapOvr>
+    <a:masterClrMapping/>
+  </p:clrMapOvr>
+  <p:timing>
+    <p:tnLst>
+      <p:par>
+        <p:cTn id="1" dur="indefinite" restart="never" nodeType="tmRoot"/>
+      </p:par>
+    </p:tnLst>
+  </p:timing>
+</p:sld>
+</file>
+
+<file path=ppt/slides/slide11.xml><?xml version="1.0" encoding="utf-8"?>
+<p:sld xmlns:a="http://schemas.openxmlformats.org/drawingml/2006/main" xmlns:r="http://schemas.openxmlformats.org/officeDocument/2006/relationships" xmlns:p="http://schemas.openxmlformats.org/presentationml/2006/main">
+  <p:cSld>
+    <p:spTree>
+      <p:nvGrpSpPr>
+        <p:cNvPr id="1" name=""/>
+        <p:cNvGrpSpPr/>
+        <p:nvPr/>
+      </p:nvGrpSpPr>
+      <p:grpSpPr>
+        <a:xfrm>
+          <a:off x="0" y="0"/>
+          <a:ext cx="0" cy="0"/>
+          <a:chOff x="0" y="0"/>
+          <a:chExt cx="0" cy="0"/>
+        </a:xfrm>
+      </p:grpSpPr>
+      <p:sp>
+        <p:nvSpPr>
+          <p:cNvPr id="2" name="Title 1"/>
+          <p:cNvSpPr>
+            <a:spLocks noGrp="1"/>
+          </p:cNvSpPr>
+          <p:nvPr>
+            <p:ph type="title"/>
+          </p:nvPr>
+        </p:nvSpPr>
+        <p:spPr/>
+        <p:txBody>
+          <a:bodyPr/>
+          <a:lstStyle/>
+          <a:p>
+            <a:r>
+              <a:rPr lang="en-US" dirty="0" smtClean="0"/>
+              <a:t>Fixed Point Arithmetic</a:t>
+            </a:r>
+            <a:endParaRPr lang="en-US" dirty="0"/>
+          </a:p>
+        </p:txBody>
+      </p:sp>
+      <p:sp>
+        <p:nvSpPr>
+          <p:cNvPr id="4" name="Content Placeholder 3"/>
+          <p:cNvSpPr>
+            <a:spLocks noGrp="1"/>
+          </p:cNvSpPr>
+          <p:nvPr>
+            <p:ph idx="1"/>
+          </p:nvPr>
+        </p:nvSpPr>
+        <p:spPr>
+          <a:xfrm>
+            <a:off x="581736" y="1523052"/>
+            <a:ext cx="8393452" cy="4324350"/>
+          </a:xfrm>
+        </p:spPr>
+        <p:txBody>
+          <a:bodyPr/>
+          <a:lstStyle/>
+          <a:p>
+            <a:r>
+              <a:rPr lang="en-US" b="0" dirty="0"/>
+              <a:t>Fixed point </a:t>
+            </a:r>
+            <a:r>
+              <a:rPr lang="en-US" b="0" dirty="0" smtClean="0"/>
+              <a:t>numbers vs floating point?</a:t>
+            </a:r>
+          </a:p>
+          <a:p>
+            <a:r>
+              <a:rPr lang="en-US" b="0" dirty="0" smtClean="0"/>
+              <a:t>Can represent </a:t>
+            </a:r>
+            <a:r>
+              <a:rPr lang="en-US" b="0" dirty="0"/>
+              <a:t>numbers with </a:t>
+            </a:r>
+            <a:r>
+              <a:rPr lang="en-US" b="0" dirty="0" smtClean="0"/>
+              <a:t>fractions even when hardware </a:t>
+            </a:r>
+            <a:r>
+              <a:rPr lang="en-US" b="0" dirty="0"/>
+              <a:t>resources are limited or you would like to keep complexity to a minimum. </a:t>
+            </a:r>
+            <a:endParaRPr lang="en-US" b="0" dirty="0" smtClean="0"/>
+          </a:p>
+        </p:txBody>
+      </p:sp>
+      <p:sp>
+        <p:nvSpPr>
+          <p:cNvPr id="5" name="Slide Number Placeholder 3"/>
+          <p:cNvSpPr>
+            <a:spLocks noGrp="1"/>
+          </p:cNvSpPr>
+          <p:nvPr>
+            <p:ph type="sldNum" sz="quarter" idx="10"/>
+          </p:nvPr>
+        </p:nvSpPr>
+        <p:spPr>
+          <a:xfrm>
+            <a:off x="6910388" y="6253163"/>
+            <a:ext cx="2133600" cy="476250"/>
+          </a:xfrm>
+        </p:spPr>
+        <p:txBody>
+          <a:bodyPr/>
+          <a:lstStyle/>
+          <a:p>
+            <a:pPr>
+              <a:defRPr/>
+            </a:pPr>
+            <a:fld id="{62D6D4B2-7611-498F-8780-1EDC26277454}" type="slidenum">
+              <a:rPr lang="en-US" smtClean="0">
+                <a:solidFill>
+                  <a:srgbClr val="000000"/>
+                </a:solidFill>
+              </a:rPr>
+              <a:pPr>
+                <a:defRPr/>
+              </a:pPr>
+              <a:t>11</a:t>
+            </a:fld>
+            <a:endParaRPr lang="en-US" dirty="0">
+              <a:solidFill>
+                <a:srgbClr val="000000"/>
+              </a:solidFill>
+            </a:endParaRPr>
+          </a:p>
+        </p:txBody>
+      </p:sp>
+    </p:spTree>
+    <p:extLst>
+      <p:ext uri="{BB962C8B-B14F-4D97-AF65-F5344CB8AC3E}">
+        <p14:creationId xmlns:p14="http://schemas.microsoft.com/office/powerpoint/2010/main" val="2317855813"/>
+      </p:ext>
+    </p:extLst>
+  </p:cSld>
+  <p:clrMapOvr>
+    <a:masterClrMapping/>
+  </p:clrMapOvr>
+  <p:timing>
+    <p:tnLst>
+      <p:par>
+        <p:cTn id="1" dur="indefinite" restart="never" nodeType="tmRoot">
+          <p:childTnLst>
+            <p:seq concurrent="1" nextAc="seek">
+              <p:cTn id="2" dur="indefinite" nodeType="mainSeq">
+                <p:childTnLst>
+                  <p:par>
+                    <p:cTn id="3" fill="hold">
+                      <p:stCondLst>
+                        <p:cond delay="indefinite"/>
+                      </p:stCondLst>
+                      <p:childTnLst>
+                        <p:par>
+                          <p:cTn id="4" fill="hold">
+                            <p:stCondLst>
+                              <p:cond delay="0"/>
+                            </p:stCondLst>
+                            <p:childTnLst>
+                              <p:par>
+                                <p:cTn id="5" presetID="1" presetClass="entr" presetSubtype="0" fill="hold" nodeType="clickEffect">
+                                  <p:stCondLst>
+                                    <p:cond delay="0"/>
+                                  </p:stCondLst>
+                                  <p:childTnLst>
+                                    <p:set>
+                                      <p:cBhvr>
+                                        <p:cTn id="6" dur="1" fill="hold">
+                                          <p:stCondLst>
+                                            <p:cond delay="0"/>
+                                          </p:stCondLst>
+                                        </p:cTn>
+                                        <p:tgtEl>
+                                          <p:spTgt spid="4">
+                                            <p:txEl>
+                                              <p:pRg st="1" end="1"/>
+                                            </p:txEl>
+                                          </p:spTgt>
+                                        </p:tgtEl>
+                                        <p:attrNameLst>
+                                          <p:attrName>style.visibility</p:attrName>
+                                        </p:attrNameLst>
+                                      </p:cBhvr>
+                                      <p:to>
+                                        <p:strVal val="visible"/>
+                                      </p:to>
+                                    </p:set>
+                                  </p:childTnLst>
+                                </p:cTn>
+                              </p:par>
+                            </p:childTnLst>
+                          </p:cTn>
+                        </p:par>
+                      </p:childTnLst>
+                    </p:cTn>
+                  </p:par>
+                </p:childTnLst>
+              </p:cTn>
+              <p:prevCondLst>
+                <p:cond evt="onPrev" delay="0">
+                  <p:tgtEl>
+                    <p:sldTgt/>
+                  </p:tgtEl>
+                </p:cond>
+              </p:prevCondLst>
+              <p:nextCondLst>
+                <p:cond evt="onNext" delay="0">
+                  <p:tgtEl>
+                    <p:sldTgt/>
+                  </p:tgtEl>
+                </p:cond>
+              </p:nextCondLst>
+            </p:seq>
+          </p:childTnLst>
+        </p:cTn>
+      </p:par>
+    </p:tnLst>
+  </p:timing>
+</p:sld>
+</file>
+
+<file path=ppt/slides/slide12.xml><?xml version="1.0" encoding="utf-8"?>
+<p:sld xmlns:a="http://schemas.openxmlformats.org/drawingml/2006/main" xmlns:r="http://schemas.openxmlformats.org/officeDocument/2006/relationships" xmlns:p="http://schemas.openxmlformats.org/presentationml/2006/main">
+  <p:cSld>
+    <p:spTree>
+      <p:nvGrpSpPr>
+        <p:cNvPr id="1" name=""/>
+        <p:cNvGrpSpPr/>
+        <p:nvPr/>
+      </p:nvGrpSpPr>
+      <p:grpSpPr>
+        <a:xfrm>
+          <a:off x="0" y="0"/>
+          <a:ext cx="0" cy="0"/>
+          <a:chOff x="0" y="0"/>
+          <a:chExt cx="0" cy="0"/>
+        </a:xfrm>
+      </p:grpSpPr>
+      <p:sp>
+        <p:nvSpPr>
+          <p:cNvPr id="2" name="Title 1"/>
+          <p:cNvSpPr>
+            <a:spLocks noGrp="1"/>
+          </p:cNvSpPr>
+          <p:nvPr>
+            <p:ph type="title"/>
+          </p:nvPr>
+        </p:nvSpPr>
+        <p:spPr/>
+        <p:txBody>
+          <a:bodyPr/>
+          <a:lstStyle/>
+          <a:p>
+            <a:r>
+              <a:rPr lang="en-US" dirty="0" smtClean="0"/>
+              <a:t>Fixed Point Arithmetic</a:t>
+            </a:r>
+            <a:endParaRPr lang="en-US" dirty="0"/>
+          </a:p>
+        </p:txBody>
+      </p:sp>
+      <p:sp>
+        <p:nvSpPr>
+          <p:cNvPr id="4" name="Content Placeholder 3"/>
+          <p:cNvSpPr>
+            <a:spLocks noGrp="1"/>
+          </p:cNvSpPr>
+          <p:nvPr>
+            <p:ph idx="1"/>
+          </p:nvPr>
+        </p:nvSpPr>
+        <p:spPr>
+          <a:xfrm>
+            <a:off x="581736" y="1523052"/>
+            <a:ext cx="8393452" cy="4324350"/>
+          </a:xfrm>
+        </p:spPr>
+        <p:txBody>
+          <a:bodyPr/>
+          <a:lstStyle/>
+          <a:p>
+            <a:r>
+              <a:rPr lang="en-US" b="0" dirty="0"/>
+              <a:t>Implied binary point (or Radix) </a:t>
+            </a:r>
+            <a:endParaRPr lang="en-US" b="0" dirty="0" smtClean="0"/>
+          </a:p>
+          <a:p>
+            <a:r>
+              <a:rPr lang="en-US" b="0" dirty="0" smtClean="0"/>
+              <a:t>It’s </a:t>
+            </a:r>
+            <a:r>
+              <a:rPr lang="en-US" b="0" dirty="0"/>
+              <a:t>your job as the Engineer to </a:t>
+            </a:r>
+            <a:r>
+              <a:rPr lang="en-US" b="0" dirty="0" smtClean="0"/>
+              <a:t>track the </a:t>
+            </a:r>
+            <a:r>
+              <a:rPr lang="en-US" b="0" dirty="0"/>
+              <a:t>binary </a:t>
+            </a:r>
+            <a:r>
+              <a:rPr lang="en-US" b="0" dirty="0" smtClean="0"/>
+              <a:t>point</a:t>
+            </a:r>
+            <a:endParaRPr lang="en-US" b="0" dirty="0"/>
+          </a:p>
+          <a:p>
+            <a:pPr marL="0" indent="0">
+              <a:buNone/>
+            </a:pPr>
+            <a:endParaRPr lang="en-US" b="0" dirty="0" smtClean="0"/>
+          </a:p>
+          <a:p>
+            <a:pPr marL="0" indent="0">
+              <a:buNone/>
+            </a:pPr>
+            <a:r>
+              <a:rPr lang="pl-PL" b="0" dirty="0" smtClean="0"/>
+              <a:t>W7 </a:t>
+            </a:r>
+            <a:r>
+              <a:rPr lang="pl-PL" b="0" dirty="0"/>
+              <a:t>W6 W5 W4 W3 W2 W1 W0 . F7 F6 F5 F4 F3 F2 F1 </a:t>
+            </a:r>
+            <a:r>
+              <a:rPr lang="en-US" b="0" dirty="0" smtClean="0"/>
+              <a:t>F0</a:t>
+            </a:r>
+          </a:p>
+          <a:p>
+            <a:pPr marL="0" indent="0">
+              <a:buNone/>
+            </a:pPr>
+            <a:endParaRPr lang="en-US" b="0" dirty="0" smtClean="0"/>
+          </a:p>
+          <a:p>
+            <a:r>
+              <a:rPr lang="en-US" b="0" dirty="0" smtClean="0"/>
+              <a:t>The 8 </a:t>
+            </a:r>
+            <a:r>
+              <a:rPr lang="en-US" b="0" dirty="0"/>
+              <a:t>W-bits represent the </a:t>
+            </a:r>
+            <a:r>
+              <a:rPr lang="en-US" b="0" u="sng" dirty="0"/>
+              <a:t>whole</a:t>
+            </a:r>
+            <a:r>
+              <a:rPr lang="en-US" b="0" dirty="0"/>
+              <a:t> </a:t>
+            </a:r>
+            <a:r>
+              <a:rPr lang="en-US" b="0" dirty="0" smtClean="0"/>
+              <a:t>portion</a:t>
+            </a:r>
+          </a:p>
+          <a:p>
+            <a:r>
+              <a:rPr lang="en-US" b="0" dirty="0" smtClean="0"/>
+              <a:t>The </a:t>
+            </a:r>
+            <a:r>
+              <a:rPr lang="en-US" b="0" dirty="0"/>
+              <a:t>8 F-bits represent the </a:t>
+            </a:r>
+            <a:r>
+              <a:rPr lang="en-US" b="0" u="sng" dirty="0"/>
+              <a:t>fractional</a:t>
+            </a:r>
+            <a:r>
+              <a:rPr lang="en-US" b="0" dirty="0"/>
+              <a:t> </a:t>
+            </a:r>
+            <a:r>
+              <a:rPr lang="en-US" b="0" dirty="0" smtClean="0"/>
+              <a:t>portion</a:t>
+            </a:r>
+          </a:p>
+          <a:p>
+            <a:r>
+              <a:rPr lang="en-US" b="0" dirty="0"/>
+              <a:t>The resulting 16-bit number can be manipulated as a whole with some minor book keeping to keep track of the </a:t>
+            </a:r>
+            <a:r>
+              <a:rPr lang="en-US" b="0" dirty="0" smtClean="0"/>
+              <a:t>binary point </a:t>
+            </a:r>
+          </a:p>
+          <a:p>
+            <a:r>
+              <a:rPr lang="en-US" b="0" dirty="0" smtClean="0"/>
+              <a:t>This is Q8.8 format</a:t>
+            </a:r>
+          </a:p>
+          <a:p>
+            <a:endParaRPr lang="en-US" b="0" dirty="0" smtClean="0"/>
+          </a:p>
+        </p:txBody>
+      </p:sp>
+      <p:sp>
+        <p:nvSpPr>
+          <p:cNvPr id="5" name="Slide Number Placeholder 3"/>
+          <p:cNvSpPr>
+            <a:spLocks noGrp="1"/>
+          </p:cNvSpPr>
+          <p:nvPr>
+            <p:ph type="sldNum" sz="quarter" idx="10"/>
+          </p:nvPr>
+        </p:nvSpPr>
+        <p:spPr>
+          <a:xfrm>
+            <a:off x="6910388" y="6253163"/>
+            <a:ext cx="2133600" cy="476250"/>
+          </a:xfrm>
+        </p:spPr>
+        <p:txBody>
+          <a:bodyPr/>
+          <a:lstStyle/>
+          <a:p>
+            <a:pPr>
+              <a:defRPr/>
+            </a:pPr>
+            <a:fld id="{62D6D4B2-7611-498F-8780-1EDC26277454}" type="slidenum">
+              <a:rPr lang="en-US" smtClean="0">
+                <a:solidFill>
+                  <a:srgbClr val="000000"/>
+                </a:solidFill>
+              </a:rPr>
+              <a:pPr>
+                <a:defRPr/>
+              </a:pPr>
+              <a:t>12</a:t>
             </a:fld>
             <a:endParaRPr lang="en-US" dirty="0">
               <a:solidFill>
@@ -9259,7 +9630,7 @@
                                         <p:tgtEl>
                                           <p:spTgt spid="4">
                                             <p:txEl>
-                                              <p:pRg st="3" end="3"/>
+                                              <p:pRg st="5" end="5"/>
                                             </p:txEl>
                                           </p:spTgt>
                                         </p:tgtEl>
@@ -9308,7 +9679,7 @@
                                         <p:tgtEl>
                                           <p:spTgt spid="4">
                                             <p:txEl>
-                                              <p:pRg st="4" end="4"/>
+                                              <p:pRg st="6" end="6"/>
                                             </p:txEl>
                                           </p:spTgt>
                                         </p:tgtEl>
@@ -9357,7 +9728,7 @@
                                         <p:tgtEl>
                                           <p:spTgt spid="4">
                                             <p:txEl>
-                                              <p:pRg st="5" end="5"/>
+                                              <p:pRg st="7" end="7"/>
                                             </p:txEl>
                                           </p:spTgt>
                                         </p:tgtEl>
@@ -9406,7 +9777,7 @@
                                         <p:tgtEl>
                                           <p:spTgt spid="4">
                                             <p:txEl>
-                                              <p:pRg st="6" end="6"/>
+                                              <p:pRg st="8" end="8"/>
                                             </p:txEl>
                                           </p:spTgt>
                                         </p:tgtEl>
@@ -9452,7 +9823,7 @@
 </p:sld>
 </file>
 
-<file path=ppt/slides/slide11.xml><?xml version="1.0" encoding="utf-8"?>
+<file path=ppt/slides/slide13.xml><?xml version="1.0" encoding="utf-8"?>
 <p:sld xmlns:a="http://schemas.openxmlformats.org/drawingml/2006/main" xmlns:r="http://schemas.openxmlformats.org/officeDocument/2006/relationships" xmlns:p="http://schemas.openxmlformats.org/presentationml/2006/main">
   <p:cSld>
     <p:spTree>
@@ -9650,7 +10021,7 @@
               <a:pPr>
                 <a:defRPr/>
               </a:pPr>
-              <a:t>11</a:t>
+              <a:t>13</a:t>
             </a:fld>
             <a:endParaRPr lang="en-US" dirty="0">
               <a:solidFill>
@@ -9948,7 +10319,7 @@
 </p:sld>
 </file>
 
-<file path=ppt/slides/slide12.xml><?xml version="1.0" encoding="utf-8"?>
+<file path=ppt/slides/slide14.xml><?xml version="1.0" encoding="utf-8"?>
 <p:sld xmlns:a="http://schemas.openxmlformats.org/drawingml/2006/main" xmlns:r="http://schemas.openxmlformats.org/officeDocument/2006/relationships" xmlns:p="http://schemas.openxmlformats.org/presentationml/2006/main">
   <p:cSld>
     <p:spTree>
@@ -10034,7 +10405,7 @@
               <a:pPr>
                 <a:defRPr/>
               </a:pPr>
-              <a:t>12</a:t>
+              <a:t>14</a:t>
             </a:fld>
             <a:endParaRPr lang="en-US" dirty="0">
               <a:solidFill>
@@ -10064,7 +10435,7 @@
 </p:sld>
 </file>
 
-<file path=ppt/slides/slide13.xml><?xml version="1.0" encoding="utf-8"?>
+<file path=ppt/slides/slide15.xml><?xml version="1.0" encoding="utf-8"?>
 <p:sld xmlns:a="http://schemas.openxmlformats.org/drawingml/2006/main" xmlns:r="http://schemas.openxmlformats.org/officeDocument/2006/relationships" xmlns:p="http://schemas.openxmlformats.org/presentationml/2006/main">
   <p:cSld>
     <p:spTree>
@@ -10307,7 +10678,7 @@
               <a:pPr>
                 <a:defRPr/>
               </a:pPr>
-              <a:t>13</a:t>
+              <a:t>15</a:t>
             </a:fld>
             <a:endParaRPr lang="en-US" dirty="0">
               <a:solidFill>
@@ -10801,7 +11172,7 @@
 </p:sld>
 </file>
 
-<file path=ppt/slides/slide14.xml><?xml version="1.0" encoding="utf-8"?>
+<file path=ppt/slides/slide16.xml><?xml version="1.0" encoding="utf-8"?>
 <p:sld xmlns:a="http://schemas.openxmlformats.org/drawingml/2006/main" xmlns:r="http://schemas.openxmlformats.org/officeDocument/2006/relationships" xmlns:p="http://schemas.openxmlformats.org/presentationml/2006/main">
   <p:cSld>
     <p:spTree>
@@ -10918,7 +11289,7 @@
               <a:pPr>
                 <a:defRPr/>
               </a:pPr>
-              <a:t>14</a:t>
+              <a:t>16</a:t>
             </a:fld>
             <a:endParaRPr lang="en-US" dirty="0">
               <a:solidFill>
@@ -11110,7 +11481,7 @@
 </p:sld>
 </file>
 
-<file path=ppt/slides/slide15.xml><?xml version="1.0" encoding="utf-8"?>
+<file path=ppt/slides/slide17.xml><?xml version="1.0" encoding="utf-8"?>
 <p:sld xmlns:a="http://schemas.openxmlformats.org/drawingml/2006/main" xmlns:r="http://schemas.openxmlformats.org/officeDocument/2006/relationships" xmlns:p="http://schemas.openxmlformats.org/presentationml/2006/main">
   <p:cSld>
     <p:spTree>
@@ -11195,7 +11566,7 @@
               <a:pPr>
                 <a:defRPr/>
               </a:pPr>
-              <a:t>15</a:t>
+              <a:t>17</a:t>
             </a:fld>
             <a:endParaRPr lang="en-US" dirty="0">
               <a:solidFill>
@@ -11225,7 +11596,7 @@
 </p:sld>
 </file>
 
-<file path=ppt/slides/slide16.xml><?xml version="1.0" encoding="utf-8"?>
+<file path=ppt/slides/slide18.xml><?xml version="1.0" encoding="utf-8"?>
 <p:sld xmlns:a="http://schemas.openxmlformats.org/drawingml/2006/main" xmlns:r="http://schemas.openxmlformats.org/officeDocument/2006/relationships" xmlns:p="http://schemas.openxmlformats.org/presentationml/2006/main">
   <p:cSld>
     <p:spTree>
@@ -11362,7 +11733,7 @@
               <a:pPr>
                 <a:defRPr/>
               </a:pPr>
-              <a:t>16</a:t>
+              <a:t>18</a:t>
             </a:fld>
             <a:endParaRPr lang="en-US" dirty="0">
               <a:solidFill>
@@ -11392,7 +11763,7 @@
 </p:sld>
 </file>
 
-<file path=ppt/slides/slide17.xml><?xml version="1.0" encoding="utf-8"?>
+<file path=ppt/slides/slide19.xml><?xml version="1.0" encoding="utf-8"?>
 <p:sld xmlns:a="http://schemas.openxmlformats.org/drawingml/2006/main" xmlns:r="http://schemas.openxmlformats.org/officeDocument/2006/relationships" xmlns:p="http://schemas.openxmlformats.org/presentationml/2006/main">
   <p:cSld>
     <p:spTree>
@@ -11587,7 +11958,7 @@
               <a:pPr>
                 <a:defRPr/>
               </a:pPr>
-              <a:t>17</a:t>
+              <a:t>19</a:t>
             </a:fld>
             <a:endParaRPr lang="en-US" dirty="0">
               <a:solidFill>
@@ -11730,7 +12101,7 @@
 </p:sld>
 </file>
 
-<file path=ppt/slides/slide18.xml><?xml version="1.0" encoding="utf-8"?>
+<file path=ppt/slides/slide2.xml><?xml version="1.0" encoding="utf-8"?>
 <p:sld xmlns:a="http://schemas.openxmlformats.org/drawingml/2006/main" xmlns:r="http://schemas.openxmlformats.org/officeDocument/2006/relationships" xmlns:p="http://schemas.openxmlformats.org/presentationml/2006/main">
   <p:cSld>
     <p:spTree>
@@ -11749,35 +12120,12 @@
       </p:grpSpPr>
       <p:sp>
         <p:nvSpPr>
-          <p:cNvPr id="6" name="Title 5"/>
+          <p:cNvPr id="2" name="Title 1"/>
           <p:cNvSpPr>
             <a:spLocks noGrp="1"/>
           </p:cNvSpPr>
           <p:nvPr>
             <p:ph type="title"/>
-          </p:nvPr>
-        </p:nvSpPr>
-        <p:spPr/>
-        <p:txBody>
-          <a:bodyPr anchor="ctr" anchorCtr="0"/>
-          <a:lstStyle/>
-          <a:p>
-            <a:r>
-              <a:rPr lang="en-US" cap="none" dirty="0" smtClean="0"/>
-              <a:t>Phase Increment</a:t>
-            </a:r>
-            <a:endParaRPr lang="en-US" cap="none" dirty="0"/>
-          </a:p>
-        </p:txBody>
-      </p:sp>
-      <p:sp>
-        <p:nvSpPr>
-          <p:cNvPr id="7" name="Text Placeholder 6"/>
-          <p:cNvSpPr>
-            <a:spLocks noGrp="1"/>
-          </p:cNvSpPr>
-          <p:nvPr>
-            <p:ph type="body" idx="1"/>
           </p:nvPr>
         </p:nvSpPr>
         <p:spPr/>
@@ -11785,21 +12133,175 @@
           <a:bodyPr/>
           <a:lstStyle/>
           <a:p>
+            <a:r>
+              <a:rPr lang="en-US" dirty="0" smtClean="0"/>
+              <a:t>Lesson Outline</a:t>
+            </a:r>
             <a:endParaRPr lang="en-US" dirty="0"/>
           </a:p>
         </p:txBody>
       </p:sp>
       <p:sp>
         <p:nvSpPr>
-          <p:cNvPr id="4" name="Slide Number Placeholder 3"/>
+          <p:cNvPr id="4" name="Content Placeholder 3"/>
           <p:cNvSpPr>
             <a:spLocks noGrp="1"/>
           </p:cNvSpPr>
           <p:nvPr>
+            <p:ph idx="1"/>
+          </p:nvPr>
+        </p:nvSpPr>
+        <p:spPr/>
+        <p:txBody>
+          <a:bodyPr/>
+          <a:lstStyle/>
+          <a:p>
+            <a:pPr eaLnBrk="1" hangingPunct="1">
+              <a:lnSpc>
+                <a:spcPct val="80000"/>
+              </a:lnSpc>
+            </a:pPr>
+            <a:r>
+              <a:rPr lang="en-US" dirty="0" smtClean="0"/>
+              <a:t>Time Logs!</a:t>
+            </a:r>
+          </a:p>
+          <a:p>
+            <a:pPr eaLnBrk="1" hangingPunct="1">
+              <a:lnSpc>
+                <a:spcPct val="80000"/>
+              </a:lnSpc>
+            </a:pPr>
+            <a:endParaRPr lang="en-US" dirty="0" smtClean="0"/>
+          </a:p>
+          <a:p>
+            <a:pPr eaLnBrk="1" hangingPunct="1">
+              <a:lnSpc>
+                <a:spcPct val="80000"/>
+              </a:lnSpc>
+            </a:pPr>
+            <a:r>
+              <a:rPr lang="en-US" dirty="0" smtClean="0"/>
+              <a:t>Lab 3 </a:t>
+            </a:r>
+            <a:r>
+              <a:rPr lang="en-US" dirty="0"/>
+              <a:t>– </a:t>
+            </a:r>
+            <a:r>
+              <a:rPr lang="en-US" dirty="0" err="1"/>
+              <a:t>O’Scope</a:t>
+            </a:r>
+            <a:r>
+              <a:rPr lang="en-US" dirty="0"/>
+              <a:t> Control </a:t>
+            </a:r>
+            <a:r>
+              <a:rPr lang="en-US" dirty="0" smtClean="0"/>
+              <a:t>	 </a:t>
+            </a:r>
+          </a:p>
+          <a:p>
+            <a:pPr lvl="1" eaLnBrk="1" hangingPunct="1">
+              <a:lnSpc>
+                <a:spcPct val="80000"/>
+              </a:lnSpc>
+            </a:pPr>
+            <a:r>
+              <a:rPr lang="en-US" dirty="0" smtClean="0"/>
+              <a:t>Functionality Due COB Today, but I will give you until 2359 on Sunday</a:t>
+            </a:r>
+            <a:endParaRPr lang="en-US" dirty="0"/>
+          </a:p>
+          <a:p>
+            <a:pPr lvl="1" eaLnBrk="1" hangingPunct="1">
+              <a:lnSpc>
+                <a:spcPct val="80000"/>
+              </a:lnSpc>
+            </a:pPr>
+            <a:r>
+              <a:rPr lang="en-US" dirty="0" smtClean="0"/>
+              <a:t>Write-up Due COB LSN 24 (after Spring Break)</a:t>
+            </a:r>
+          </a:p>
+          <a:p>
+            <a:pPr eaLnBrk="1" hangingPunct="1">
+              <a:lnSpc>
+                <a:spcPct val="80000"/>
+              </a:lnSpc>
+            </a:pPr>
+            <a:r>
+              <a:rPr lang="en-US" dirty="0" smtClean="0"/>
+              <a:t>Project Proposals Due BOC LSN 25</a:t>
+            </a:r>
+          </a:p>
+          <a:p>
+            <a:pPr eaLnBrk="1" hangingPunct="1">
+              <a:lnSpc>
+                <a:spcPct val="80000"/>
+              </a:lnSpc>
+            </a:pPr>
+            <a:endParaRPr lang="en-US" dirty="0" smtClean="0"/>
+          </a:p>
+          <a:p>
+            <a:pPr eaLnBrk="1" hangingPunct="1">
+              <a:lnSpc>
+                <a:spcPct val="80000"/>
+              </a:lnSpc>
+            </a:pPr>
+            <a:r>
+              <a:rPr lang="en-US" dirty="0" smtClean="0"/>
+              <a:t>Fixed Point Arithmetic and Multiplication</a:t>
+            </a:r>
+          </a:p>
+          <a:p>
+            <a:pPr eaLnBrk="1" hangingPunct="1">
+              <a:lnSpc>
+                <a:spcPct val="80000"/>
+              </a:lnSpc>
+            </a:pPr>
+            <a:r>
+              <a:rPr lang="en-US" dirty="0"/>
+              <a:t>Direct Digital Synthesis</a:t>
+            </a:r>
+          </a:p>
+          <a:p>
+            <a:pPr eaLnBrk="1" hangingPunct="1">
+              <a:lnSpc>
+                <a:spcPct val="80000"/>
+              </a:lnSpc>
+            </a:pPr>
+            <a:r>
+              <a:rPr lang="en-US" dirty="0" smtClean="0"/>
+              <a:t>Phase Increment</a:t>
+            </a:r>
+          </a:p>
+          <a:p>
+            <a:pPr eaLnBrk="1" hangingPunct="1">
+              <a:lnSpc>
+                <a:spcPct val="80000"/>
+              </a:lnSpc>
+            </a:pPr>
+            <a:endParaRPr lang="en-US" dirty="0" smtClean="0"/>
+          </a:p>
+        </p:txBody>
+      </p:sp>
+      <p:sp>
+        <p:nvSpPr>
+          <p:cNvPr id="5" name="Slide Number Placeholder 3"/>
+          <p:cNvSpPr>
+            <a:spLocks noGrp="1"/>
+          </p:cNvSpPr>
+          <p:nvPr>
             <p:ph type="sldNum" sz="quarter" idx="10"/>
           </p:nvPr>
         </p:nvSpPr>
-        <p:spPr/>
+        <p:spPr>
+          <a:xfrm>
+            <a:off x="6910388" y="6253163"/>
+            <a:ext cx="2133600" cy="476250"/>
+          </a:xfrm>
+        </p:spPr>
         <p:txBody>
           <a:bodyPr/>
           <a:lstStyle/>
@@ -11816,7 +12318,123 @@
               <a:pPr>
                 <a:defRPr/>
               </a:pPr>
-              <a:t>18</a:t>
+              <a:t>2</a:t>
+            </a:fld>
+            <a:endParaRPr lang="en-US" dirty="0">
+              <a:solidFill>
+                <a:srgbClr val="000000"/>
+              </a:solidFill>
+            </a:endParaRPr>
+          </a:p>
+        </p:txBody>
+      </p:sp>
+    </p:spTree>
+    <p:extLst>
+      <p:ext uri="{BB962C8B-B14F-4D97-AF65-F5344CB8AC3E}">
+        <p14:creationId xmlns:p14="http://schemas.microsoft.com/office/powerpoint/2010/main" val="3991601210"/>
+      </p:ext>
+    </p:extLst>
+  </p:cSld>
+  <p:clrMapOvr>
+    <a:masterClrMapping/>
+  </p:clrMapOvr>
+  <p:timing>
+    <p:tnLst>
+      <p:par>
+        <p:cTn id="1" dur="indefinite" restart="never" nodeType="tmRoot"/>
+      </p:par>
+    </p:tnLst>
+  </p:timing>
+</p:sld>
+</file>
+
+<file path=ppt/slides/slide20.xml><?xml version="1.0" encoding="utf-8"?>
+<p:sld xmlns:a="http://schemas.openxmlformats.org/drawingml/2006/main" xmlns:r="http://schemas.openxmlformats.org/officeDocument/2006/relationships" xmlns:p="http://schemas.openxmlformats.org/presentationml/2006/main">
+  <p:cSld>
+    <p:spTree>
+      <p:nvGrpSpPr>
+        <p:cNvPr id="1" name=""/>
+        <p:cNvGrpSpPr/>
+        <p:nvPr/>
+      </p:nvGrpSpPr>
+      <p:grpSpPr>
+        <a:xfrm>
+          <a:off x="0" y="0"/>
+          <a:ext cx="0" cy="0"/>
+          <a:chOff x="0" y="0"/>
+          <a:chExt cx="0" cy="0"/>
+        </a:xfrm>
+      </p:grpSpPr>
+      <p:sp>
+        <p:nvSpPr>
+          <p:cNvPr id="6" name="Title 5"/>
+          <p:cNvSpPr>
+            <a:spLocks noGrp="1"/>
+          </p:cNvSpPr>
+          <p:nvPr>
+            <p:ph type="title"/>
+          </p:nvPr>
+        </p:nvSpPr>
+        <p:spPr/>
+        <p:txBody>
+          <a:bodyPr anchor="ctr" anchorCtr="0"/>
+          <a:lstStyle/>
+          <a:p>
+            <a:r>
+              <a:rPr lang="en-US" cap="none" dirty="0" smtClean="0"/>
+              <a:t>Phase Increment</a:t>
+            </a:r>
+            <a:endParaRPr lang="en-US" cap="none" dirty="0"/>
+          </a:p>
+        </p:txBody>
+      </p:sp>
+      <p:sp>
+        <p:nvSpPr>
+          <p:cNvPr id="7" name="Text Placeholder 6"/>
+          <p:cNvSpPr>
+            <a:spLocks noGrp="1"/>
+          </p:cNvSpPr>
+          <p:nvPr>
+            <p:ph type="body" idx="1"/>
+          </p:nvPr>
+        </p:nvSpPr>
+        <p:spPr/>
+        <p:txBody>
+          <a:bodyPr/>
+          <a:lstStyle/>
+          <a:p>
+            <a:endParaRPr lang="en-US" dirty="0"/>
+          </a:p>
+        </p:txBody>
+      </p:sp>
+      <p:sp>
+        <p:nvSpPr>
+          <p:cNvPr id="4" name="Slide Number Placeholder 3"/>
+          <p:cNvSpPr>
+            <a:spLocks noGrp="1"/>
+          </p:cNvSpPr>
+          <p:nvPr>
+            <p:ph type="sldNum" sz="quarter" idx="10"/>
+          </p:nvPr>
+        </p:nvSpPr>
+        <p:spPr/>
+        <p:txBody>
+          <a:bodyPr/>
+          <a:lstStyle/>
+          <a:p>
+            <a:pPr>
+              <a:defRPr/>
+            </a:pPr>
+            <a:fld id="{62D6D4B2-7611-498F-8780-1EDC26277454}" type="slidenum">
+              <a:rPr lang="en-US" smtClean="0">
+                <a:solidFill>
+                  <a:srgbClr val="000000"/>
+                </a:solidFill>
+              </a:rPr>
+              <a:pPr>
+                <a:defRPr/>
+              </a:pPr>
+              <a:t>20</a:t>
             </a:fld>
             <a:endParaRPr lang="en-US" dirty="0">
               <a:solidFill>
@@ -11846,7 +12464,7 @@
 </p:sld>
 </file>
 
-<file path=ppt/slides/slide19.xml><?xml version="1.0" encoding="utf-8"?>
+<file path=ppt/slides/slide21.xml><?xml version="1.0" encoding="utf-8"?>
 <p:sld xmlns:a="http://schemas.openxmlformats.org/drawingml/2006/main" xmlns:r="http://schemas.openxmlformats.org/officeDocument/2006/relationships" xmlns:p="http://schemas.openxmlformats.org/presentationml/2006/main">
   <p:cSld>
     <p:spTree>
@@ -12023,7 +12641,7 @@
               <a:pPr>
                 <a:defRPr/>
               </a:pPr>
-              <a:t>19</a:t>
+              <a:t>21</a:t>
             </a:fld>
             <a:endParaRPr lang="en-US" dirty="0">
               <a:solidFill>
@@ -12370,7 +12988,7 @@
 </p:sld>
 </file>
 
-<file path=ppt/slides/slide2.xml><?xml version="1.0" encoding="utf-8"?>
+<file path=ppt/slides/slide22.xml><?xml version="1.0" encoding="utf-8"?>
 <p:sld xmlns:a="http://schemas.openxmlformats.org/drawingml/2006/main" xmlns:r="http://schemas.openxmlformats.org/officeDocument/2006/relationships" xmlns:p="http://schemas.openxmlformats.org/presentationml/2006/main">
   <p:cSld>
     <p:spTree>
@@ -12404,7 +13022,7 @@
           <a:p>
             <a:r>
               <a:rPr lang="en-US" dirty="0" smtClean="0"/>
-              <a:t>Lesson Outline</a:t>
+              <a:t>Phase Increment</a:t>
             </a:r>
             <a:endParaRPr lang="en-US" dirty="0"/>
           </a:p>
@@ -12420,148 +13038,67 @@
             <p:ph idx="1"/>
           </p:nvPr>
         </p:nvSpPr>
-        <p:spPr/>
+        <p:spPr>
+          <a:xfrm>
+            <a:off x="581736" y="1523052"/>
+            <a:ext cx="8131175" cy="4324350"/>
+          </a:xfrm>
+        </p:spPr>
         <p:txBody>
           <a:bodyPr/>
           <a:lstStyle/>
           <a:p>
-            <a:pPr eaLnBrk="1" hangingPunct="1">
-              <a:lnSpc>
-                <a:spcPct val="80000"/>
-              </a:lnSpc>
-            </a:pPr>
-            <a:r>
-              <a:rPr lang="en-US" dirty="0" smtClean="0"/>
-              <a:t>Time Logs!</a:t>
-            </a:r>
-          </a:p>
-          <a:p>
-            <a:pPr eaLnBrk="1" hangingPunct="1">
-              <a:lnSpc>
-                <a:spcPct val="80000"/>
-              </a:lnSpc>
-            </a:pPr>
-            <a:endParaRPr lang="en-US" dirty="0" smtClean="0"/>
-          </a:p>
-          <a:p>
-            <a:pPr eaLnBrk="1" hangingPunct="1">
-              <a:lnSpc>
-                <a:spcPct val="80000"/>
-              </a:lnSpc>
-            </a:pPr>
-            <a:r>
-              <a:rPr lang="en-US" dirty="0" smtClean="0"/>
-              <a:t>Lab 3 </a:t>
-            </a:r>
-            <a:r>
-              <a:rPr lang="en-US" dirty="0"/>
-              <a:t>– </a:t>
-            </a:r>
-            <a:r>
-              <a:rPr lang="en-US" dirty="0" err="1"/>
-              <a:t>O’Scope</a:t>
-            </a:r>
-            <a:r>
-              <a:rPr lang="en-US" dirty="0"/>
-              <a:t> Control </a:t>
-            </a:r>
-            <a:r>
-              <a:rPr lang="en-US" dirty="0" smtClean="0"/>
-              <a:t>	 </a:t>
-            </a:r>
-            <a:endParaRPr lang="en-US" dirty="0" smtClean="0"/>
-          </a:p>
-          <a:p>
-            <a:pPr lvl="1" eaLnBrk="1" hangingPunct="1">
-              <a:lnSpc>
-                <a:spcPct val="80000"/>
-              </a:lnSpc>
-            </a:pPr>
-            <a:r>
-              <a:rPr lang="en-US" dirty="0" smtClean="0"/>
-              <a:t>Functionality </a:t>
-            </a:r>
-            <a:r>
-              <a:rPr lang="en-US" dirty="0" smtClean="0"/>
-              <a:t>Due COB </a:t>
-            </a:r>
-            <a:r>
-              <a:rPr lang="en-US" dirty="0" smtClean="0"/>
-              <a:t>Today, but I will give you until 2359 on Sunday</a:t>
-            </a:r>
-            <a:endParaRPr lang="en-US" dirty="0"/>
-          </a:p>
-          <a:p>
-            <a:pPr lvl="1" eaLnBrk="1" hangingPunct="1">
-              <a:lnSpc>
-                <a:spcPct val="80000"/>
-              </a:lnSpc>
-            </a:pPr>
-            <a:r>
-              <a:rPr lang="en-US" dirty="0" smtClean="0"/>
-              <a:t>Write-up Due COB LSN 24 (after Spring Break)</a:t>
-            </a:r>
-          </a:p>
-          <a:p>
-            <a:pPr eaLnBrk="1" hangingPunct="1">
-              <a:lnSpc>
-                <a:spcPct val="80000"/>
-              </a:lnSpc>
-            </a:pPr>
-            <a:r>
-              <a:rPr lang="en-US" dirty="0" smtClean="0"/>
-              <a:t>Project Proposals Due BOC LSN 25</a:t>
-            </a:r>
-          </a:p>
-          <a:p>
-            <a:pPr eaLnBrk="1" hangingPunct="1">
-              <a:lnSpc>
-                <a:spcPct val="80000"/>
-              </a:lnSpc>
-            </a:pPr>
-            <a:endParaRPr lang="en-US" dirty="0" smtClean="0"/>
-          </a:p>
-          <a:p>
-            <a:pPr eaLnBrk="1" hangingPunct="1">
-              <a:lnSpc>
-                <a:spcPct val="80000"/>
-              </a:lnSpc>
-            </a:pPr>
-            <a:r>
-              <a:rPr lang="en-US" dirty="0" smtClean="0"/>
-              <a:t>Fixed Point Arithmetic and Multiplication</a:t>
-            </a:r>
-          </a:p>
-          <a:p>
-            <a:pPr eaLnBrk="1" hangingPunct="1">
-              <a:lnSpc>
-                <a:spcPct val="80000"/>
-              </a:lnSpc>
-            </a:pPr>
-            <a:r>
-              <a:rPr lang="en-US" dirty="0"/>
-              <a:t>Direct Digital Synthesis</a:t>
-            </a:r>
-          </a:p>
-          <a:p>
-            <a:pPr eaLnBrk="1" hangingPunct="1">
-              <a:lnSpc>
-                <a:spcPct val="80000"/>
-              </a:lnSpc>
-            </a:pPr>
-            <a:r>
-              <a:rPr lang="en-US" dirty="0" smtClean="0"/>
-              <a:t>Phase Increment</a:t>
-            </a:r>
-            <a:endParaRPr lang="en-US" dirty="0" smtClean="0"/>
-          </a:p>
-          <a:p>
-            <a:pPr eaLnBrk="1" hangingPunct="1">
-              <a:lnSpc>
-                <a:spcPct val="80000"/>
-              </a:lnSpc>
-            </a:pPr>
-            <a:endParaRPr lang="en-US" dirty="0" smtClean="0"/>
+            <a:r>
+              <a:rPr lang="en-US" b="0" dirty="0"/>
+              <a:t>Using integer values for the increment we are limited to very coarse adjustments in the frequency</a:t>
+            </a:r>
+            <a:r>
+              <a:rPr lang="en-US" b="0" dirty="0" smtClean="0"/>
+              <a:t>.</a:t>
+            </a:r>
+          </a:p>
+          <a:p>
+            <a:r>
+              <a:rPr lang="en-US" b="0" dirty="0"/>
+              <a:t>For example how could you use this schema to generate a sin wave with frequency of </a:t>
+            </a:r>
+            <a:r>
+              <a:rPr lang="en-US" b="0" dirty="0" smtClean="0"/>
+              <a:t>1.0kHz?</a:t>
+            </a:r>
+            <a:endParaRPr lang="en-US" b="0" dirty="0"/>
+          </a:p>
+          <a:p>
+            <a:r>
+              <a:rPr lang="en-US" b="0" dirty="0" smtClean="0"/>
+              <a:t>Well </a:t>
+            </a:r>
+            <a:r>
+              <a:rPr lang="en-US" b="0" dirty="0"/>
+              <a:t>you would need to increment the pointer in the sin table by 1.5 every 21uS. </a:t>
+            </a:r>
+            <a:endParaRPr lang="en-US" b="0" dirty="0" smtClean="0"/>
+          </a:p>
+          <a:p>
+            <a:r>
+              <a:rPr lang="en-US" b="0" dirty="0"/>
+              <a:t> And surprisingly, you can easily accomplish this using a fixed point representation</a:t>
+            </a:r>
+            <a:r>
+              <a:rPr lang="en-US" b="0" dirty="0" smtClean="0"/>
+              <a:t>.</a:t>
+            </a:r>
+          </a:p>
+          <a:p>
+            <a:r>
+              <a:rPr lang="en-US" b="0" dirty="0" smtClean="0"/>
+              <a:t>This </a:t>
+            </a:r>
+            <a:r>
+              <a:rPr lang="en-US" b="0" dirty="0"/>
+              <a:t>fractional value is called the phase increment.</a:t>
+            </a:r>
+            <a:endParaRPr lang="en-US" b="0" dirty="0" smtClean="0"/>
           </a:p>
         </p:txBody>
       </p:sp>
@@ -12597,183 +13134,7 @@
               <a:pPr>
                 <a:defRPr/>
               </a:pPr>
-              <a:t>2</a:t>
-            </a:fld>
-            <a:endParaRPr lang="en-US" dirty="0">
-              <a:solidFill>
-                <a:srgbClr val="000000"/>
-              </a:solidFill>
-            </a:endParaRPr>
-          </a:p>
-        </p:txBody>
-      </p:sp>
-    </p:spTree>
-    <p:extLst>
-      <p:ext uri="{BB962C8B-B14F-4D97-AF65-F5344CB8AC3E}">
-        <p14:creationId xmlns:p14="http://schemas.microsoft.com/office/powerpoint/2010/main" val="3991601210"/>
-      </p:ext>
-    </p:extLst>
-  </p:cSld>
-  <p:clrMapOvr>
-    <a:masterClrMapping/>
-  </p:clrMapOvr>
-  <p:timing>
-    <p:tnLst>
-      <p:par>
-        <p:cTn id="1" dur="indefinite" restart="never" nodeType="tmRoot"/>
-      </p:par>
-    </p:tnLst>
-  </p:timing>
-</p:sld>
-</file>
-
-<file path=ppt/slides/slide20.xml><?xml version="1.0" encoding="utf-8"?>
-<p:sld xmlns:a="http://schemas.openxmlformats.org/drawingml/2006/main" xmlns:r="http://schemas.openxmlformats.org/officeDocument/2006/relationships" xmlns:p="http://schemas.openxmlformats.org/presentationml/2006/main">
-  <p:cSld>
-    <p:spTree>
-      <p:nvGrpSpPr>
-        <p:cNvPr id="1" name=""/>
-        <p:cNvGrpSpPr/>
-        <p:nvPr/>
-      </p:nvGrpSpPr>
-      <p:grpSpPr>
-        <a:xfrm>
-          <a:off x="0" y="0"/>
-          <a:ext cx="0" cy="0"/>
-          <a:chOff x="0" y="0"/>
-          <a:chExt cx="0" cy="0"/>
-        </a:xfrm>
-      </p:grpSpPr>
-      <p:sp>
-        <p:nvSpPr>
-          <p:cNvPr id="2" name="Title 1"/>
-          <p:cNvSpPr>
-            <a:spLocks noGrp="1"/>
-          </p:cNvSpPr>
-          <p:nvPr>
-            <p:ph type="title"/>
-          </p:nvPr>
-        </p:nvSpPr>
-        <p:spPr/>
-        <p:txBody>
-          <a:bodyPr/>
-          <a:lstStyle/>
-          <a:p>
-            <a:r>
-              <a:rPr lang="en-US" dirty="0" smtClean="0"/>
-              <a:t>Phase Increment</a:t>
-            </a:r>
-            <a:endParaRPr lang="en-US" dirty="0"/>
-          </a:p>
-        </p:txBody>
-      </p:sp>
-      <p:sp>
-        <p:nvSpPr>
-          <p:cNvPr id="4" name="Content Placeholder 3"/>
-          <p:cNvSpPr>
-            <a:spLocks noGrp="1"/>
-          </p:cNvSpPr>
-          <p:nvPr>
-            <p:ph idx="1"/>
-          </p:nvPr>
-        </p:nvSpPr>
-        <p:spPr>
-          <a:xfrm>
-            <a:off x="581736" y="1523052"/>
-            <a:ext cx="8131175" cy="4324350"/>
-          </a:xfrm>
-        </p:spPr>
-        <p:txBody>
-          <a:bodyPr/>
-          <a:lstStyle/>
-          <a:p>
-            <a:r>
-              <a:rPr lang="en-US" b="0" dirty="0"/>
-              <a:t>Using integer values for the increment we are limited to very coarse adjustments in the frequency</a:t>
-            </a:r>
-            <a:r>
-              <a:rPr lang="en-US" b="0" dirty="0" smtClean="0"/>
-              <a:t>.</a:t>
-            </a:r>
-          </a:p>
-          <a:p>
-            <a:r>
-              <a:rPr lang="en-US" b="0" dirty="0"/>
-              <a:t>For example how could you use this schema to generate a sin wave with frequency of </a:t>
-            </a:r>
-            <a:r>
-              <a:rPr lang="en-US" b="0" dirty="0" smtClean="0"/>
-              <a:t>1.0kHz?</a:t>
-            </a:r>
-            <a:endParaRPr lang="en-US" b="0" dirty="0"/>
-          </a:p>
-          <a:p>
-            <a:r>
-              <a:rPr lang="en-US" b="0" dirty="0" smtClean="0"/>
-              <a:t>Well </a:t>
-            </a:r>
-            <a:r>
-              <a:rPr lang="en-US" b="0" dirty="0"/>
-              <a:t>you would need to increment the pointer in the sin table by 1.5 every 21uS. </a:t>
-            </a:r>
-            <a:endParaRPr lang="en-US" b="0" dirty="0" smtClean="0"/>
-          </a:p>
-          <a:p>
-            <a:r>
-              <a:rPr lang="en-US" b="0" dirty="0"/>
-              <a:t> And surprisingly, you can easily accomplish this using a fixed point representation</a:t>
-            </a:r>
-            <a:r>
-              <a:rPr lang="en-US" b="0" dirty="0" smtClean="0"/>
-              <a:t>.</a:t>
-            </a:r>
-          </a:p>
-          <a:p>
-            <a:r>
-              <a:rPr lang="en-US" b="0" dirty="0" smtClean="0"/>
-              <a:t>This </a:t>
-            </a:r>
-            <a:r>
-              <a:rPr lang="en-US" b="0" dirty="0"/>
-              <a:t>fractional value is called the phase increment.</a:t>
-            </a:r>
-            <a:endParaRPr lang="en-US" b="0" dirty="0" smtClean="0"/>
-          </a:p>
-        </p:txBody>
-      </p:sp>
-      <p:sp>
-        <p:nvSpPr>
-          <p:cNvPr id="5" name="Slide Number Placeholder 3"/>
-          <p:cNvSpPr>
-            <a:spLocks noGrp="1"/>
-          </p:cNvSpPr>
-          <p:nvPr>
-            <p:ph type="sldNum" sz="quarter" idx="10"/>
-          </p:nvPr>
-        </p:nvSpPr>
-        <p:spPr>
-          <a:xfrm>
-            <a:off x="6910388" y="6253163"/>
-            <a:ext cx="2133600" cy="476250"/>
-          </a:xfrm>
-        </p:spPr>
-        <p:txBody>
-          <a:bodyPr/>
-          <a:lstStyle/>
-          <a:p>
-            <a:pPr>
-              <a:defRPr/>
-            </a:pPr>
-            <a:fld id="{62D6D4B2-7611-498F-8780-1EDC26277454}" type="slidenum">
-              <a:rPr lang="en-US" smtClean="0">
-                <a:solidFill>
-                  <a:srgbClr val="000000"/>
-                </a:solidFill>
-              </a:rPr>
-              <a:pPr>
-                <a:defRPr/>
-              </a:pPr>
-              <a:t>20</a:t>
+              <a:t>22</a:t>
             </a:fld>
             <a:endParaRPr lang="en-US" dirty="0">
               <a:solidFill>
@@ -13022,7 +13383,7 @@
 </p:sld>
 </file>
 
-<file path=ppt/slides/slide21.xml><?xml version="1.0" encoding="utf-8"?>
+<file path=ppt/slides/slide23.xml><?xml version="1.0" encoding="utf-8"?>
 <p:sld xmlns:a="http://schemas.openxmlformats.org/drawingml/2006/main" xmlns:r="http://schemas.openxmlformats.org/officeDocument/2006/relationships" xmlns:p="http://schemas.openxmlformats.org/presentationml/2006/main">
   <p:cSld>
     <p:spTree>
@@ -13241,7 +13602,7 @@
               <a:pPr>
                 <a:defRPr/>
               </a:pPr>
-              <a:t>21</a:t>
+              <a:t>23</a:t>
             </a:fld>
             <a:endParaRPr lang="en-US" dirty="0">
               <a:solidFill>
@@ -13552,7 +13913,7 @@
 </p:sld>
 </file>
 
-<file path=ppt/slides/slide22.xml><?xml version="1.0" encoding="utf-8"?>
+<file path=ppt/slides/slide24.xml><?xml version="1.0" encoding="utf-8"?>
 <p:sld xmlns:a="http://schemas.openxmlformats.org/drawingml/2006/main" xmlns:r="http://schemas.openxmlformats.org/officeDocument/2006/relationships" xmlns:p="http://schemas.openxmlformats.org/presentationml/2006/main">
   <p:cSld>
     <p:spTree>
@@ -13638,7 +13999,7 @@
               <a:pPr>
                 <a:defRPr/>
               </a:pPr>
-              <a:t>22</a:t>
+              <a:t>24</a:t>
             </a:fld>
             <a:endParaRPr lang="en-US" dirty="0">
               <a:solidFill>
@@ -13668,7 +14029,7 @@
 </p:sld>
 </file>
 
-<file path=ppt/slides/slide23.xml><?xml version="1.0" encoding="utf-8"?>
+<file path=ppt/slides/slide25.xml><?xml version="1.0" encoding="utf-8"?>
 <p:sld xmlns:a="http://schemas.openxmlformats.org/drawingml/2006/main" xmlns:r="http://schemas.openxmlformats.org/officeDocument/2006/relationships" xmlns:p="http://schemas.openxmlformats.org/presentationml/2006/main">
   <p:cSld>
     <p:spTree>
@@ -13885,7 +14246,7 @@
               <a:pPr>
                 <a:defRPr/>
               </a:pPr>
-              <a:t>23</a:t>
+              <a:t>25</a:t>
             </a:fld>
             <a:endParaRPr lang="en-US" dirty="0">
               <a:solidFill>
@@ -13923,7 +14284,7 @@
 </p:sld>
 </file>
 
-<file path=ppt/slides/slide24.xml><?xml version="1.0" encoding="utf-8"?>
+<file path=ppt/slides/slide26.xml><?xml version="1.0" encoding="utf-8"?>
 <p:sld xmlns:a="http://schemas.openxmlformats.org/drawingml/2006/main" xmlns:r="http://schemas.openxmlformats.org/officeDocument/2006/relationships" xmlns:p="http://schemas.openxmlformats.org/presentationml/2006/main">
   <p:cSld>
     <p:spTree>
@@ -14109,7 +14470,7 @@
               <a:pPr>
                 <a:defRPr/>
               </a:pPr>
-              <a:t>24</a:t>
+              <a:t>26</a:t>
             </a:fld>
             <a:endParaRPr lang="en-US" dirty="0">
               <a:solidFill>
@@ -15144,7 +15505,15 @@
           <a:p>
             <a:r>
               <a:rPr lang="en-US" b="0" dirty="0" smtClean="0"/>
-              <a:t>Important to note is that to represent values less than 1 (to the right of the decimal point), negative indices need to be used </a:t>
+              <a:t>Important to note is that to represent values less than 1 (to the right of the </a:t>
+            </a:r>
+            <a:r>
+              <a:rPr lang="en-US" b="0" dirty="0" smtClean="0"/>
+              <a:t>binary point</a:t>
+            </a:r>
+            <a:r>
+              <a:rPr lang="en-US" b="0" dirty="0" smtClean="0"/>
+              <a:t>), negative indices need to be used </a:t>
             </a:r>
           </a:p>
           <a:p>
@@ -15967,9 +16336,12 @@
           <a:p>
             <a:r>
               <a:rPr lang="en-US" dirty="0" smtClean="0"/>
-              <a:t>Fixed Point</a:t>
-            </a:r>
-            <a:endParaRPr lang="en-US" dirty="0"/>
+              <a:t>Fixed </a:t>
+            </a:r>
+            <a:r>
+              <a:rPr lang="en-US" dirty="0"/>
+              <a:t>Point Number Systems</a:t>
+            </a:r>
           </a:p>
         </p:txBody>
       </p:sp>
@@ -15994,38 +16366,96 @@
           <a:lstStyle/>
           <a:p>
             <a:r>
+              <a:rPr lang="en-US" b="0" dirty="0" smtClean="0"/>
+              <a:t>Given:  01010.0101 (Designated in Q5.4 Format)</a:t>
+            </a:r>
+          </a:p>
+          <a:p>
+            <a:r>
+              <a:rPr lang="en-US" b="0" dirty="0" smtClean="0"/>
+              <a:t>Find Decimal value: </a:t>
+            </a:r>
+          </a:p>
+          <a:p>
+            <a:r>
+              <a:rPr lang="en-US" b="0" dirty="0" smtClean="0"/>
+              <a:t> 1*2</a:t>
+            </a:r>
+            <a:r>
+              <a:rPr lang="en-US" b="0" baseline="30000" dirty="0" smtClean="0"/>
+              <a:t>3</a:t>
+            </a:r>
+            <a:r>
               <a:rPr lang="en-US" b="0" dirty="0"/>
-              <a:t>As you can imagine, some rational real numbers do not have a rational binary representation. </a:t>
-            </a:r>
-            <a:endParaRPr lang="en-US" b="0" dirty="0" smtClean="0"/>
-          </a:p>
-          <a:p>
+              <a:t> + </a:t>
+            </a:r>
             <a:r>
               <a:rPr lang="en-US" b="0" dirty="0" smtClean="0"/>
-              <a:t>For </a:t>
+              <a:t>1*2</a:t>
+            </a:r>
+            <a:r>
+              <a:rPr lang="en-US" b="0" baseline="30000" dirty="0"/>
+              <a:t>1</a:t>
             </a:r>
             <a:r>
               <a:rPr lang="en-US" b="0" dirty="0"/>
-              <a:t>example, the decimal number 0.1 cannot be represented as a finite binary string of 0's and 1's - it would repeat endlessly. </a:t>
-            </a:r>
-            <a:endParaRPr lang="en-US" b="0" dirty="0" smtClean="0"/>
-          </a:p>
-          <a:p>
+              <a:t> + </a:t>
+            </a:r>
             <a:r>
               <a:rPr lang="en-US" b="0" dirty="0" smtClean="0"/>
-              <a:t>You </a:t>
+              <a:t>1*2</a:t>
+            </a:r>
+            <a:r>
+              <a:rPr lang="en-US" b="0" baseline="30000" dirty="0" smtClean="0"/>
+              <a:t>-2</a:t>
             </a:r>
             <a:r>
               <a:rPr lang="en-US" b="0" dirty="0"/>
-              <a:t>can give the conversion a try if you want to prove this yourself.</a:t>
-            </a:r>
-            <a:r>
-              <a:rPr lang="en-US" dirty="0"/>
-              <a:t/>
-            </a:r>
-            <a:br>
-              <a:rPr lang="en-US" dirty="0"/>
-            </a:br>
+              <a:t> + </a:t>
+            </a:r>
+            <a:r>
+              <a:rPr lang="en-US" b="0" dirty="0" smtClean="0"/>
+              <a:t>1*2</a:t>
+            </a:r>
+            <a:r>
+              <a:rPr lang="en-US" b="0" baseline="30000" dirty="0" smtClean="0"/>
+              <a:t>-4 </a:t>
+            </a:r>
+            <a:r>
+              <a:rPr lang="en-US" b="0" dirty="0"/>
+              <a:t> </a:t>
+            </a:r>
+          </a:p>
+          <a:p>
+            <a:pPr marL="0" indent="0">
+              <a:buNone/>
+            </a:pPr>
+            <a:r>
+              <a:rPr lang="en-US" b="0" dirty="0"/>
+              <a:t> </a:t>
+            </a:r>
+            <a:r>
+              <a:rPr lang="en-US" b="0" dirty="0" smtClean="0"/>
+              <a:t>    = 8 + 2 + 0.25 + 0.0625 </a:t>
+            </a:r>
+          </a:p>
+          <a:p>
+            <a:pPr marL="0" indent="0">
+              <a:buNone/>
+            </a:pPr>
+            <a:r>
+              <a:rPr lang="en-US" b="0" dirty="0"/>
+              <a:t> </a:t>
+            </a:r>
+            <a:r>
+              <a:rPr lang="en-US" b="0" dirty="0" smtClean="0"/>
+              <a:t>    = 10.3125</a:t>
+            </a:r>
+          </a:p>
+          <a:p>
+            <a:pPr marL="0" indent="0">
+              <a:buNone/>
+            </a:pPr>
             <a:endParaRPr lang="en-US" b="0" dirty="0" smtClean="0"/>
           </a:p>
         </p:txBody>
@@ -16075,7 +16505,7 @@
     </p:spTree>
     <p:extLst>
       <p:ext uri="{BB962C8B-B14F-4D97-AF65-F5344CB8AC3E}">
-        <p14:creationId xmlns:p14="http://schemas.microsoft.com/office/powerpoint/2010/main" val="196949630"/>
+        <p14:creationId xmlns:p14="http://schemas.microsoft.com/office/powerpoint/2010/main" val="2668726018"/>
       </p:ext>
     </p:extLst>
   </p:cSld>
@@ -16085,7 +16515,177 @@
   <p:timing>
     <p:tnLst>
       <p:par>
-        <p:cTn id="1" dur="indefinite" restart="never" nodeType="tmRoot"/>
+        <p:cTn id="1" dur="indefinite" restart="never" nodeType="tmRoot">
+          <p:childTnLst>
+            <p:seq concurrent="1" nextAc="seek">
+              <p:cTn id="2" dur="indefinite" nodeType="mainSeq">
+                <p:childTnLst>
+                  <p:par>
+                    <p:cTn id="3" fill="hold">
+                      <p:stCondLst>
+                        <p:cond delay="indefinite"/>
+                      </p:stCondLst>
+                      <p:childTnLst>
+                        <p:par>
+                          <p:cTn id="4" fill="hold">
+                            <p:stCondLst>
+                              <p:cond delay="0"/>
+                            </p:stCondLst>
+                            <p:childTnLst>
+                              <p:par>
+                                <p:cTn id="5" presetID="1" presetClass="entr" presetSubtype="0" fill="hold" nodeType="clickEffect">
+                                  <p:stCondLst>
+                                    <p:cond delay="0"/>
+                                  </p:stCondLst>
+                                  <p:childTnLst>
+                                    <p:set>
+                                      <p:cBhvr>
+                                        <p:cTn id="6" dur="1" fill="hold">
+                                          <p:stCondLst>
+                                            <p:cond delay="0"/>
+                                          </p:stCondLst>
+                                        </p:cTn>
+                                        <p:tgtEl>
+                                          <p:spTgt spid="4">
+                                            <p:txEl>
+                                              <p:pRg st="2" end="2"/>
+                                            </p:txEl>
+                                          </p:spTgt>
+                                        </p:tgtEl>
+                                        <p:attrNameLst>
+                                          <p:attrName>style.visibility</p:attrName>
+                                        </p:attrNameLst>
+                                      </p:cBhvr>
+                                      <p:to>
+                                        <p:strVal val="visible"/>
+                                      </p:to>
+                                    </p:set>
+                                  </p:childTnLst>
+                                </p:cTn>
+                              </p:par>
+                            </p:childTnLst>
+                          </p:cTn>
+                        </p:par>
+                      </p:childTnLst>
+                    </p:cTn>
+                  </p:par>
+                  <p:par>
+                    <p:cTn id="7" fill="hold">
+                      <p:stCondLst>
+                        <p:cond delay="indefinite"/>
+                      </p:stCondLst>
+                      <p:childTnLst>
+                        <p:par>
+                          <p:cTn id="8" fill="hold">
+                            <p:stCondLst>
+                              <p:cond delay="0"/>
+                            </p:stCondLst>
+                            <p:childTnLst>
+                              <p:par>
+                                <p:cTn id="9" presetID="1" presetClass="entr" presetSubtype="0" fill="hold" nodeType="clickEffect">
+                                  <p:stCondLst>
+                                    <p:cond delay="0"/>
+                                  </p:stCondLst>
+                                  <p:childTnLst>
+                                    <p:set>
+                                      <p:cBhvr>
+                                        <p:cTn id="10" dur="1" fill="hold">
+                                          <p:stCondLst>
+                                            <p:cond delay="0"/>
+                                          </p:stCondLst>
+                                        </p:cTn>
+                                        <p:tgtEl>
+                                          <p:spTgt spid="4">
+                                            <p:txEl>
+                                              <p:pRg st="3" end="3"/>
+                                            </p:txEl>
+                                          </p:spTgt>
+                                        </p:tgtEl>
+                                        <p:attrNameLst>
+                                          <p:attrName>style.visibility</p:attrName>
+                                        </p:attrNameLst>
+                                      </p:cBhvr>
+                                      <p:to>
+                                        <p:strVal val="visible"/>
+                                      </p:to>
+                                    </p:set>
+                                  </p:childTnLst>
+                                </p:cTn>
+                              </p:par>
+                            </p:childTnLst>
+                          </p:cTn>
+                        </p:par>
+                      </p:childTnLst>
+                    </p:cTn>
+                  </p:par>
+                  <p:par>
+                    <p:cTn id="11" fill="hold">
+                      <p:stCondLst>
+                        <p:cond delay="indefinite"/>
+                      </p:stCondLst>
+                      <p:childTnLst>
+                        <p:par>
+                          <p:cTn id="12" fill="hold">
+                            <p:stCondLst>
+                              <p:cond delay="0"/>
+                            </p:stCondLst>
+                            <p:childTnLst>
+                              <p:par>
+                                <p:cTn id="13" presetID="1" presetClass="entr" presetSubtype="0" fill="hold" nodeType="clickEffect">
+                                  <p:stCondLst>
+                                    <p:cond delay="0"/>
+                                  </p:stCondLst>
+                                  <p:childTnLst>
+                                    <p:set>
+                                      <p:cBhvr>
+                                        <p:cTn id="14" dur="1" fill="hold">
+                                          <p:stCondLst>
+                                            <p:cond delay="0"/>
+                                          </p:stCondLst>
+                                        </p:cTn>
+                                        <p:tgtEl>
+                                          <p:spTgt spid="4">
+                                            <p:txEl>
+                                              <p:pRg st="4" end="4"/>
+                                            </p:txEl>
+                                          </p:spTgt>
+                                        </p:tgtEl>
+                                        <p:attrNameLst>
+                                          <p:attrName>style.visibility</p:attrName>
+                                        </p:attrNameLst>
+                                      </p:cBhvr>
+                                      <p:to>
+                                        <p:strVal val="visible"/>
+                                      </p:to>
+                                    </p:set>
+                                  </p:childTnLst>
+                                </p:cTn>
+                              </p:par>
+                            </p:childTnLst>
+                          </p:cTn>
+                        </p:par>
+                      </p:childTnLst>
+                    </p:cTn>
+                  </p:par>
+                </p:childTnLst>
+              </p:cTn>
+              <p:prevCondLst>
+                <p:cond evt="onPrev" delay="0">
+                  <p:tgtEl>
+                    <p:sldTgt/>
+                  </p:tgtEl>
+                </p:cond>
+              </p:prevCondLst>
+              <p:nextCondLst>
+                <p:cond evt="onNext" delay="0">
+                  <p:tgtEl>
+                    <p:sldTgt/>
+                  </p:tgtEl>
+                </p:cond>
+              </p:nextCondLst>
+            </p:seq>
+          </p:childTnLst>
+        </p:cTn>
       </p:par>
     </p:tnLst>
   </p:timing>
@@ -16111,35 +16711,12 @@
       </p:grpSpPr>
       <p:sp>
         <p:nvSpPr>
-          <p:cNvPr id="6" name="Title 5"/>
+          <p:cNvPr id="2" name="Title 1"/>
           <p:cNvSpPr>
             <a:spLocks noGrp="1"/>
           </p:cNvSpPr>
           <p:nvPr>
             <p:ph type="title"/>
-          </p:nvPr>
-        </p:nvSpPr>
-        <p:spPr/>
-        <p:txBody>
-          <a:bodyPr anchor="ctr" anchorCtr="0"/>
-          <a:lstStyle/>
-          <a:p>
-            <a:r>
-              <a:rPr lang="en-US" cap="none" dirty="0" smtClean="0"/>
-              <a:t>Fixed Point Arithmetic</a:t>
-            </a:r>
-            <a:endParaRPr lang="en-US" cap="none" dirty="0"/>
-          </a:p>
-        </p:txBody>
-      </p:sp>
-      <p:sp>
-        <p:nvSpPr>
-          <p:cNvPr id="7" name="Text Placeholder 6"/>
-          <p:cNvSpPr>
-            <a:spLocks noGrp="1"/>
-          </p:cNvSpPr>
-          <p:nvPr>
-            <p:ph type="body" idx="1"/>
           </p:nvPr>
         </p:nvSpPr>
         <p:spPr/>
@@ -16147,21 +16724,325 @@
           <a:bodyPr/>
           <a:lstStyle/>
           <a:p>
-            <a:endParaRPr lang="en-US" dirty="0"/>
-          </a:p>
-        </p:txBody>
-      </p:sp>
-      <p:sp>
-        <p:nvSpPr>
-          <p:cNvPr id="4" name="Slide Number Placeholder 3"/>
+            <a:r>
+              <a:rPr lang="en-US" dirty="0" smtClean="0"/>
+              <a:t>Fixed </a:t>
+            </a:r>
+            <a:r>
+              <a:rPr lang="en-US" dirty="0"/>
+              <a:t>Point Number Systems</a:t>
+            </a:r>
+          </a:p>
+        </p:txBody>
+      </p:sp>
+      <p:sp>
+        <p:nvSpPr>
+          <p:cNvPr id="4" name="Content Placeholder 3"/>
           <p:cNvSpPr>
             <a:spLocks noGrp="1"/>
           </p:cNvSpPr>
           <p:nvPr>
+            <p:ph idx="1"/>
+          </p:nvPr>
+        </p:nvSpPr>
+        <p:spPr>
+          <a:xfrm>
+            <a:off x="581736" y="1523052"/>
+            <a:ext cx="8131175" cy="4324350"/>
+          </a:xfrm>
+        </p:spPr>
+        <p:txBody>
+          <a:bodyPr/>
+          <a:lstStyle/>
+          <a:p>
+            <a:r>
+              <a:rPr lang="en-US" b="0" dirty="0"/>
+              <a:t>Lets now convert </a:t>
+            </a:r>
+            <a:r>
+              <a:rPr lang="en-US" b="0" dirty="0" smtClean="0"/>
+              <a:t>-13.3125 </a:t>
+            </a:r>
+            <a:r>
+              <a:rPr lang="en-US" b="0" dirty="0"/>
+              <a:t>into </a:t>
+            </a:r>
+            <a:r>
+              <a:rPr lang="en-US" b="0" dirty="0" smtClean="0"/>
+              <a:t>binary</a:t>
+            </a:r>
+            <a:r>
+              <a:rPr lang="en-US" b="0" dirty="0"/>
+              <a:t> </a:t>
+            </a:r>
+            <a:r>
+              <a:rPr lang="en-US" b="0" dirty="0" smtClean="0"/>
+              <a:t>(Q8.8 Format)</a:t>
+            </a:r>
+          </a:p>
+          <a:p>
+            <a:r>
+              <a:rPr lang="en-US" b="0" dirty="0" smtClean="0"/>
+              <a:t>Forget about the negative for now…</a:t>
+            </a:r>
+          </a:p>
+          <a:p>
+            <a:pPr lvl="1"/>
+            <a:r>
+              <a:rPr lang="en-US" sz="2000" b="0" dirty="0"/>
+              <a:t>The largest power of two that fits into 13.3125 </a:t>
+            </a:r>
+            <a:r>
+              <a:rPr lang="en-US" sz="2000" b="0" dirty="0" smtClean="0"/>
+              <a:t>is 2</a:t>
+            </a:r>
+            <a:r>
+              <a:rPr lang="en-US" sz="2000" b="0" baseline="30000" dirty="0" smtClean="0"/>
+              <a:t>3</a:t>
+            </a:r>
+            <a:r>
+              <a:rPr lang="en-US" sz="2000" b="0" dirty="0"/>
+              <a:t> = </a:t>
+            </a:r>
+            <a:r>
+              <a:rPr lang="en-US" sz="2000" b="0" dirty="0" smtClean="0"/>
+              <a:t>8</a:t>
+            </a:r>
+            <a:endParaRPr lang="en-US" sz="2000" b="0" dirty="0"/>
+          </a:p>
+          <a:p>
+            <a:pPr lvl="1"/>
+            <a:r>
+              <a:rPr lang="en-US" sz="2000" b="0" dirty="0"/>
+              <a:t>The largest power of two that fits into </a:t>
+            </a:r>
+            <a:r>
+              <a:rPr lang="en-US" sz="2000" b="0" dirty="0" smtClean="0"/>
+              <a:t>5.3125 </a:t>
+            </a:r>
+            <a:r>
+              <a:rPr lang="en-US" sz="2000" b="0" dirty="0"/>
+              <a:t>is </a:t>
+            </a:r>
+            <a:r>
+              <a:rPr lang="en-US" sz="2000" b="0" dirty="0" smtClean="0"/>
+              <a:t>2</a:t>
+            </a:r>
+            <a:r>
+              <a:rPr lang="en-US" sz="2000" b="0" baseline="30000" dirty="0" smtClean="0"/>
+              <a:t>2</a:t>
+            </a:r>
+            <a:r>
+              <a:rPr lang="en-US" sz="2000" b="0" dirty="0"/>
+              <a:t> = </a:t>
+            </a:r>
+            <a:r>
+              <a:rPr lang="en-US" sz="2000" b="0" dirty="0" smtClean="0"/>
+              <a:t>4</a:t>
+            </a:r>
+            <a:endParaRPr lang="en-US" sz="2000" b="0" dirty="0"/>
+          </a:p>
+          <a:p>
+            <a:pPr lvl="1"/>
+            <a:r>
+              <a:rPr lang="en-US" sz="2000" b="0" dirty="0"/>
+              <a:t>The largest power of two that fits into 1.3125 is </a:t>
+            </a:r>
+            <a:r>
+              <a:rPr lang="en-US" sz="2000" b="0" dirty="0" smtClean="0"/>
+              <a:t>2</a:t>
+            </a:r>
+            <a:r>
+              <a:rPr lang="en-US" sz="2000" b="0" baseline="30000" dirty="0" smtClean="0"/>
+              <a:t>1</a:t>
+            </a:r>
+            <a:r>
+              <a:rPr lang="en-US" sz="2000" b="0" dirty="0"/>
+              <a:t> </a:t>
+            </a:r>
+            <a:r>
+              <a:rPr lang="en-US" sz="2000" b="0" dirty="0" smtClean="0"/>
+              <a:t>= 1</a:t>
+            </a:r>
+          </a:p>
+          <a:p>
+            <a:pPr lvl="1"/>
+            <a:r>
+              <a:rPr lang="en-US" sz="2000" b="0" dirty="0" smtClean="0"/>
+              <a:t>The </a:t>
+            </a:r>
+            <a:r>
+              <a:rPr lang="en-US" sz="2000" b="0" dirty="0"/>
+              <a:t>largest power of two that fits into </a:t>
+            </a:r>
+            <a:r>
+              <a:rPr lang="en-US" sz="2000" b="0" dirty="0" smtClean="0"/>
+              <a:t>0.3125 </a:t>
+            </a:r>
+            <a:r>
+              <a:rPr lang="en-US" sz="2000" b="0" dirty="0"/>
+              <a:t>is </a:t>
+            </a:r>
+            <a:r>
+              <a:rPr lang="en-US" sz="2000" b="0" dirty="0" smtClean="0"/>
+              <a:t>2</a:t>
+            </a:r>
+            <a:r>
+              <a:rPr lang="en-US" sz="2000" b="0" baseline="30000" dirty="0" smtClean="0"/>
+              <a:t>-2</a:t>
+            </a:r>
+            <a:r>
+              <a:rPr lang="en-US" sz="2000" b="0" dirty="0"/>
+              <a:t> = </a:t>
+            </a:r>
+            <a:r>
+              <a:rPr lang="en-US" sz="2000" b="0" dirty="0" smtClean="0"/>
+              <a:t>0.25</a:t>
+            </a:r>
+          </a:p>
+          <a:p>
+            <a:pPr lvl="1"/>
+            <a:r>
+              <a:rPr lang="en-US" sz="2000" b="0" dirty="0" smtClean="0"/>
+              <a:t>The </a:t>
+            </a:r>
+            <a:r>
+              <a:rPr lang="en-US" sz="2000" b="0" dirty="0"/>
+              <a:t>largest power of two that fits into </a:t>
+            </a:r>
+            <a:r>
+              <a:rPr lang="en-US" sz="2000" b="0" dirty="0" smtClean="0"/>
+              <a:t>0.0625 </a:t>
+            </a:r>
+            <a:r>
+              <a:rPr lang="en-US" sz="2000" b="0" dirty="0"/>
+              <a:t>is </a:t>
+            </a:r>
+            <a:r>
+              <a:rPr lang="en-US" sz="2000" b="0" dirty="0" smtClean="0"/>
+              <a:t>2</a:t>
+            </a:r>
+            <a:r>
+              <a:rPr lang="en-US" sz="2000" b="0" baseline="30000" dirty="0" smtClean="0"/>
+              <a:t>-4</a:t>
+            </a:r>
+            <a:r>
+              <a:rPr lang="en-US" sz="2000" b="0" dirty="0"/>
+              <a:t> = </a:t>
+            </a:r>
+            <a:r>
+              <a:rPr lang="en-US" sz="2000" b="0" dirty="0" smtClean="0"/>
+              <a:t>0.0625</a:t>
+            </a:r>
+            <a:endParaRPr lang="en-US" sz="2000" b="0" dirty="0"/>
+          </a:p>
+          <a:p>
+            <a:r>
+              <a:rPr lang="en-US" sz="2200" b="0" dirty="0" smtClean="0"/>
+              <a:t>Thus </a:t>
+            </a:r>
+            <a:r>
+              <a:rPr lang="en-US" sz="2200" b="0" dirty="0"/>
+              <a:t>the binary representation of </a:t>
+            </a:r>
+            <a:r>
+              <a:rPr lang="en-US" sz="2200" b="0" dirty="0" smtClean="0"/>
+              <a:t>13.3125 </a:t>
+            </a:r>
+            <a:r>
+              <a:rPr lang="en-US" sz="2200" b="0" dirty="0"/>
+              <a:t>is </a:t>
+            </a:r>
+            <a:r>
+              <a:rPr lang="en-US" sz="2200" b="0" dirty="0" smtClean="0"/>
+              <a:t>			00001101.01010000</a:t>
+            </a:r>
+          </a:p>
+          <a:p>
+            <a:r>
+              <a:rPr lang="en-US" sz="2200" b="0" dirty="0" smtClean="0"/>
+              <a:t>Now how to make it a negative 2’s Complement?</a:t>
+            </a:r>
+          </a:p>
+          <a:p>
+            <a:r>
+              <a:rPr lang="en-US" sz="2200" b="0" dirty="0" smtClean="0"/>
+              <a:t>Flip bits and add 1 to LSB</a:t>
+            </a:r>
+          </a:p>
+          <a:p>
+            <a:pPr marL="0" indent="0">
+              <a:buNone/>
+            </a:pPr>
+            <a:r>
+              <a:rPr lang="en-US" sz="2200" b="0" dirty="0" smtClean="0"/>
+              <a:t>00001101.01010000 </a:t>
+            </a:r>
+            <a:r>
+              <a:rPr lang="en-US" sz="2200" b="0" dirty="0" smtClean="0">
+                <a:sym typeface="Wingdings" panose="05000000000000000000" pitchFamily="2" charset="2"/>
+              </a:rPr>
+              <a:t> 1111</a:t>
+            </a:r>
+            <a:r>
+              <a:rPr lang="en-US" sz="2200" b="0" dirty="0" smtClean="0"/>
+              <a:t>0010.10110000 </a:t>
+            </a:r>
+            <a:r>
+              <a:rPr lang="en-US" sz="2200" b="0" dirty="0" smtClean="0">
+                <a:sym typeface="Wingdings" panose="05000000000000000000" pitchFamily="2" charset="2"/>
+              </a:rPr>
+              <a:t> 0xF2B0</a:t>
+            </a:r>
+            <a:r>
+              <a:rPr lang="en-US" sz="2200" b="0" dirty="0" smtClean="0"/>
+              <a:t> </a:t>
+            </a:r>
+            <a:r>
+              <a:rPr lang="en-US" sz="2200" b="0" dirty="0">
+                <a:sym typeface="Wingdings" panose="05000000000000000000" pitchFamily="2" charset="2"/>
+              </a:rPr>
+              <a:t> </a:t>
+            </a:r>
+            <a:r>
+              <a:rPr lang="en-US" sz="2200" b="0" dirty="0" smtClean="0">
+                <a:sym typeface="Wingdings" panose="05000000000000000000" pitchFamily="2" charset="2"/>
+              </a:rPr>
+              <a:t>      	</a:t>
+            </a:r>
+            <a:r>
+              <a:rPr lang="en-US" sz="2200" b="0" dirty="0" smtClean="0"/>
+              <a:t>-13.3125</a:t>
+            </a:r>
+            <a:endParaRPr lang="en-US" sz="2200" b="0" dirty="0"/>
+          </a:p>
+          <a:p>
+            <a:pPr marL="0" indent="0">
+              <a:buNone/>
+            </a:pPr>
+            <a:endParaRPr lang="en-US" b="0" dirty="0"/>
+          </a:p>
+          <a:p>
+            <a:endParaRPr lang="en-US" b="0" dirty="0" smtClean="0"/>
+          </a:p>
+        </p:txBody>
+      </p:sp>
+      <p:sp>
+        <p:nvSpPr>
+          <p:cNvPr id="5" name="Slide Number Placeholder 3"/>
+          <p:cNvSpPr>
+            <a:spLocks noGrp="1"/>
+          </p:cNvSpPr>
+          <p:nvPr>
             <p:ph type="sldNum" sz="quarter" idx="10"/>
           </p:nvPr>
         </p:nvSpPr>
-        <p:spPr/>
+        <p:spPr>
+          <a:xfrm>
+            <a:off x="6910388" y="6253163"/>
+            <a:ext cx="2133600" cy="476250"/>
+          </a:xfrm>
+        </p:spPr>
         <p:txBody>
           <a:bodyPr/>
           <a:lstStyle/>
@@ -16191,159 +17072,7 @@
     </p:spTree>
     <p:extLst>
       <p:ext uri="{BB962C8B-B14F-4D97-AF65-F5344CB8AC3E}">
-        <p14:creationId xmlns:p14="http://schemas.microsoft.com/office/powerpoint/2010/main" val="2722273138"/>
-      </p:ext>
-    </p:extLst>
-  </p:cSld>
-  <p:clrMapOvr>
-    <a:masterClrMapping/>
-  </p:clrMapOvr>
-  <p:timing>
-    <p:tnLst>
-      <p:par>
-        <p:cTn id="1" dur="indefinite" restart="never" nodeType="tmRoot"/>
-      </p:par>
-    </p:tnLst>
-  </p:timing>
-</p:sld>
-</file>
-
-<file path=ppt/slides/slide9.xml><?xml version="1.0" encoding="utf-8"?>
-<p:sld xmlns:a="http://schemas.openxmlformats.org/drawingml/2006/main" xmlns:r="http://schemas.openxmlformats.org/officeDocument/2006/relationships" xmlns:p="http://schemas.openxmlformats.org/presentationml/2006/main">
-  <p:cSld>
-    <p:spTree>
-      <p:nvGrpSpPr>
-        <p:cNvPr id="1" name=""/>
-        <p:cNvGrpSpPr/>
-        <p:nvPr/>
-      </p:nvGrpSpPr>
-      <p:grpSpPr>
-        <a:xfrm>
-          <a:off x="0" y="0"/>
-          <a:ext cx="0" cy="0"/>
-          <a:chOff x="0" y="0"/>
-          <a:chExt cx="0" cy="0"/>
-        </a:xfrm>
-      </p:grpSpPr>
-      <p:sp>
-        <p:nvSpPr>
-          <p:cNvPr id="2" name="Title 1"/>
-          <p:cNvSpPr>
-            <a:spLocks noGrp="1"/>
-          </p:cNvSpPr>
-          <p:nvPr>
-            <p:ph type="title"/>
-          </p:nvPr>
-        </p:nvSpPr>
-        <p:spPr/>
-        <p:txBody>
-          <a:bodyPr/>
-          <a:lstStyle/>
-          <a:p>
-            <a:r>
-              <a:rPr lang="en-US" dirty="0" smtClean="0"/>
-              <a:t>Fixed Point Arithmetic</a:t>
-            </a:r>
-            <a:endParaRPr lang="en-US" dirty="0"/>
-          </a:p>
-        </p:txBody>
-      </p:sp>
-      <p:sp>
-        <p:nvSpPr>
-          <p:cNvPr id="4" name="Content Placeholder 3"/>
-          <p:cNvSpPr>
-            <a:spLocks noGrp="1"/>
-          </p:cNvSpPr>
-          <p:nvPr>
-            <p:ph idx="1"/>
-          </p:nvPr>
-        </p:nvSpPr>
-        <p:spPr>
-          <a:xfrm>
-            <a:off x="581736" y="1523052"/>
-            <a:ext cx="8393452" cy="4324350"/>
-          </a:xfrm>
-        </p:spPr>
-        <p:txBody>
-          <a:bodyPr/>
-          <a:lstStyle/>
-          <a:p>
-            <a:r>
-              <a:rPr lang="en-US" b="0" dirty="0"/>
-              <a:t>Fixed point </a:t>
-            </a:r>
-            <a:r>
-              <a:rPr lang="en-US" b="0" dirty="0" smtClean="0"/>
-              <a:t>numbers vs floating point?</a:t>
-            </a:r>
-          </a:p>
-          <a:p>
-            <a:r>
-              <a:rPr lang="en-US" b="0" dirty="0" smtClean="0"/>
-              <a:t>Can represent </a:t>
-            </a:r>
-            <a:r>
-              <a:rPr lang="en-US" b="0" dirty="0"/>
-              <a:t>numbers with </a:t>
-            </a:r>
-            <a:r>
-              <a:rPr lang="en-US" b="0" dirty="0" smtClean="0"/>
-              <a:t>fractions even when hardware </a:t>
-            </a:r>
-            <a:r>
-              <a:rPr lang="en-US" b="0" dirty="0"/>
-              <a:t>resources are limited or you would like to keep complexity to a minimum. </a:t>
-            </a:r>
-            <a:endParaRPr lang="en-US" b="0" dirty="0" smtClean="0"/>
-          </a:p>
-        </p:txBody>
-      </p:sp>
-      <p:sp>
-        <p:nvSpPr>
-          <p:cNvPr id="5" name="Slide Number Placeholder 3"/>
-          <p:cNvSpPr>
-            <a:spLocks noGrp="1"/>
-          </p:cNvSpPr>
-          <p:nvPr>
-            <p:ph type="sldNum" sz="quarter" idx="10"/>
-          </p:nvPr>
-        </p:nvSpPr>
-        <p:spPr>
-          <a:xfrm>
-            <a:off x="6910388" y="6253163"/>
-            <a:ext cx="2133600" cy="476250"/>
-          </a:xfrm>
-        </p:spPr>
-        <p:txBody>
-          <a:bodyPr/>
-          <a:lstStyle/>
-          <a:p>
-            <a:pPr>
-              <a:defRPr/>
-            </a:pPr>
-            <a:fld id="{62D6D4B2-7611-498F-8780-1EDC26277454}" type="slidenum">
-              <a:rPr lang="en-US" smtClean="0">
-                <a:solidFill>
-                  <a:srgbClr val="000000"/>
-                </a:solidFill>
-              </a:rPr>
-              <a:pPr>
-                <a:defRPr/>
-              </a:pPr>
-              <a:t>9</a:t>
-            </a:fld>
-            <a:endParaRPr lang="en-US" dirty="0">
-              <a:solidFill>
-                <a:srgbClr val="000000"/>
-              </a:solidFill>
-            </a:endParaRPr>
-          </a:p>
-        </p:txBody>
-      </p:sp>
-    </p:spTree>
-    <p:extLst>
-      <p:ext uri="{BB962C8B-B14F-4D97-AF65-F5344CB8AC3E}">
-        <p14:creationId xmlns:p14="http://schemas.microsoft.com/office/powerpoint/2010/main" val="2317855813"/>
+        <p14:creationId xmlns:p14="http://schemas.microsoft.com/office/powerpoint/2010/main" val="208380115"/>
       </p:ext>
     </p:extLst>
   </p:cSld>
@@ -16407,6 +17136,447 @@
                       </p:childTnLst>
                     </p:cTn>
                   </p:par>
+                  <p:par>
+                    <p:cTn id="7" fill="hold">
+                      <p:stCondLst>
+                        <p:cond delay="indefinite"/>
+                      </p:stCondLst>
+                      <p:childTnLst>
+                        <p:par>
+                          <p:cTn id="8" fill="hold">
+                            <p:stCondLst>
+                              <p:cond delay="0"/>
+                            </p:stCondLst>
+                            <p:childTnLst>
+                              <p:par>
+                                <p:cTn id="9" presetID="1" presetClass="entr" presetSubtype="0" fill="hold" nodeType="clickEffect">
+                                  <p:stCondLst>
+                                    <p:cond delay="0"/>
+                                  </p:stCondLst>
+                                  <p:childTnLst>
+                                    <p:set>
+                                      <p:cBhvr>
+                                        <p:cTn id="10" dur="1" fill="hold">
+                                          <p:stCondLst>
+                                            <p:cond delay="0"/>
+                                          </p:stCondLst>
+                                        </p:cTn>
+                                        <p:tgtEl>
+                                          <p:spTgt spid="4">
+                                            <p:txEl>
+                                              <p:pRg st="2" end="2"/>
+                                            </p:txEl>
+                                          </p:spTgt>
+                                        </p:tgtEl>
+                                        <p:attrNameLst>
+                                          <p:attrName>style.visibility</p:attrName>
+                                        </p:attrNameLst>
+                                      </p:cBhvr>
+                                      <p:to>
+                                        <p:strVal val="visible"/>
+                                      </p:to>
+                                    </p:set>
+                                  </p:childTnLst>
+                                </p:cTn>
+                              </p:par>
+                            </p:childTnLst>
+                          </p:cTn>
+                        </p:par>
+                      </p:childTnLst>
+                    </p:cTn>
+                  </p:par>
+                  <p:par>
+                    <p:cTn id="11" fill="hold">
+                      <p:stCondLst>
+                        <p:cond delay="indefinite"/>
+                      </p:stCondLst>
+                      <p:childTnLst>
+                        <p:par>
+                          <p:cTn id="12" fill="hold">
+                            <p:stCondLst>
+                              <p:cond delay="0"/>
+                            </p:stCondLst>
+                            <p:childTnLst>
+                              <p:par>
+                                <p:cTn id="13" presetID="1" presetClass="entr" presetSubtype="0" fill="hold" nodeType="clickEffect">
+                                  <p:stCondLst>
+                                    <p:cond delay="0"/>
+                                  </p:stCondLst>
+                                  <p:childTnLst>
+                                    <p:set>
+                                      <p:cBhvr>
+                                        <p:cTn id="14" dur="1" fill="hold">
+                                          <p:stCondLst>
+                                            <p:cond delay="0"/>
+                                          </p:stCondLst>
+                                        </p:cTn>
+                                        <p:tgtEl>
+                                          <p:spTgt spid="4">
+                                            <p:txEl>
+                                              <p:pRg st="3" end="3"/>
+                                            </p:txEl>
+                                          </p:spTgt>
+                                        </p:tgtEl>
+                                        <p:attrNameLst>
+                                          <p:attrName>style.visibility</p:attrName>
+                                        </p:attrNameLst>
+                                      </p:cBhvr>
+                                      <p:to>
+                                        <p:strVal val="visible"/>
+                                      </p:to>
+                                    </p:set>
+                                  </p:childTnLst>
+                                </p:cTn>
+                              </p:par>
+                            </p:childTnLst>
+                          </p:cTn>
+                        </p:par>
+                      </p:childTnLst>
+                    </p:cTn>
+                  </p:par>
+                  <p:par>
+                    <p:cTn id="15" fill="hold">
+                      <p:stCondLst>
+                        <p:cond delay="indefinite"/>
+                      </p:stCondLst>
+                      <p:childTnLst>
+                        <p:par>
+                          <p:cTn id="16" fill="hold">
+                            <p:stCondLst>
+                              <p:cond delay="0"/>
+                            </p:stCondLst>
+                            <p:childTnLst>
+                              <p:par>
+                                <p:cTn id="17" presetID="1" presetClass="entr" presetSubtype="0" fill="hold" nodeType="clickEffect">
+                                  <p:stCondLst>
+                                    <p:cond delay="0"/>
+                                  </p:stCondLst>
+                                  <p:childTnLst>
+                                    <p:set>
+                                      <p:cBhvr>
+                                        <p:cTn id="18" dur="1" fill="hold">
+                                          <p:stCondLst>
+                                            <p:cond delay="0"/>
+                                          </p:stCondLst>
+                                        </p:cTn>
+                                        <p:tgtEl>
+                                          <p:spTgt spid="4">
+                                            <p:txEl>
+                                              <p:pRg st="4" end="4"/>
+                                            </p:txEl>
+                                          </p:spTgt>
+                                        </p:tgtEl>
+                                        <p:attrNameLst>
+                                          <p:attrName>style.visibility</p:attrName>
+                                        </p:attrNameLst>
+                                      </p:cBhvr>
+                                      <p:to>
+                                        <p:strVal val="visible"/>
+                                      </p:to>
+                                    </p:set>
+                                  </p:childTnLst>
+                                </p:cTn>
+                              </p:par>
+                            </p:childTnLst>
+                          </p:cTn>
+                        </p:par>
+                      </p:childTnLst>
+                    </p:cTn>
+                  </p:par>
+                  <p:par>
+                    <p:cTn id="19" fill="hold">
+                      <p:stCondLst>
+                        <p:cond delay="indefinite"/>
+                      </p:stCondLst>
+                      <p:childTnLst>
+                        <p:par>
+                          <p:cTn id="20" fill="hold">
+                            <p:stCondLst>
+                              <p:cond delay="0"/>
+                            </p:stCondLst>
+                            <p:childTnLst>
+                              <p:par>
+                                <p:cTn id="21" presetID="1" presetClass="entr" presetSubtype="0" fill="hold" nodeType="clickEffect">
+                                  <p:stCondLst>
+                                    <p:cond delay="0"/>
+                                  </p:stCondLst>
+                                  <p:childTnLst>
+                                    <p:set>
+                                      <p:cBhvr>
+                                        <p:cTn id="22" dur="1" fill="hold">
+                                          <p:stCondLst>
+                                            <p:cond delay="0"/>
+                                          </p:stCondLst>
+                                        </p:cTn>
+                                        <p:tgtEl>
+                                          <p:spTgt spid="4">
+                                            <p:txEl>
+                                              <p:pRg st="5" end="5"/>
+                                            </p:txEl>
+                                          </p:spTgt>
+                                        </p:tgtEl>
+                                        <p:attrNameLst>
+                                          <p:attrName>style.visibility</p:attrName>
+                                        </p:attrNameLst>
+                                      </p:cBhvr>
+                                      <p:to>
+                                        <p:strVal val="visible"/>
+                                      </p:to>
+                                    </p:set>
+                                  </p:childTnLst>
+                                </p:cTn>
+                              </p:par>
+                            </p:childTnLst>
+                          </p:cTn>
+                        </p:par>
+                      </p:childTnLst>
+                    </p:cTn>
+                  </p:par>
+                  <p:par>
+                    <p:cTn id="23" fill="hold">
+                      <p:stCondLst>
+                        <p:cond delay="indefinite"/>
+                      </p:stCondLst>
+                      <p:childTnLst>
+                        <p:par>
+                          <p:cTn id="24" fill="hold">
+                            <p:stCondLst>
+                              <p:cond delay="0"/>
+                            </p:stCondLst>
+                            <p:childTnLst>
+                              <p:par>
+                                <p:cTn id="25" presetID="1" presetClass="entr" presetSubtype="0" fill="hold" nodeType="clickEffect">
+                                  <p:stCondLst>
+                                    <p:cond delay="0"/>
+                                  </p:stCondLst>
+                                  <p:childTnLst>
+                                    <p:set>
+                                      <p:cBhvr>
+                                        <p:cTn id="26" dur="1" fill="hold">
+                                          <p:stCondLst>
+                                            <p:cond delay="0"/>
+                                          </p:stCondLst>
+                                        </p:cTn>
+                                        <p:tgtEl>
+                                          <p:spTgt spid="4">
+                                            <p:txEl>
+                                              <p:pRg st="6" end="6"/>
+                                            </p:txEl>
+                                          </p:spTgt>
+                                        </p:tgtEl>
+                                        <p:attrNameLst>
+                                          <p:attrName>style.visibility</p:attrName>
+                                        </p:attrNameLst>
+                                      </p:cBhvr>
+                                      <p:to>
+                                        <p:strVal val="visible"/>
+                                      </p:to>
+                                    </p:set>
+                                  </p:childTnLst>
+                                </p:cTn>
+                              </p:par>
+                            </p:childTnLst>
+                          </p:cTn>
+                        </p:par>
+                      </p:childTnLst>
+                    </p:cTn>
+                  </p:par>
+                  <p:par>
+                    <p:cTn id="27" fill="hold">
+                      <p:stCondLst>
+                        <p:cond delay="indefinite"/>
+                      </p:stCondLst>
+                      <p:childTnLst>
+                        <p:par>
+                          <p:cTn id="28" fill="hold">
+                            <p:stCondLst>
+                              <p:cond delay="0"/>
+                            </p:stCondLst>
+                            <p:childTnLst>
+                              <p:par>
+                                <p:cTn id="29" presetID="1" presetClass="entr" presetSubtype="0" fill="hold" nodeType="clickEffect">
+                                  <p:stCondLst>
+                                    <p:cond delay="0"/>
+                                  </p:stCondLst>
+                                  <p:childTnLst>
+                                    <p:set>
+                                      <p:cBhvr>
+                                        <p:cTn id="30" dur="1" fill="hold">
+                                          <p:stCondLst>
+                                            <p:cond delay="0"/>
+                                          </p:stCondLst>
+                                        </p:cTn>
+                                        <p:tgtEl>
+                                          <p:spTgt spid="4">
+                                            <p:txEl>
+                                              <p:pRg st="7" end="7"/>
+                                            </p:txEl>
+                                          </p:spTgt>
+                                        </p:tgtEl>
+                                        <p:attrNameLst>
+                                          <p:attrName>style.visibility</p:attrName>
+                                        </p:attrNameLst>
+                                      </p:cBhvr>
+                                      <p:to>
+                                        <p:strVal val="visible"/>
+                                      </p:to>
+                                    </p:set>
+                                  </p:childTnLst>
+                                </p:cTn>
+                              </p:par>
+                            </p:childTnLst>
+                          </p:cTn>
+                        </p:par>
+                      </p:childTnLst>
+                    </p:cTn>
+                  </p:par>
+                  <p:par>
+                    <p:cTn id="31" fill="hold">
+                      <p:stCondLst>
+                        <p:cond delay="indefinite"/>
+                      </p:stCondLst>
+                      <p:childTnLst>
+                        <p:par>
+                          <p:cTn id="32" fill="hold">
+                            <p:stCondLst>
+                              <p:cond delay="0"/>
+                            </p:stCondLst>
+                            <p:childTnLst>
+                              <p:par>
+                                <p:cTn id="33" presetID="1" presetClass="entr" presetSubtype="0" fill="hold" nodeType="clickEffect">
+                                  <p:stCondLst>
+                                    <p:cond delay="0"/>
+                                  </p:stCondLst>
+                                  <p:childTnLst>
+                                    <p:set>
+                                      <p:cBhvr>
+                                        <p:cTn id="34" dur="1" fill="hold">
+                                          <p:stCondLst>
+                                            <p:cond delay="0"/>
+                                          </p:stCondLst>
+                                        </p:cTn>
+                                        <p:tgtEl>
+                                          <p:spTgt spid="4">
+                                            <p:txEl>
+                                              <p:pRg st="8" end="8"/>
+                                            </p:txEl>
+                                          </p:spTgt>
+                                        </p:tgtEl>
+                                        <p:attrNameLst>
+                                          <p:attrName>style.visibility</p:attrName>
+                                        </p:attrNameLst>
+                                      </p:cBhvr>
+                                      <p:to>
+                                        <p:strVal val="visible"/>
+                                      </p:to>
+                                    </p:set>
+                                  </p:childTnLst>
+                                </p:cTn>
+                              </p:par>
+                            </p:childTnLst>
+                          </p:cTn>
+                        </p:par>
+                      </p:childTnLst>
+                    </p:cTn>
+                  </p:par>
+                  <p:par>
+                    <p:cTn id="35" fill="hold">
+                      <p:stCondLst>
+                        <p:cond delay="indefinite"/>
+                      </p:stCondLst>
+                      <p:childTnLst>
+                        <p:par>
+                          <p:cTn id="36" fill="hold">
+                            <p:stCondLst>
+                              <p:cond delay="0"/>
+                            </p:stCondLst>
+                            <p:childTnLst>
+                              <p:par>
+                                <p:cTn id="37" presetID="1" presetClass="entr" presetSubtype="0" fill="hold" nodeType="clickEffect">
+                                  <p:stCondLst>
+                                    <p:cond delay="0"/>
+                                  </p:stCondLst>
+                                  <p:childTnLst>
+                                    <p:set>
+                                      <p:cBhvr>
+                                        <p:cTn id="38" dur="1" fill="hold">
+                                          <p:stCondLst>
+                                            <p:cond delay="0"/>
+                                          </p:stCondLst>
+                                        </p:cTn>
+                                        <p:tgtEl>
+                                          <p:spTgt spid="4">
+                                            <p:txEl>
+                                              <p:pRg st="9" end="9"/>
+                                            </p:txEl>
+                                          </p:spTgt>
+                                        </p:tgtEl>
+                                        <p:attrNameLst>
+                                          <p:attrName>style.visibility</p:attrName>
+                                        </p:attrNameLst>
+                                      </p:cBhvr>
+                                      <p:to>
+                                        <p:strVal val="visible"/>
+                                      </p:to>
+                                    </p:set>
+                                  </p:childTnLst>
+                                </p:cTn>
+                              </p:par>
+                            </p:childTnLst>
+                          </p:cTn>
+                        </p:par>
+                      </p:childTnLst>
+                    </p:cTn>
+                  </p:par>
+                  <p:par>
+                    <p:cTn id="39" fill="hold">
+                      <p:stCondLst>
+                        <p:cond delay="indefinite"/>
+                      </p:stCondLst>
+                      <p:childTnLst>
+                        <p:par>
+                          <p:cTn id="40" fill="hold">
+                            <p:stCondLst>
+                              <p:cond delay="0"/>
+                            </p:stCondLst>
+                            <p:childTnLst>
+                              <p:par>
+                                <p:cTn id="41" presetID="1" presetClass="entr" presetSubtype="0" fill="hold" nodeType="clickEffect">
+                                  <p:stCondLst>
+                                    <p:cond delay="0"/>
+                                  </p:stCondLst>
+                                  <p:childTnLst>
+                                    <p:set>
+                                      <p:cBhvr>
+                                        <p:cTn id="42" dur="1" fill="hold">
+                                          <p:stCondLst>
+                                            <p:cond delay="0"/>
+                                          </p:stCondLst>
+                                        </p:cTn>
+                                        <p:tgtEl>
+                                          <p:spTgt spid="4">
+                                            <p:txEl>
+                                              <p:pRg st="10" end="10"/>
+                                            </p:txEl>
+                                          </p:spTgt>
+                                        </p:tgtEl>
+                                        <p:attrNameLst>
+                                          <p:attrName>style.visibility</p:attrName>
+                                        </p:attrNameLst>
+                                      </p:cBhvr>
+                                      <p:to>
+                                        <p:strVal val="visible"/>
+                                      </p:to>
+                                    </p:set>
+                                  </p:childTnLst>
+                                </p:cTn>
+                              </p:par>
+                            </p:childTnLst>
+                          </p:cTn>
+                        </p:par>
+                      </p:childTnLst>
+                    </p:cTn>
+                  </p:par>
                 </p:childTnLst>
               </p:cTn>
               <p:prevCondLst>
@@ -16426,6 +17596,165 @@
             </p:seq>
           </p:childTnLst>
         </p:cTn>
+      </p:par>
+    </p:tnLst>
+  </p:timing>
+</p:sld>
+</file>
+
+<file path=ppt/slides/slide9.xml><?xml version="1.0" encoding="utf-8"?>
+<p:sld xmlns:a="http://schemas.openxmlformats.org/drawingml/2006/main" xmlns:r="http://schemas.openxmlformats.org/officeDocument/2006/relationships" xmlns:p="http://schemas.openxmlformats.org/presentationml/2006/main">
+  <p:cSld>
+    <p:spTree>
+      <p:nvGrpSpPr>
+        <p:cNvPr id="1" name=""/>
+        <p:cNvGrpSpPr/>
+        <p:nvPr/>
+      </p:nvGrpSpPr>
+      <p:grpSpPr>
+        <a:xfrm>
+          <a:off x="0" y="0"/>
+          <a:ext cx="0" cy="0"/>
+          <a:chOff x="0" y="0"/>
+          <a:chExt cx="0" cy="0"/>
+        </a:xfrm>
+      </p:grpSpPr>
+      <p:sp>
+        <p:nvSpPr>
+          <p:cNvPr id="2" name="Title 1"/>
+          <p:cNvSpPr>
+            <a:spLocks noGrp="1"/>
+          </p:cNvSpPr>
+          <p:nvPr>
+            <p:ph type="title"/>
+          </p:nvPr>
+        </p:nvSpPr>
+        <p:spPr/>
+        <p:txBody>
+          <a:bodyPr/>
+          <a:lstStyle/>
+          <a:p>
+            <a:r>
+              <a:rPr lang="en-US" dirty="0" smtClean="0"/>
+              <a:t>Fixed Point</a:t>
+            </a:r>
+            <a:endParaRPr lang="en-US" dirty="0"/>
+          </a:p>
+        </p:txBody>
+      </p:sp>
+      <p:sp>
+        <p:nvSpPr>
+          <p:cNvPr id="4" name="Content Placeholder 3"/>
+          <p:cNvSpPr>
+            <a:spLocks noGrp="1"/>
+          </p:cNvSpPr>
+          <p:nvPr>
+            <p:ph idx="1"/>
+          </p:nvPr>
+        </p:nvSpPr>
+        <p:spPr>
+          <a:xfrm>
+            <a:off x="581736" y="1523052"/>
+            <a:ext cx="8131175" cy="4324350"/>
+          </a:xfrm>
+        </p:spPr>
+        <p:txBody>
+          <a:bodyPr/>
+          <a:lstStyle/>
+          <a:p>
+            <a:r>
+              <a:rPr lang="en-US" b="0" dirty="0"/>
+              <a:t>As you can imagine, some rational real numbers do not have a rational binary representation. </a:t>
+            </a:r>
+            <a:endParaRPr lang="en-US" b="0" dirty="0" smtClean="0"/>
+          </a:p>
+          <a:p>
+            <a:r>
+              <a:rPr lang="en-US" b="0" dirty="0" smtClean="0"/>
+              <a:t>For </a:t>
+            </a:r>
+            <a:r>
+              <a:rPr lang="en-US" b="0" dirty="0"/>
+              <a:t>example, the decimal number 0.1 cannot be represented as a finite binary string of 0's and 1's - it would repeat endlessly. </a:t>
+            </a:r>
+            <a:endParaRPr lang="en-US" b="0" dirty="0" smtClean="0"/>
+          </a:p>
+          <a:p>
+            <a:r>
+              <a:rPr lang="en-US" b="0" dirty="0" smtClean="0"/>
+              <a:t>You </a:t>
+            </a:r>
+            <a:r>
+              <a:rPr lang="en-US" b="0" dirty="0"/>
+              <a:t>can give the conversion a try if you want to prove this yourself.</a:t>
+            </a:r>
+            <a:r>
+              <a:rPr lang="en-US" dirty="0"/>
+              <a:t/>
+            </a:r>
+            <a:br>
+              <a:rPr lang="en-US" dirty="0"/>
+            </a:br>
+            <a:endParaRPr lang="en-US" b="0" dirty="0" smtClean="0"/>
+          </a:p>
+        </p:txBody>
+      </p:sp>
+      <p:sp>
+        <p:nvSpPr>
+          <p:cNvPr id="5" name="Slide Number Placeholder 3"/>
+          <p:cNvSpPr>
+            <a:spLocks noGrp="1"/>
+          </p:cNvSpPr>
+          <p:nvPr>
+            <p:ph type="sldNum" sz="quarter" idx="10"/>
+          </p:nvPr>
+        </p:nvSpPr>
+        <p:spPr>
+          <a:xfrm>
+            <a:off x="6910388" y="6253163"/>
+            <a:ext cx="2133600" cy="476250"/>
+          </a:xfrm>
+        </p:spPr>
+        <p:txBody>
+          <a:bodyPr/>
+          <a:lstStyle/>
+          <a:p>
+            <a:pPr>
+              <a:defRPr/>
+            </a:pPr>
+            <a:fld id="{62D6D4B2-7611-498F-8780-1EDC26277454}" type="slidenum">
+              <a:rPr lang="en-US" smtClean="0">
+                <a:solidFill>
+                  <a:srgbClr val="000000"/>
+                </a:solidFill>
+              </a:rPr>
+              <a:pPr>
+                <a:defRPr/>
+              </a:pPr>
+              <a:t>9</a:t>
+            </a:fld>
+            <a:endParaRPr lang="en-US" dirty="0">
+              <a:solidFill>
+                <a:srgbClr val="000000"/>
+              </a:solidFill>
+            </a:endParaRPr>
+          </a:p>
+        </p:txBody>
+      </p:sp>
+    </p:spTree>
+    <p:extLst>
+      <p:ext uri="{BB962C8B-B14F-4D97-AF65-F5344CB8AC3E}">
+        <p14:creationId xmlns:p14="http://schemas.microsoft.com/office/powerpoint/2010/main" val="196949630"/>
+      </p:ext>
+    </p:extLst>
+  </p:cSld>
+  <p:clrMapOvr>
+    <a:masterClrMapping/>
+  </p:clrMapOvr>
+  <p:timing>
+    <p:tnLst>
+      <p:par>
+        <p:cTn id="1" dur="indefinite" restart="never" nodeType="tmRoot"/>
       </p:par>
     </p:tnLst>
   </p:timing>

</xml_diff>